<commit_message>
Fleshed out multiple slides
</commit_message>
<xml_diff>
--- a/2016/computing_workgroup/intro-to-python/intro-to-python.pptx
+++ b/2016/computing_workgroup/intro-to-python/intro-to-python.pptx
@@ -5,7 +5,7 @@
     <p:sldMasterId id="2147483648" r:id="rId1"/>
   </p:sldMasterIdLst>
   <p:notesMasterIdLst>
-    <p:notesMasterId r:id="rId21"/>
+    <p:notesMasterId r:id="rId26"/>
   </p:notesMasterIdLst>
   <p:sldIdLst>
     <p:sldId id="355" r:id="rId2"/>
@@ -16,17 +16,22 @@
     <p:sldId id="349" r:id="rId7"/>
     <p:sldId id="360" r:id="rId8"/>
     <p:sldId id="345" r:id="rId9"/>
-    <p:sldId id="351" r:id="rId10"/>
-    <p:sldId id="353" r:id="rId11"/>
-    <p:sldId id="357" r:id="rId12"/>
-    <p:sldId id="356" r:id="rId13"/>
-    <p:sldId id="358" r:id="rId14"/>
-    <p:sldId id="359" r:id="rId15"/>
-    <p:sldId id="346" r:id="rId16"/>
-    <p:sldId id="342" r:id="rId17"/>
-    <p:sldId id="341" r:id="rId18"/>
-    <p:sldId id="339" r:id="rId19"/>
-    <p:sldId id="340" r:id="rId20"/>
+    <p:sldId id="361" r:id="rId10"/>
+    <p:sldId id="351" r:id="rId11"/>
+    <p:sldId id="353" r:id="rId12"/>
+    <p:sldId id="357" r:id="rId13"/>
+    <p:sldId id="356" r:id="rId14"/>
+    <p:sldId id="365" r:id="rId15"/>
+    <p:sldId id="358" r:id="rId16"/>
+    <p:sldId id="359" r:id="rId17"/>
+    <p:sldId id="346" r:id="rId18"/>
+    <p:sldId id="363" r:id="rId19"/>
+    <p:sldId id="342" r:id="rId20"/>
+    <p:sldId id="341" r:id="rId21"/>
+    <p:sldId id="339" r:id="rId22"/>
+    <p:sldId id="340" r:id="rId23"/>
+    <p:sldId id="364" r:id="rId24"/>
+    <p:sldId id="362" r:id="rId25"/>
   </p:sldIdLst>
   <p:sldSz cx="9144000" cy="6858000" type="screen4x3"/>
   <p:notesSz cx="6858000" cy="9144000"/>
@@ -2733,11 +2738,122 @@
           <a:p>
             <a:r>
               <a:rPr lang="en-US" dirty="0" smtClean="0"/>
-              <a:t>What is </a:t>
-            </a:r>
-            <a:r>
-              <a:rPr lang="en-US" dirty="0" smtClean="0"/>
-              <a:t>Python </a:t>
+              <a:t>What is Python good for?</a:t>
+            </a:r>
+            <a:endParaRPr lang="en-US" dirty="0"/>
+          </a:p>
+        </p:txBody>
+      </p:sp>
+      <p:sp>
+        <p:nvSpPr>
+          <p:cNvPr id="3" name="Content Placeholder 2"/>
+          <p:cNvSpPr>
+            <a:spLocks noGrp="1"/>
+          </p:cNvSpPr>
+          <p:nvPr>
+            <p:ph idx="1"/>
+          </p:nvPr>
+        </p:nvSpPr>
+        <p:spPr>
+          <a:xfrm>
+            <a:off x="457200" y="2049270"/>
+            <a:ext cx="8229600" cy="4482159"/>
+          </a:xfrm>
+        </p:spPr>
+        <p:txBody>
+          <a:bodyPr>
+            <a:normAutofit/>
+          </a:bodyPr>
+          <a:lstStyle/>
+          <a:p>
+            <a:r>
+              <a:rPr lang="en-US" dirty="0" smtClean="0"/>
+              <a:t>Development quality of life</a:t>
+            </a:r>
+          </a:p>
+          <a:p>
+            <a:pPr lvl="1"/>
+            <a:r>
+              <a:rPr lang="en-US" dirty="0" smtClean="0"/>
+              <a:t>More time writing easy to read code, quickly</a:t>
+            </a:r>
+          </a:p>
+          <a:p>
+            <a:r>
+              <a:rPr lang="en-US" dirty="0" smtClean="0"/>
+              <a:t>Portability</a:t>
+            </a:r>
+          </a:p>
+          <a:p>
+            <a:pPr lvl="1"/>
+            <a:r>
+              <a:rPr lang="en-US" dirty="0" smtClean="0"/>
+              <a:t>As long as the target has a Python interpreter, we can run Python there!</a:t>
+            </a:r>
+          </a:p>
+          <a:p>
+            <a:r>
+              <a:rPr lang="en-US" dirty="0" smtClean="0"/>
+              <a:t>Rich scientific ecosystem</a:t>
+            </a:r>
+          </a:p>
+          <a:p>
+            <a:pPr lvl="1"/>
+            <a:r>
+              <a:rPr lang="en-US" dirty="0" smtClean="0"/>
+              <a:t>Great libraries exist for most common tasks</a:t>
+            </a:r>
+          </a:p>
+        </p:txBody>
+      </p:sp>
+    </p:spTree>
+    <p:extLst>
+      <p:ext uri="{BB962C8B-B14F-4D97-AF65-F5344CB8AC3E}">
+        <p14:creationId xmlns:p14="http://schemas.microsoft.com/office/powerpoint/2010/main" val="533240533"/>
+      </p:ext>
+    </p:extLst>
+  </p:cSld>
+  <p:clrMapOvr>
+    <a:masterClrMapping/>
+  </p:clrMapOvr>
+</p:sld>
+</file>
+
+<file path=ppt/slides/slide11.xml><?xml version="1.0" encoding="utf-8"?>
+<p:sld xmlns:a="http://schemas.openxmlformats.org/drawingml/2006/main" xmlns:r="http://schemas.openxmlformats.org/officeDocument/2006/relationships" xmlns:p="http://schemas.openxmlformats.org/presentationml/2006/main">
+  <p:cSld>
+    <p:spTree>
+      <p:nvGrpSpPr>
+        <p:cNvPr id="1" name=""/>
+        <p:cNvGrpSpPr/>
+        <p:nvPr/>
+      </p:nvGrpSpPr>
+      <p:grpSpPr>
+        <a:xfrm>
+          <a:off x="0" y="0"/>
+          <a:ext cx="0" cy="0"/>
+          <a:chOff x="0" y="0"/>
+          <a:chExt cx="0" cy="0"/>
+        </a:xfrm>
+      </p:grpSpPr>
+      <p:sp>
+        <p:nvSpPr>
+          <p:cNvPr id="2" name="Title 1"/>
+          <p:cNvSpPr>
+            <a:spLocks noGrp="1"/>
+          </p:cNvSpPr>
+          <p:nvPr>
+            <p:ph type="title"/>
+          </p:nvPr>
+        </p:nvSpPr>
+        <p:spPr/>
+        <p:txBody>
+          <a:bodyPr/>
+          <a:lstStyle/>
+          <a:p>
+            <a:r>
+              <a:rPr lang="en-US" dirty="0" smtClean="0"/>
+              <a:t>What is Python </a:t>
             </a:r>
             <a:r>
               <a:rPr lang="en-US" i="1" dirty="0" smtClean="0"/>
@@ -2833,7 +2949,7 @@
 </p:sld>
 </file>
 
-<file path=ppt/slides/slide11.xml><?xml version="1.0" encoding="utf-8"?>
+<file path=ppt/slides/slide12.xml><?xml version="1.0" encoding="utf-8"?>
 <p:sld xmlns:a="http://schemas.openxmlformats.org/drawingml/2006/main" xmlns:r="http://schemas.openxmlformats.org/officeDocument/2006/relationships" xmlns:p="http://schemas.openxmlformats.org/presentationml/2006/main">
   <p:cSld>
     <p:spTree>
@@ -3255,7 +3371,7 @@
 </p:sld>
 </file>
 
-<file path=ppt/slides/slide12.xml><?xml version="1.0" encoding="utf-8"?>
+<file path=ppt/slides/slide13.xml><?xml version="1.0" encoding="utf-8"?>
 <p:sld xmlns:a="http://schemas.openxmlformats.org/drawingml/2006/main" xmlns:r="http://schemas.openxmlformats.org/officeDocument/2006/relationships" xmlns:p="http://schemas.openxmlformats.org/presentationml/2006/main">
   <p:cSld>
     <p:spTree>
@@ -3753,7 +3869,83 @@
 </p:sld>
 </file>
 
-<file path=ppt/slides/slide13.xml><?xml version="1.0" encoding="utf-8"?>
+<file path=ppt/slides/slide14.xml><?xml version="1.0" encoding="utf-8"?>
+<p:sld xmlns:a="http://schemas.openxmlformats.org/drawingml/2006/main" xmlns:r="http://schemas.openxmlformats.org/officeDocument/2006/relationships" xmlns:p="http://schemas.openxmlformats.org/presentationml/2006/main">
+  <p:cSld>
+    <p:spTree>
+      <p:nvGrpSpPr>
+        <p:cNvPr id="1" name=""/>
+        <p:cNvGrpSpPr/>
+        <p:nvPr/>
+      </p:nvGrpSpPr>
+      <p:grpSpPr>
+        <a:xfrm>
+          <a:off x="0" y="0"/>
+          <a:ext cx="0" cy="0"/>
+          <a:chOff x="0" y="0"/>
+          <a:chExt cx="0" cy="0"/>
+        </a:xfrm>
+      </p:grpSpPr>
+      <p:sp>
+        <p:nvSpPr>
+          <p:cNvPr id="2" name="Title 1"/>
+          <p:cNvSpPr>
+            <a:spLocks noGrp="1"/>
+          </p:cNvSpPr>
+          <p:nvPr>
+            <p:ph type="title"/>
+          </p:nvPr>
+        </p:nvSpPr>
+        <p:spPr/>
+        <p:txBody>
+          <a:bodyPr/>
+          <a:lstStyle/>
+          <a:p>
+            <a:r>
+              <a:rPr lang="en-US" dirty="0" smtClean="0"/>
+              <a:t>Lists</a:t>
+            </a:r>
+            <a:endParaRPr lang="en-US" dirty="0"/>
+          </a:p>
+        </p:txBody>
+      </p:sp>
+      <p:sp>
+        <p:nvSpPr>
+          <p:cNvPr id="3" name="Content Placeholder 2"/>
+          <p:cNvSpPr>
+            <a:spLocks noGrp="1"/>
+          </p:cNvSpPr>
+          <p:nvPr>
+            <p:ph idx="1"/>
+          </p:nvPr>
+        </p:nvSpPr>
+        <p:spPr/>
+        <p:txBody>
+          <a:bodyPr/>
+          <a:lstStyle/>
+          <a:p>
+            <a:r>
+              <a:rPr lang="en-US" dirty="0" smtClean="0"/>
+              <a:t>Lists are </a:t>
+            </a:r>
+            <a:endParaRPr lang="en-US" dirty="0"/>
+          </a:p>
+        </p:txBody>
+      </p:sp>
+    </p:spTree>
+    <p:extLst>
+      <p:ext uri="{BB962C8B-B14F-4D97-AF65-F5344CB8AC3E}">
+        <p14:creationId xmlns:p14="http://schemas.microsoft.com/office/powerpoint/2010/main" val="2775519337"/>
+      </p:ext>
+    </p:extLst>
+  </p:cSld>
+  <p:clrMapOvr>
+    <a:masterClrMapping/>
+  </p:clrMapOvr>
+</p:sld>
+</file>
+
+<file path=ppt/slides/slide15.xml><?xml version="1.0" encoding="utf-8"?>
 <p:sld xmlns:a="http://schemas.openxmlformats.org/drawingml/2006/main" xmlns:r="http://schemas.openxmlformats.org/officeDocument/2006/relationships" xmlns:p="http://schemas.openxmlformats.org/presentationml/2006/main">
   <p:cSld>
     <p:spTree>
@@ -3888,7 +4080,7 @@
 </p:sld>
 </file>
 
-<file path=ppt/slides/slide14.xml><?xml version="1.0" encoding="utf-8"?>
+<file path=ppt/slides/slide16.xml><?xml version="1.0" encoding="utf-8"?>
 <p:sld xmlns:a="http://schemas.openxmlformats.org/drawingml/2006/main" xmlns:r="http://schemas.openxmlformats.org/officeDocument/2006/relationships" xmlns:p="http://schemas.openxmlformats.org/presentationml/2006/main">
   <p:cSld>
     <p:spTree>
@@ -4075,7 +4267,7 @@
 </p:sld>
 </file>
 
-<file path=ppt/slides/slide15.xml><?xml version="1.0" encoding="utf-8"?>
+<file path=ppt/slides/slide17.xml><?xml version="1.0" encoding="utf-8"?>
 <p:sld xmlns:a="http://schemas.openxmlformats.org/drawingml/2006/main" xmlns:r="http://schemas.openxmlformats.org/officeDocument/2006/relationships" xmlns:p="http://schemas.openxmlformats.org/presentationml/2006/main">
   <p:cSld>
     <p:spTree>
@@ -4204,7 +4396,99 @@
 </p:sld>
 </file>
 
-<file path=ppt/slides/slide16.xml><?xml version="1.0" encoding="utf-8"?>
+<file path=ppt/slides/slide18.xml><?xml version="1.0" encoding="utf-8"?>
+<p:sld xmlns:a="http://schemas.openxmlformats.org/drawingml/2006/main" xmlns:r="http://schemas.openxmlformats.org/officeDocument/2006/relationships" xmlns:p="http://schemas.openxmlformats.org/presentationml/2006/main">
+  <p:cSld>
+    <p:spTree>
+      <p:nvGrpSpPr>
+        <p:cNvPr id="1" name=""/>
+        <p:cNvGrpSpPr/>
+        <p:nvPr/>
+      </p:nvGrpSpPr>
+      <p:grpSpPr>
+        <a:xfrm>
+          <a:off x="0" y="0"/>
+          <a:ext cx="0" cy="0"/>
+          <a:chOff x="0" y="0"/>
+          <a:chExt cx="0" cy="0"/>
+        </a:xfrm>
+      </p:grpSpPr>
+      <p:sp>
+        <p:nvSpPr>
+          <p:cNvPr id="2" name="Title 1"/>
+          <p:cNvSpPr>
+            <a:spLocks noGrp="1"/>
+          </p:cNvSpPr>
+          <p:nvPr>
+            <p:ph type="title"/>
+          </p:nvPr>
+        </p:nvSpPr>
+        <p:spPr/>
+        <p:txBody>
+          <a:bodyPr/>
+          <a:lstStyle/>
+          <a:p>
+            <a:r>
+              <a:rPr lang="en-US" dirty="0" err="1" smtClean="0"/>
+              <a:t>Jupyter</a:t>
+            </a:r>
+            <a:r>
+              <a:rPr lang="en-US" dirty="0" smtClean="0"/>
+              <a:t> notebooks</a:t>
+            </a:r>
+            <a:endParaRPr lang="en-US" dirty="0"/>
+          </a:p>
+        </p:txBody>
+      </p:sp>
+      <p:sp>
+        <p:nvSpPr>
+          <p:cNvPr id="3" name="Content Placeholder 2"/>
+          <p:cNvSpPr>
+            <a:spLocks noGrp="1"/>
+          </p:cNvSpPr>
+          <p:nvPr>
+            <p:ph idx="1"/>
+          </p:nvPr>
+        </p:nvSpPr>
+        <p:spPr/>
+        <p:txBody>
+          <a:bodyPr/>
+          <a:lstStyle/>
+          <a:p>
+            <a:r>
+              <a:rPr lang="en-US" dirty="0"/>
+              <a:t>Specifically mention Markdown (and </a:t>
+            </a:r>
+            <a:r>
+              <a:rPr lang="en-US" dirty="0" err="1"/>
+              <a:t>pandoc</a:t>
+            </a:r>
+            <a:r>
+              <a:rPr lang="en-US" dirty="0"/>
+              <a:t>), draw analogy to </a:t>
+            </a:r>
+            <a:r>
+              <a:rPr lang="en-US" dirty="0" smtClean="0"/>
+              <a:t>Mathematica</a:t>
+            </a:r>
+            <a:endParaRPr lang="en-US" dirty="0"/>
+          </a:p>
+        </p:txBody>
+      </p:sp>
+    </p:spTree>
+    <p:extLst>
+      <p:ext uri="{BB962C8B-B14F-4D97-AF65-F5344CB8AC3E}">
+        <p14:creationId xmlns:p14="http://schemas.microsoft.com/office/powerpoint/2010/main" val="768523931"/>
+      </p:ext>
+    </p:extLst>
+  </p:cSld>
+  <p:clrMapOvr>
+    <a:masterClrMapping/>
+  </p:clrMapOvr>
+</p:sld>
+</file>
+
+<file path=ppt/slides/slide19.xml><?xml version="1.0" encoding="utf-8"?>
 <p:sld xmlns:a="http://schemas.openxmlformats.org/drawingml/2006/main" xmlns:r="http://schemas.openxmlformats.org/officeDocument/2006/relationships" xmlns:p="http://schemas.openxmlformats.org/presentationml/2006/main">
   <p:cSld>
     <p:spTree>
@@ -4313,334 +4597,6 @@
     <p:extLst>
       <p:ext uri="{BB962C8B-B14F-4D97-AF65-F5344CB8AC3E}">
         <p14:creationId xmlns:p14="http://schemas.microsoft.com/office/powerpoint/2010/main" val="845665907"/>
-      </p:ext>
-    </p:extLst>
-  </p:cSld>
-  <p:clrMapOvr>
-    <a:masterClrMapping/>
-  </p:clrMapOvr>
-  <p:timing>
-    <p:tnLst>
-      <p:par>
-        <p:cTn id="1" dur="indefinite" restart="never" nodeType="tmRoot"/>
-      </p:par>
-    </p:tnLst>
-  </p:timing>
-</p:sld>
-</file>
-
-<file path=ppt/slides/slide17.xml><?xml version="1.0" encoding="utf-8"?>
-<p:sld xmlns:a="http://schemas.openxmlformats.org/drawingml/2006/main" xmlns:r="http://schemas.openxmlformats.org/officeDocument/2006/relationships" xmlns:p="http://schemas.openxmlformats.org/presentationml/2006/main">
-  <p:cSld>
-    <p:spTree>
-      <p:nvGrpSpPr>
-        <p:cNvPr id="1" name=""/>
-        <p:cNvGrpSpPr/>
-        <p:nvPr/>
-      </p:nvGrpSpPr>
-      <p:grpSpPr>
-        <a:xfrm>
-          <a:off x="0" y="0"/>
-          <a:ext cx="0" cy="0"/>
-          <a:chOff x="0" y="0"/>
-          <a:chExt cx="0" cy="0"/>
-        </a:xfrm>
-      </p:grpSpPr>
-      <p:sp>
-        <p:nvSpPr>
-          <p:cNvPr id="2" name="Title 1"/>
-          <p:cNvSpPr>
-            <a:spLocks noGrp="1"/>
-          </p:cNvSpPr>
-          <p:nvPr>
-            <p:ph type="title"/>
-          </p:nvPr>
-        </p:nvSpPr>
-        <p:spPr/>
-        <p:txBody>
-          <a:bodyPr/>
-          <a:lstStyle/>
-          <a:p>
-            <a:r>
-              <a:rPr lang="en-US" dirty="0" smtClean="0"/>
-              <a:t>Useful resources</a:t>
-            </a:r>
-            <a:endParaRPr lang="en-US" dirty="0"/>
-          </a:p>
-        </p:txBody>
-      </p:sp>
-      <p:sp>
-        <p:nvSpPr>
-          <p:cNvPr id="3" name="Content Placeholder 2"/>
-          <p:cNvSpPr>
-            <a:spLocks noGrp="1"/>
-          </p:cNvSpPr>
-          <p:nvPr>
-            <p:ph idx="1"/>
-          </p:nvPr>
-        </p:nvSpPr>
-        <p:spPr/>
-        <p:txBody>
-          <a:bodyPr/>
-          <a:lstStyle/>
-          <a:p>
-            <a:r>
-              <a:rPr lang="en-US" b="1" dirty="0" smtClean="0"/>
-              <a:t>Learn Python the Hard Way </a:t>
-            </a:r>
-            <a:r>
-              <a:rPr lang="en-US" dirty="0" smtClean="0"/>
-              <a:t>- </a:t>
-            </a:r>
-            <a:r>
-              <a:rPr lang="en-US" dirty="0" smtClean="0">
-                <a:hlinkClick r:id="rId2"/>
-              </a:rPr>
-              <a:t>https://learnpythonthehardway.org/book/</a:t>
-            </a:r>
-            <a:r>
-              <a:rPr lang="en-US" dirty="0" smtClean="0"/>
-              <a:t> </a:t>
-            </a:r>
-            <a:endParaRPr lang="en-US" b="1" dirty="0" smtClean="0"/>
-          </a:p>
-          <a:p>
-            <a:r>
-              <a:rPr lang="en-US" b="1" dirty="0" smtClean="0"/>
-              <a:t>Think Python </a:t>
-            </a:r>
-            <a:r>
-              <a:rPr lang="en-US" dirty="0" smtClean="0"/>
-              <a:t>– a free textbook on Python</a:t>
-            </a:r>
-            <a:br>
-              <a:rPr lang="en-US" dirty="0" smtClean="0"/>
-            </a:br>
-            <a:r>
-              <a:rPr lang="en-US" dirty="0" smtClean="0">
-                <a:hlinkClick r:id="rId3"/>
-              </a:rPr>
-              <a:t>http://greenteapress.com/wp/think-python/</a:t>
-            </a:r>
-            <a:endParaRPr lang="en-US" dirty="0" smtClean="0"/>
-          </a:p>
-          <a:p>
-            <a:r>
-              <a:rPr lang="en-US" b="1" dirty="0" err="1" smtClean="0"/>
-              <a:t>Scipy</a:t>
-            </a:r>
-            <a:r>
-              <a:rPr lang="en-US" b="1" dirty="0" smtClean="0"/>
-              <a:t> lectures</a:t>
-            </a:r>
-            <a:r>
-              <a:rPr lang="en-US" dirty="0" smtClean="0"/>
-              <a:t/>
-            </a:r>
-            <a:br>
-              <a:rPr lang="en-US" dirty="0" smtClean="0"/>
-            </a:br>
-            <a:r>
-              <a:rPr lang="en-US" dirty="0" smtClean="0">
-                <a:hlinkClick r:id="rId4"/>
-              </a:rPr>
-              <a:t>https://scipy-lectures.github.io/</a:t>
-            </a:r>
-            <a:endParaRPr lang="en-US" dirty="0" smtClean="0"/>
-          </a:p>
-        </p:txBody>
-      </p:sp>
-    </p:spTree>
-    <p:extLst>
-      <p:ext uri="{BB962C8B-B14F-4D97-AF65-F5344CB8AC3E}">
-        <p14:creationId xmlns:p14="http://schemas.microsoft.com/office/powerpoint/2010/main" val="3584811499"/>
-      </p:ext>
-    </p:extLst>
-  </p:cSld>
-  <p:clrMapOvr>
-    <a:masterClrMapping/>
-  </p:clrMapOvr>
-</p:sld>
-</file>
-
-<file path=ppt/slides/slide18.xml><?xml version="1.0" encoding="utf-8"?>
-<p:sld xmlns:a="http://schemas.openxmlformats.org/drawingml/2006/main" xmlns:r="http://schemas.openxmlformats.org/officeDocument/2006/relationships" xmlns:p="http://schemas.openxmlformats.org/presentationml/2006/main">
-  <p:cSld>
-    <p:spTree>
-      <p:nvGrpSpPr>
-        <p:cNvPr id="1" name=""/>
-        <p:cNvGrpSpPr/>
-        <p:nvPr/>
-      </p:nvGrpSpPr>
-      <p:grpSpPr>
-        <a:xfrm>
-          <a:off x="0" y="0"/>
-          <a:ext cx="0" cy="0"/>
-          <a:chOff x="0" y="0"/>
-          <a:chExt cx="0" cy="0"/>
-        </a:xfrm>
-      </p:grpSpPr>
-      <p:sp>
-        <p:nvSpPr>
-          <p:cNvPr id="2" name="Title 1"/>
-          <p:cNvSpPr>
-            <a:spLocks noGrp="1"/>
-          </p:cNvSpPr>
-          <p:nvPr>
-            <p:ph type="title"/>
-          </p:nvPr>
-        </p:nvSpPr>
-        <p:spPr>
-          <a:xfrm>
-            <a:off x="457200" y="2874722"/>
-            <a:ext cx="8229600" cy="803756"/>
-          </a:xfrm>
-        </p:spPr>
-        <p:txBody>
-          <a:bodyPr/>
-          <a:lstStyle/>
-          <a:p>
-            <a:r>
-              <a:rPr lang="en-US" dirty="0" smtClean="0"/>
-              <a:t>Thank you!</a:t>
-            </a:r>
-            <a:endParaRPr lang="en-US" dirty="0"/>
-          </a:p>
-        </p:txBody>
-      </p:sp>
-    </p:spTree>
-    <p:extLst>
-      <p:ext uri="{BB962C8B-B14F-4D97-AF65-F5344CB8AC3E}">
-        <p14:creationId xmlns:p14="http://schemas.microsoft.com/office/powerpoint/2010/main" val="1844849267"/>
-      </p:ext>
-    </p:extLst>
-  </p:cSld>
-  <p:clrMapOvr>
-    <a:masterClrMapping/>
-  </p:clrMapOvr>
-</p:sld>
-</file>
-
-<file path=ppt/slides/slide19.xml><?xml version="1.0" encoding="utf-8"?>
-<p:sld xmlns:a="http://schemas.openxmlformats.org/drawingml/2006/main" xmlns:r="http://schemas.openxmlformats.org/officeDocument/2006/relationships" xmlns:p="http://schemas.openxmlformats.org/presentationml/2006/main">
-  <p:cSld>
-    <p:spTree>
-      <p:nvGrpSpPr>
-        <p:cNvPr id="1" name=""/>
-        <p:cNvGrpSpPr/>
-        <p:nvPr/>
-      </p:nvGrpSpPr>
-      <p:grpSpPr>
-        <a:xfrm>
-          <a:off x="0" y="0"/>
-          <a:ext cx="0" cy="0"/>
-          <a:chOff x="0" y="0"/>
-          <a:chExt cx="0" cy="0"/>
-        </a:xfrm>
-      </p:grpSpPr>
-      <p:sp>
-        <p:nvSpPr>
-          <p:cNvPr id="2" name="Title 1"/>
-          <p:cNvSpPr>
-            <a:spLocks noGrp="1"/>
-          </p:cNvSpPr>
-          <p:nvPr>
-            <p:ph type="title"/>
-          </p:nvPr>
-        </p:nvSpPr>
-        <p:spPr/>
-        <p:txBody>
-          <a:bodyPr/>
-          <a:lstStyle/>
-          <a:p>
-            <a:r>
-              <a:rPr lang="en-US" dirty="0" smtClean="0"/>
-              <a:t>Backup Slides</a:t>
-            </a:r>
-            <a:endParaRPr lang="en-US" dirty="0"/>
-          </a:p>
-        </p:txBody>
-      </p:sp>
-      <p:sp>
-        <p:nvSpPr>
-          <p:cNvPr id="3" name="Content Placeholder 2"/>
-          <p:cNvSpPr>
-            <a:spLocks noGrp="1"/>
-          </p:cNvSpPr>
-          <p:nvPr>
-            <p:ph idx="1"/>
-          </p:nvPr>
-        </p:nvSpPr>
-        <p:spPr/>
-        <p:txBody>
-          <a:bodyPr/>
-          <a:lstStyle/>
-          <a:p>
-            <a:r>
-              <a:rPr lang="en-US" dirty="0"/>
-              <a:t>Garbage </a:t>
-            </a:r>
-            <a:r>
-              <a:rPr lang="en-US" dirty="0" smtClean="0"/>
-              <a:t>collection</a:t>
-            </a:r>
-          </a:p>
-          <a:p>
-            <a:r>
-              <a:rPr lang="en-US" dirty="0"/>
-              <a:t>First class functions</a:t>
-            </a:r>
-          </a:p>
-          <a:p>
-            <a:pPr lvl="1"/>
-            <a:r>
-              <a:rPr lang="en-US" dirty="0" smtClean="0"/>
-              <a:t>Lambdas</a:t>
-            </a:r>
-          </a:p>
-          <a:p>
-            <a:r>
-              <a:rPr lang="en-US" dirty="0" err="1"/>
-              <a:t>Ipython</a:t>
-            </a:r>
-            <a:r>
-              <a:rPr lang="en-US" dirty="0"/>
-              <a:t>/</a:t>
-            </a:r>
-            <a:r>
-              <a:rPr lang="en-US" dirty="0" err="1"/>
-              <a:t>Jupyter</a:t>
-            </a:r>
-            <a:endParaRPr lang="en-US" dirty="0"/>
-          </a:p>
-          <a:p>
-            <a:pPr lvl="1"/>
-            <a:r>
-              <a:rPr lang="en-US" dirty="0"/>
-              <a:t>Specifically mention Markdown (and </a:t>
-            </a:r>
-            <a:r>
-              <a:rPr lang="en-US" dirty="0" err="1"/>
-              <a:t>pandoc</a:t>
-            </a:r>
-            <a:r>
-              <a:rPr lang="en-US" dirty="0"/>
-              <a:t>), draw analogy to Mathematica</a:t>
-            </a:r>
-          </a:p>
-          <a:p>
-            <a:pPr lvl="1"/>
-            <a:endParaRPr lang="en-US" dirty="0"/>
-          </a:p>
-          <a:p>
-            <a:endParaRPr lang="en-US" dirty="0"/>
-          </a:p>
-        </p:txBody>
-      </p:sp>
-    </p:spTree>
-    <p:extLst>
-      <p:ext uri="{BB962C8B-B14F-4D97-AF65-F5344CB8AC3E}">
-        <p14:creationId xmlns:p14="http://schemas.microsoft.com/office/powerpoint/2010/main" val="1589961851"/>
       </p:ext>
     </p:extLst>
   </p:cSld>
@@ -5200,6 +5156,538 @@
 </p:sld>
 </file>
 
+<file path=ppt/slides/slide20.xml><?xml version="1.0" encoding="utf-8"?>
+<p:sld xmlns:a="http://schemas.openxmlformats.org/drawingml/2006/main" xmlns:r="http://schemas.openxmlformats.org/officeDocument/2006/relationships" xmlns:p="http://schemas.openxmlformats.org/presentationml/2006/main">
+  <p:cSld>
+    <p:spTree>
+      <p:nvGrpSpPr>
+        <p:cNvPr id="1" name=""/>
+        <p:cNvGrpSpPr/>
+        <p:nvPr/>
+      </p:nvGrpSpPr>
+      <p:grpSpPr>
+        <a:xfrm>
+          <a:off x="0" y="0"/>
+          <a:ext cx="0" cy="0"/>
+          <a:chOff x="0" y="0"/>
+          <a:chExt cx="0" cy="0"/>
+        </a:xfrm>
+      </p:grpSpPr>
+      <p:sp>
+        <p:nvSpPr>
+          <p:cNvPr id="2" name="Title 1"/>
+          <p:cNvSpPr>
+            <a:spLocks noGrp="1"/>
+          </p:cNvSpPr>
+          <p:nvPr>
+            <p:ph type="title"/>
+          </p:nvPr>
+        </p:nvSpPr>
+        <p:spPr/>
+        <p:txBody>
+          <a:bodyPr/>
+          <a:lstStyle/>
+          <a:p>
+            <a:r>
+              <a:rPr lang="en-US" dirty="0" smtClean="0"/>
+              <a:t>Useful resources</a:t>
+            </a:r>
+            <a:endParaRPr lang="en-US" dirty="0"/>
+          </a:p>
+        </p:txBody>
+      </p:sp>
+      <p:sp>
+        <p:nvSpPr>
+          <p:cNvPr id="3" name="Content Placeholder 2"/>
+          <p:cNvSpPr>
+            <a:spLocks noGrp="1"/>
+          </p:cNvSpPr>
+          <p:nvPr>
+            <p:ph idx="1"/>
+          </p:nvPr>
+        </p:nvSpPr>
+        <p:spPr/>
+        <p:txBody>
+          <a:bodyPr/>
+          <a:lstStyle/>
+          <a:p>
+            <a:r>
+              <a:rPr lang="en-US" b="1" dirty="0" err="1" smtClean="0"/>
+              <a:t>Scipy</a:t>
+            </a:r>
+            <a:r>
+              <a:rPr lang="en-US" b="1" dirty="0" smtClean="0"/>
+              <a:t> </a:t>
+            </a:r>
+            <a:r>
+              <a:rPr lang="en-US" b="1" dirty="0" smtClean="0"/>
+              <a:t>lectures</a:t>
+            </a:r>
+            <a:r>
+              <a:rPr lang="en-US" dirty="0" smtClean="0"/>
+              <a:t/>
+            </a:r>
+            <a:br>
+              <a:rPr lang="en-US" dirty="0" smtClean="0"/>
+            </a:br>
+            <a:r>
+              <a:rPr lang="en-US" dirty="0" smtClean="0">
+                <a:hlinkClick r:id="rId2"/>
+              </a:rPr>
+              <a:t>https://scipy-lectures.github.io/</a:t>
+            </a:r>
+            <a:endParaRPr lang="en-US" dirty="0" smtClean="0"/>
+          </a:p>
+        </p:txBody>
+      </p:sp>
+    </p:spTree>
+    <p:extLst>
+      <p:ext uri="{BB962C8B-B14F-4D97-AF65-F5344CB8AC3E}">
+        <p14:creationId xmlns:p14="http://schemas.microsoft.com/office/powerpoint/2010/main" val="3584811499"/>
+      </p:ext>
+    </p:extLst>
+  </p:cSld>
+  <p:clrMapOvr>
+    <a:masterClrMapping/>
+  </p:clrMapOvr>
+</p:sld>
+</file>
+
+<file path=ppt/slides/slide21.xml><?xml version="1.0" encoding="utf-8"?>
+<p:sld xmlns:a="http://schemas.openxmlformats.org/drawingml/2006/main" xmlns:r="http://schemas.openxmlformats.org/officeDocument/2006/relationships" xmlns:p="http://schemas.openxmlformats.org/presentationml/2006/main">
+  <p:cSld>
+    <p:spTree>
+      <p:nvGrpSpPr>
+        <p:cNvPr id="1" name=""/>
+        <p:cNvGrpSpPr/>
+        <p:nvPr/>
+      </p:nvGrpSpPr>
+      <p:grpSpPr>
+        <a:xfrm>
+          <a:off x="0" y="0"/>
+          <a:ext cx="0" cy="0"/>
+          <a:chOff x="0" y="0"/>
+          <a:chExt cx="0" cy="0"/>
+        </a:xfrm>
+      </p:grpSpPr>
+      <p:sp>
+        <p:nvSpPr>
+          <p:cNvPr id="2" name="Title 1"/>
+          <p:cNvSpPr>
+            <a:spLocks noGrp="1"/>
+          </p:cNvSpPr>
+          <p:nvPr>
+            <p:ph type="title"/>
+          </p:nvPr>
+        </p:nvSpPr>
+        <p:spPr>
+          <a:xfrm>
+            <a:off x="457200" y="2874722"/>
+            <a:ext cx="8229600" cy="803756"/>
+          </a:xfrm>
+        </p:spPr>
+        <p:txBody>
+          <a:bodyPr/>
+          <a:lstStyle/>
+          <a:p>
+            <a:r>
+              <a:rPr lang="en-US" dirty="0" smtClean="0"/>
+              <a:t>Thank you!</a:t>
+            </a:r>
+            <a:endParaRPr lang="en-US" dirty="0"/>
+          </a:p>
+        </p:txBody>
+      </p:sp>
+    </p:spTree>
+    <p:extLst>
+      <p:ext uri="{BB962C8B-B14F-4D97-AF65-F5344CB8AC3E}">
+        <p14:creationId xmlns:p14="http://schemas.microsoft.com/office/powerpoint/2010/main" val="1844849267"/>
+      </p:ext>
+    </p:extLst>
+  </p:cSld>
+  <p:clrMapOvr>
+    <a:masterClrMapping/>
+  </p:clrMapOvr>
+</p:sld>
+</file>
+
+<file path=ppt/slides/slide22.xml><?xml version="1.0" encoding="utf-8"?>
+<p:sld xmlns:a="http://schemas.openxmlformats.org/drawingml/2006/main" xmlns:r="http://schemas.openxmlformats.org/officeDocument/2006/relationships" xmlns:p="http://schemas.openxmlformats.org/presentationml/2006/main">
+  <p:cSld>
+    <p:spTree>
+      <p:nvGrpSpPr>
+        <p:cNvPr id="1" name=""/>
+        <p:cNvGrpSpPr/>
+        <p:nvPr/>
+      </p:nvGrpSpPr>
+      <p:grpSpPr>
+        <a:xfrm>
+          <a:off x="0" y="0"/>
+          <a:ext cx="0" cy="0"/>
+          <a:chOff x="0" y="0"/>
+          <a:chExt cx="0" cy="0"/>
+        </a:xfrm>
+      </p:grpSpPr>
+      <p:sp>
+        <p:nvSpPr>
+          <p:cNvPr id="2" name="Title 1"/>
+          <p:cNvSpPr>
+            <a:spLocks noGrp="1"/>
+          </p:cNvSpPr>
+          <p:nvPr>
+            <p:ph type="title"/>
+          </p:nvPr>
+        </p:nvSpPr>
+        <p:spPr/>
+        <p:txBody>
+          <a:bodyPr/>
+          <a:lstStyle/>
+          <a:p>
+            <a:r>
+              <a:rPr lang="en-US" dirty="0" smtClean="0"/>
+              <a:t>Backup Slides</a:t>
+            </a:r>
+            <a:endParaRPr lang="en-US" dirty="0"/>
+          </a:p>
+        </p:txBody>
+      </p:sp>
+      <p:sp>
+        <p:nvSpPr>
+          <p:cNvPr id="3" name="Content Placeholder 2"/>
+          <p:cNvSpPr>
+            <a:spLocks noGrp="1"/>
+          </p:cNvSpPr>
+          <p:nvPr>
+            <p:ph idx="1"/>
+          </p:nvPr>
+        </p:nvSpPr>
+        <p:spPr/>
+        <p:txBody>
+          <a:bodyPr/>
+          <a:lstStyle/>
+          <a:p>
+            <a:pPr marL="0" indent="0">
+              <a:buNone/>
+            </a:pPr>
+            <a:endParaRPr lang="en-US" dirty="0"/>
+          </a:p>
+        </p:txBody>
+      </p:sp>
+    </p:spTree>
+    <p:extLst>
+      <p:ext uri="{BB962C8B-B14F-4D97-AF65-F5344CB8AC3E}">
+        <p14:creationId xmlns:p14="http://schemas.microsoft.com/office/powerpoint/2010/main" val="1589961851"/>
+      </p:ext>
+    </p:extLst>
+  </p:cSld>
+  <p:clrMapOvr>
+    <a:masterClrMapping/>
+  </p:clrMapOvr>
+  <p:timing>
+    <p:tnLst>
+      <p:par>
+        <p:cTn id="1" dur="indefinite" restart="never" nodeType="tmRoot"/>
+      </p:par>
+    </p:tnLst>
+  </p:timing>
+</p:sld>
+</file>
+
+<file path=ppt/slides/slide23.xml><?xml version="1.0" encoding="utf-8"?>
+<p:sld xmlns:a="http://schemas.openxmlformats.org/drawingml/2006/main" xmlns:r="http://schemas.openxmlformats.org/officeDocument/2006/relationships" xmlns:p="http://schemas.openxmlformats.org/presentationml/2006/main">
+  <p:cSld>
+    <p:spTree>
+      <p:nvGrpSpPr>
+        <p:cNvPr id="1" name=""/>
+        <p:cNvGrpSpPr/>
+        <p:nvPr/>
+      </p:nvGrpSpPr>
+      <p:grpSpPr>
+        <a:xfrm>
+          <a:off x="0" y="0"/>
+          <a:ext cx="0" cy="0"/>
+          <a:chOff x="0" y="0"/>
+          <a:chExt cx="0" cy="0"/>
+        </a:xfrm>
+      </p:grpSpPr>
+      <p:sp>
+        <p:nvSpPr>
+          <p:cNvPr id="2" name="Title 1"/>
+          <p:cNvSpPr>
+            <a:spLocks noGrp="1"/>
+          </p:cNvSpPr>
+          <p:nvPr>
+            <p:ph type="title"/>
+          </p:nvPr>
+        </p:nvSpPr>
+        <p:spPr/>
+        <p:txBody>
+          <a:bodyPr/>
+          <a:lstStyle/>
+          <a:p>
+            <a:r>
+              <a:rPr lang="en-US" dirty="0" smtClean="0"/>
+              <a:t>First class functions</a:t>
+            </a:r>
+            <a:endParaRPr lang="en-US" dirty="0"/>
+          </a:p>
+        </p:txBody>
+      </p:sp>
+      <p:sp>
+        <p:nvSpPr>
+          <p:cNvPr id="3" name="Content Placeholder 2"/>
+          <p:cNvSpPr>
+            <a:spLocks noGrp="1"/>
+          </p:cNvSpPr>
+          <p:nvPr>
+            <p:ph idx="1"/>
+          </p:nvPr>
+        </p:nvSpPr>
+        <p:spPr/>
+        <p:txBody>
+          <a:bodyPr/>
+          <a:lstStyle/>
+          <a:p>
+            <a:r>
+              <a:rPr lang="en-US" dirty="0" smtClean="0"/>
+              <a:t>Functions in Python are </a:t>
+            </a:r>
+            <a:r>
+              <a:rPr lang="en-US" b="1" dirty="0" smtClean="0"/>
+              <a:t>first-class citizens</a:t>
+            </a:r>
+            <a:r>
+              <a:rPr lang="en-US" dirty="0" smtClean="0"/>
+              <a:t>, which means they can be passed around like any other variable</a:t>
+            </a:r>
+          </a:p>
+          <a:p>
+            <a:r>
+              <a:rPr lang="en-US" dirty="0" smtClean="0"/>
+              <a:t>This allows </a:t>
+            </a:r>
+            <a:endParaRPr lang="en-US" dirty="0" smtClean="0"/>
+          </a:p>
+          <a:p>
+            <a:r>
+              <a:rPr lang="en-US" dirty="0" smtClean="0"/>
+              <a:t>See </a:t>
+            </a:r>
+            <a:r>
+              <a:rPr lang="en-US" b="1" dirty="0" smtClean="0"/>
+              <a:t>firstclassfunctions_example.py</a:t>
+            </a:r>
+            <a:r>
+              <a:rPr lang="en-US" dirty="0" smtClean="0"/>
+              <a:t> for some examples of how this can be useful</a:t>
+            </a:r>
+            <a:endParaRPr lang="en-US" b="1" dirty="0"/>
+          </a:p>
+        </p:txBody>
+      </p:sp>
+    </p:spTree>
+    <p:extLst>
+      <p:ext uri="{BB962C8B-B14F-4D97-AF65-F5344CB8AC3E}">
+        <p14:creationId xmlns:p14="http://schemas.microsoft.com/office/powerpoint/2010/main" val="2264643999"/>
+      </p:ext>
+    </p:extLst>
+  </p:cSld>
+  <p:clrMapOvr>
+    <a:masterClrMapping/>
+  </p:clrMapOvr>
+  <p:timing>
+    <p:tnLst>
+      <p:par>
+        <p:cTn id="1" dur="indefinite" restart="never" nodeType="tmRoot"/>
+      </p:par>
+    </p:tnLst>
+  </p:timing>
+</p:sld>
+</file>
+
+<file path=ppt/slides/slide24.xml><?xml version="1.0" encoding="utf-8"?>
+<p:sld xmlns:a="http://schemas.openxmlformats.org/drawingml/2006/main" xmlns:r="http://schemas.openxmlformats.org/officeDocument/2006/relationships" xmlns:p="http://schemas.openxmlformats.org/presentationml/2006/main">
+  <p:cSld>
+    <p:spTree>
+      <p:nvGrpSpPr>
+        <p:cNvPr id="1" name=""/>
+        <p:cNvGrpSpPr/>
+        <p:nvPr/>
+      </p:nvGrpSpPr>
+      <p:grpSpPr>
+        <a:xfrm>
+          <a:off x="0" y="0"/>
+          <a:ext cx="0" cy="0"/>
+          <a:chOff x="0" y="0"/>
+          <a:chExt cx="0" cy="0"/>
+        </a:xfrm>
+      </p:grpSpPr>
+      <p:sp>
+        <p:nvSpPr>
+          <p:cNvPr id="2" name="Title 1"/>
+          <p:cNvSpPr>
+            <a:spLocks noGrp="1"/>
+          </p:cNvSpPr>
+          <p:nvPr>
+            <p:ph type="title"/>
+          </p:nvPr>
+        </p:nvSpPr>
+        <p:spPr/>
+        <p:txBody>
+          <a:bodyPr/>
+          <a:lstStyle/>
+          <a:p>
+            <a:r>
+              <a:rPr lang="en-US" dirty="0" smtClean="0"/>
+              <a:t>Garbage collection</a:t>
+            </a:r>
+            <a:endParaRPr lang="en-US" dirty="0"/>
+          </a:p>
+        </p:txBody>
+      </p:sp>
+      <p:sp>
+        <p:nvSpPr>
+          <p:cNvPr id="3" name="Content Placeholder 2"/>
+          <p:cNvSpPr>
+            <a:spLocks noGrp="1"/>
+          </p:cNvSpPr>
+          <p:nvPr>
+            <p:ph idx="1"/>
+          </p:nvPr>
+        </p:nvSpPr>
+        <p:spPr>
+          <a:xfrm>
+            <a:off x="457200" y="2049270"/>
+            <a:ext cx="8229600" cy="4612787"/>
+          </a:xfrm>
+        </p:spPr>
+        <p:txBody>
+          <a:bodyPr>
+            <a:normAutofit/>
+          </a:bodyPr>
+          <a:lstStyle/>
+          <a:p>
+            <a:r>
+              <a:rPr lang="en-US" dirty="0" smtClean="0"/>
+              <a:t>In C/C++ and others, memory is </a:t>
+            </a:r>
+            <a:r>
+              <a:rPr lang="en-US" i="1" dirty="0" smtClean="0"/>
+              <a:t>managed</a:t>
+            </a:r>
+            <a:r>
+              <a:rPr lang="en-US" dirty="0" smtClean="0"/>
+              <a:t> by the user.  E.g. </a:t>
+            </a:r>
+            <a:r>
+              <a:rPr lang="en-US" b="1" dirty="0" err="1"/>
+              <a:t>malloc</a:t>
+            </a:r>
+            <a:r>
+              <a:rPr lang="en-US" b="1" dirty="0"/>
+              <a:t>()</a:t>
+            </a:r>
+            <a:r>
+              <a:rPr lang="en-US" dirty="0" smtClean="0"/>
+              <a:t> and </a:t>
+            </a:r>
+            <a:r>
+              <a:rPr lang="en-US" b="1" dirty="0" smtClean="0"/>
+              <a:t>free()</a:t>
+            </a:r>
+          </a:p>
+          <a:p>
+            <a:pPr lvl="1"/>
+            <a:r>
+              <a:rPr lang="en-US" dirty="0" smtClean="0"/>
+              <a:t>A </a:t>
+            </a:r>
+            <a:r>
+              <a:rPr lang="en-US" u="sng" dirty="0" smtClean="0"/>
+              <a:t>lot</a:t>
+            </a:r>
+            <a:r>
+              <a:rPr lang="en-US" dirty="0" smtClean="0"/>
+              <a:t> of bugs happen in these steps.</a:t>
+            </a:r>
+          </a:p>
+          <a:p>
+            <a:r>
+              <a:rPr lang="en-US" dirty="0" smtClean="0"/>
+              <a:t>In </a:t>
+            </a:r>
+            <a:r>
+              <a:rPr lang="en-US" dirty="0" err="1" smtClean="0"/>
+              <a:t>CPython</a:t>
+            </a:r>
+            <a:r>
+              <a:rPr lang="en-US" dirty="0" smtClean="0"/>
+              <a:t>, memory is handled by a </a:t>
+            </a:r>
+            <a:r>
+              <a:rPr lang="en-US" i="1" dirty="0" smtClean="0"/>
+              <a:t>private heap</a:t>
+            </a:r>
+            <a:endParaRPr lang="en-US" dirty="0" smtClean="0"/>
+          </a:p>
+          <a:p>
+            <a:pPr lvl="1"/>
+            <a:r>
+              <a:rPr lang="en-US" dirty="0" smtClean="0"/>
+              <a:t>Memory for an object is freed when there are no remaining </a:t>
+            </a:r>
+            <a:r>
+              <a:rPr lang="en-US" i="1" dirty="0" smtClean="0"/>
+              <a:t>references</a:t>
+            </a:r>
+            <a:r>
+              <a:rPr lang="en-US" dirty="0" smtClean="0"/>
+              <a:t> to that object.</a:t>
+            </a:r>
+          </a:p>
+          <a:p>
+            <a:pPr lvl="1"/>
+            <a:r>
+              <a:rPr lang="en-US" dirty="0" smtClean="0"/>
+              <a:t>Short version: if nobody can “point” to the object, the </a:t>
+            </a:r>
+            <a:r>
+              <a:rPr lang="en-US" i="1" dirty="0" smtClean="0"/>
+              <a:t>garbage collector</a:t>
+            </a:r>
+            <a:r>
+              <a:rPr lang="en-US" dirty="0" smtClean="0"/>
+              <a:t> knows to free it</a:t>
+            </a:r>
+          </a:p>
+          <a:p>
+            <a:endParaRPr lang="en-US" dirty="0"/>
+          </a:p>
+          <a:p>
+            <a:endParaRPr lang="en-US" dirty="0"/>
+          </a:p>
+        </p:txBody>
+      </p:sp>
+    </p:spTree>
+    <p:extLst>
+      <p:ext uri="{BB962C8B-B14F-4D97-AF65-F5344CB8AC3E}">
+        <p14:creationId xmlns:p14="http://schemas.microsoft.com/office/powerpoint/2010/main" val="1075041600"/>
+      </p:ext>
+    </p:extLst>
+  </p:cSld>
+  <p:clrMapOvr>
+    <a:masterClrMapping/>
+  </p:clrMapOvr>
+  <p:timing>
+    <p:tnLst>
+      <p:par>
+        <p:cTn id="1" dur="indefinite" restart="never" nodeType="tmRoot"/>
+      </p:par>
+    </p:tnLst>
+  </p:timing>
+</p:sld>
+</file>
+
 <file path=ppt/slides/slide3.xml><?xml version="1.0" encoding="utf-8"?>
 <p:sld xmlns:a="http://schemas.openxmlformats.org/drawingml/2006/main" xmlns:r="http://schemas.openxmlformats.org/officeDocument/2006/relationships" xmlns:p="http://schemas.openxmlformats.org/presentationml/2006/main">
   <p:cSld>
@@ -5310,11 +5798,7 @@
           <a:p>
             <a:r>
               <a:rPr lang="en-US" dirty="0" smtClean="0"/>
-              <a:t>What is </a:t>
-            </a:r>
-            <a:r>
-              <a:rPr lang="en-US" dirty="0" smtClean="0"/>
-              <a:t>Python?</a:t>
+              <a:t>What is Python?</a:t>
             </a:r>
             <a:endParaRPr lang="en-US" dirty="0"/>
           </a:p>
@@ -5410,11 +5894,7 @@
           <a:p>
             <a:r>
               <a:rPr lang="en-US" dirty="0" smtClean="0"/>
-              <a:t>What is </a:t>
-            </a:r>
-            <a:r>
-              <a:rPr lang="en-US" dirty="0" smtClean="0"/>
-              <a:t>Python?</a:t>
+              <a:t>What is Python?</a:t>
             </a:r>
             <a:endParaRPr lang="en-US" dirty="0"/>
           </a:p>
@@ -5552,11 +6032,7 @@
           <a:p>
             <a:r>
               <a:rPr lang="en-US" dirty="0" smtClean="0"/>
-              <a:t>What is </a:t>
-            </a:r>
-            <a:r>
-              <a:rPr lang="en-US" dirty="0" smtClean="0"/>
-              <a:t>Python?</a:t>
+              <a:t>What is Python?</a:t>
             </a:r>
             <a:endParaRPr lang="en-US" dirty="0"/>
           </a:p>
@@ -6002,7 +6478,7 @@
           <a:p>
             <a:r>
               <a:rPr lang="en-US" dirty="0" smtClean="0"/>
-              <a:t>Three Short Python Programs</a:t>
+              <a:t>A second short program in Python</a:t>
             </a:r>
             <a:endParaRPr lang="en-US" dirty="0"/>
           </a:p>
@@ -6024,32 +6500,9 @@
           <a:lstStyle/>
           <a:p>
             <a:r>
-              <a:rPr lang="en-US" dirty="0" smtClean="0"/>
-              <a:t>Counting </a:t>
-            </a:r>
-            <a:r>
-              <a:rPr lang="en-US" dirty="0" smtClean="0"/>
-              <a:t>to 100 or </a:t>
-            </a:r>
-            <a:r>
-              <a:rPr lang="en-US" dirty="0" err="1" smtClean="0"/>
-              <a:t>somesuch</a:t>
-            </a:r>
-            <a:endParaRPr lang="en-US" dirty="0" smtClean="0"/>
-          </a:p>
-          <a:p>
-            <a:pPr lvl="1"/>
-            <a:r>
-              <a:rPr lang="en-US" dirty="0" smtClean="0"/>
-              <a:t>For loop, arithmetic operations, maybe even lists</a:t>
-            </a:r>
-          </a:p>
-          <a:p>
-            <a:r>
-              <a:rPr lang="en-US" dirty="0" smtClean="0"/>
-              <a:t>Something with a defined method and keyword arguments</a:t>
-            </a:r>
-            <a:endParaRPr lang="en-US" dirty="0"/>
+              <a:rPr lang="en-US" b="1" dirty="0"/>
+              <a:t>python loops_example.py</a:t>
+            </a:r>
           </a:p>
         </p:txBody>
       </p:sp>
@@ -6107,11 +6560,7 @@
           <a:p>
             <a:r>
               <a:rPr lang="en-US" dirty="0" smtClean="0"/>
-              <a:t>What is </a:t>
-            </a:r>
-            <a:r>
-              <a:rPr lang="en-US" dirty="0" smtClean="0"/>
-              <a:t>Python good for?</a:t>
+              <a:t>A third short program in Python</a:t>
             </a:r>
             <a:endParaRPr lang="en-US" dirty="0"/>
           </a:p>
@@ -6127,68 +6576,46 @@
             <p:ph idx="1"/>
           </p:nvPr>
         </p:nvSpPr>
-        <p:spPr>
-          <a:xfrm>
-            <a:off x="457200" y="2049270"/>
-            <a:ext cx="8229600" cy="4482159"/>
-          </a:xfrm>
-        </p:spPr>
-        <p:txBody>
-          <a:bodyPr>
-            <a:normAutofit/>
-          </a:bodyPr>
+        <p:spPr/>
+        <p:txBody>
+          <a:bodyPr/>
           <a:lstStyle/>
           <a:p>
             <a:r>
               <a:rPr lang="en-US" dirty="0" smtClean="0"/>
-              <a:t>Development quality of life</a:t>
-            </a:r>
-          </a:p>
-          <a:p>
-            <a:pPr lvl="1"/>
-            <a:r>
-              <a:rPr lang="en-US" dirty="0" smtClean="0"/>
-              <a:t>More time writing easy to read code, quickly</a:t>
-            </a:r>
-          </a:p>
-          <a:p>
-            <a:r>
-              <a:rPr lang="en-US" dirty="0" smtClean="0"/>
-              <a:t>Portability</a:t>
-            </a:r>
-          </a:p>
-          <a:p>
-            <a:pPr lvl="1"/>
-            <a:r>
-              <a:rPr lang="en-US" dirty="0" smtClean="0"/>
-              <a:t>As long as the target has a Python interpreter, we can run Python there!</a:t>
-            </a:r>
-          </a:p>
-          <a:p>
-            <a:r>
-              <a:rPr lang="en-US" dirty="0" smtClean="0"/>
-              <a:t>Rich scientific ecosystem</a:t>
-            </a:r>
-          </a:p>
-          <a:p>
-            <a:pPr lvl="1"/>
-            <a:r>
-              <a:rPr lang="en-US" dirty="0" smtClean="0"/>
-              <a:t>Great libraries exist for most common tasks</a:t>
-            </a:r>
+              <a:t>More complex programs make use of defined functions</a:t>
+            </a:r>
+          </a:p>
+          <a:p>
+            <a:r>
+              <a:rPr lang="en-US" dirty="0" smtClean="0"/>
+              <a:t>Something </a:t>
+            </a:r>
+            <a:r>
+              <a:rPr lang="en-US" dirty="0" smtClean="0"/>
+              <a:t>with a defined method and keyword arguments</a:t>
+            </a:r>
+            <a:endParaRPr lang="en-US" dirty="0"/>
           </a:p>
         </p:txBody>
       </p:sp>
     </p:spTree>
     <p:extLst>
       <p:ext uri="{BB962C8B-B14F-4D97-AF65-F5344CB8AC3E}">
-        <p14:creationId xmlns:p14="http://schemas.microsoft.com/office/powerpoint/2010/main" val="533240533"/>
+        <p14:creationId xmlns:p14="http://schemas.microsoft.com/office/powerpoint/2010/main" val="2542265730"/>
       </p:ext>
     </p:extLst>
   </p:cSld>
   <p:clrMapOvr>
     <a:masterClrMapping/>
   </p:clrMapOvr>
+  <p:timing>
+    <p:tnLst>
+      <p:par>
+        <p:cTn id="1" dur="indefinite" restart="never" nodeType="tmRoot"/>
+      </p:par>
+    </p:tnLst>
+  </p:timing>
 </p:sld>
 </file>
 

</xml_diff>

<commit_message>
Organization of backup material, getting into lists/dicts
</commit_message>
<xml_diff>
--- a/2016/computing_workgroup/intro-to-python/intro-to-python.pptx
+++ b/2016/computing_workgroup/intro-to-python/intro-to-python.pptx
@@ -3472,7 +3472,11 @@
             </a:r>
             <a:r>
               <a:rPr lang="en-US" dirty="0" smtClean="0"/>
-              <a:t>list of values, [1,2,3]</a:t>
+              <a:t>sequence of </a:t>
+            </a:r>
+            <a:r>
+              <a:rPr lang="en-US" dirty="0" smtClean="0"/>
+              <a:t>values, [1,2,3]</a:t>
             </a:r>
           </a:p>
           <a:p>
@@ -3490,7 +3494,11 @@
             </a:r>
             <a:r>
               <a:rPr lang="en-US" dirty="0" smtClean="0"/>
-              <a:t>list of values, (1,2,3)</a:t>
+              <a:t>sequence, </a:t>
+            </a:r>
+            <a:r>
+              <a:rPr lang="en-US" dirty="0" smtClean="0"/>
+              <a:t>(1,2,3)</a:t>
             </a:r>
           </a:p>
           <a:p>
@@ -3926,8 +3934,35 @@
           <a:p>
             <a:r>
               <a:rPr lang="en-US" dirty="0" smtClean="0"/>
+              <a:t>Lists are linear sequences of objects, enumerated from 0.</a:t>
+            </a:r>
+          </a:p>
+          <a:p>
+            <a:r>
+              <a:rPr lang="en-US" dirty="0" smtClean="0"/>
               <a:t>Lists are </a:t>
             </a:r>
+            <a:r>
+              <a:rPr lang="en-US" b="1" dirty="0" smtClean="0"/>
+              <a:t>mutable</a:t>
+            </a:r>
+            <a:r>
+              <a:rPr lang="en-US" dirty="0" smtClean="0"/>
+              <a:t>, meaning they can be changed.  Contrast with </a:t>
+            </a:r>
+            <a:r>
+              <a:rPr lang="en-US" b="1" dirty="0" smtClean="0"/>
+              <a:t>immutable</a:t>
+            </a:r>
+            <a:r>
+              <a:rPr lang="en-US" dirty="0" smtClean="0"/>
+              <a:t> tuples</a:t>
+            </a:r>
+          </a:p>
+          <a:p>
+            <a:pPr marL="0" indent="0">
+              <a:buNone/>
+            </a:pPr>
             <a:endParaRPr lang="en-US" dirty="0"/>
           </a:p>
         </p:txBody>

</xml_diff>

<commit_message>
More content on lists/tuples and misc.
</commit_message>
<xml_diff>
--- a/2016/computing_workgroup/intro-to-python/intro-to-python.pptx
+++ b/2016/computing_workgroup/intro-to-python/intro-to-python.pptx
@@ -5,7 +5,7 @@
     <p:sldMasterId id="2147483648" r:id="rId1"/>
   </p:sldMasterIdLst>
   <p:notesMasterIdLst>
-    <p:notesMasterId r:id="rId26"/>
+    <p:notesMasterId r:id="rId27"/>
   </p:notesMasterIdLst>
   <p:sldIdLst>
     <p:sldId id="355" r:id="rId2"/>
@@ -29,9 +29,10 @@
     <p:sldId id="342" r:id="rId20"/>
     <p:sldId id="341" r:id="rId21"/>
     <p:sldId id="339" r:id="rId22"/>
-    <p:sldId id="340" r:id="rId23"/>
-    <p:sldId id="364" r:id="rId24"/>
-    <p:sldId id="362" r:id="rId25"/>
+    <p:sldId id="366" r:id="rId23"/>
+    <p:sldId id="340" r:id="rId24"/>
+    <p:sldId id="364" r:id="rId25"/>
+    <p:sldId id="362" r:id="rId26"/>
   </p:sldIdLst>
   <p:sldSz cx="9144000" cy="6858000" type="screen4x3"/>
   <p:notesSz cx="6858000" cy="9144000"/>
@@ -2816,6 +2817,13 @@
   <p:clrMapOvr>
     <a:masterClrMapping/>
   </p:clrMapOvr>
+  <p:timing>
+    <p:tnLst>
+      <p:par>
+        <p:cTn id="1" dur="indefinite" restart="never" nodeType="tmRoot"/>
+      </p:par>
+    </p:tnLst>
+  </p:timing>
 </p:sld>
 </file>
 
@@ -3472,11 +3480,7 @@
             </a:r>
             <a:r>
               <a:rPr lang="en-US" dirty="0" smtClean="0"/>
-              <a:t>sequence of </a:t>
-            </a:r>
-            <a:r>
-              <a:rPr lang="en-US" dirty="0" smtClean="0"/>
-              <a:t>values, [1,2,3]</a:t>
+              <a:t>sequence of values, [1,2,3]</a:t>
             </a:r>
           </a:p>
           <a:p>
@@ -3494,11 +3498,7 @@
             </a:r>
             <a:r>
               <a:rPr lang="en-US" dirty="0" smtClean="0"/>
-              <a:t>sequence, </a:t>
-            </a:r>
-            <a:r>
-              <a:rPr lang="en-US" dirty="0" smtClean="0"/>
-              <a:t>(1,2,3)</a:t>
+              <a:t>sequence, (1,2,3)</a:t>
             </a:r>
           </a:p>
           <a:p>
@@ -3911,7 +3911,7 @@
           <a:p>
             <a:r>
               <a:rPr lang="en-US" dirty="0" smtClean="0"/>
-              <a:t>Lists</a:t>
+              <a:t>Lists and tuples</a:t>
             </a:r>
             <a:endParaRPr lang="en-US" dirty="0"/>
           </a:p>
@@ -3934,7 +3934,15 @@
           <a:p>
             <a:r>
               <a:rPr lang="en-US" dirty="0" smtClean="0"/>
-              <a:t>Lists are linear sequences of objects, enumerated from 0.</a:t>
+              <a:t>Lists </a:t>
+            </a:r>
+            <a:r>
+              <a:rPr lang="en-US" dirty="0" smtClean="0"/>
+              <a:t>and tuples are </a:t>
+            </a:r>
+            <a:r>
+              <a:rPr lang="en-US" dirty="0" smtClean="0"/>
+              <a:t>linear sequences of objects, enumerated from 0.</a:t>
             </a:r>
           </a:p>
           <a:p>
@@ -3956,8 +3964,20 @@
             </a:r>
             <a:r>
               <a:rPr lang="en-US" dirty="0" smtClean="0"/>
-              <a:t> tuples</a:t>
-            </a:r>
+              <a:t> </a:t>
+            </a:r>
+            <a:r>
+              <a:rPr lang="en-US" dirty="0" smtClean="0"/>
+              <a:t>tuples.</a:t>
+            </a:r>
+          </a:p>
+          <a:p>
+            <a:pPr lvl="1"/>
+            <a:r>
+              <a:rPr lang="en-US" dirty="0" smtClean="0"/>
+              <a:t>Once a tuple is created, it never changes!</a:t>
+            </a:r>
+            <a:endParaRPr lang="en-US" dirty="0" smtClean="0"/>
           </a:p>
           <a:p>
             <a:pPr marL="0" indent="0">
@@ -3977,6 +3997,13 @@
   <p:clrMapOvr>
     <a:masterClrMapping/>
   </p:clrMapOvr>
+  <p:timing>
+    <p:tnLst>
+      <p:par>
+        <p:cTn id="1" dur="indefinite" restart="never" nodeType="tmRoot"/>
+      </p:par>
+    </p:tnLst>
+  </p:timing>
 </p:sld>
 </file>
 
@@ -4032,7 +4059,9 @@
         </p:nvSpPr>
         <p:spPr/>
         <p:txBody>
-          <a:bodyPr/>
+          <a:bodyPr>
+            <a:normAutofit fontScale="92500" lnSpcReduction="10000"/>
+          </a:bodyPr>
           <a:lstStyle/>
           <a:p>
             <a:r>
@@ -4045,8 +4074,20 @@
             </a:r>
             <a:r>
               <a:rPr lang="en-US" dirty="0" smtClean="0"/>
-              <a:t>, Print Loop)</a:t>
-            </a:r>
+              <a:t>, Print Loop</a:t>
+            </a:r>
+            <a:r>
+              <a:rPr lang="en-US" dirty="0" smtClean="0"/>
+              <a:t>)</a:t>
+            </a:r>
+          </a:p>
+          <a:p>
+            <a:pPr lvl="1"/>
+            <a:r>
+              <a:rPr lang="en-US" dirty="0" smtClean="0"/>
+              <a:t>Repl.it</a:t>
+            </a:r>
+            <a:endParaRPr lang="en-US" dirty="0" smtClean="0"/>
           </a:p>
           <a:p>
             <a:pPr lvl="1"/>
@@ -4520,6 +4561,13 @@
   <p:clrMapOvr>
     <a:masterClrMapping/>
   </p:clrMapOvr>
+  <p:timing>
+    <p:tnLst>
+      <p:par>
+        <p:cTn id="1" dur="indefinite" restart="never" nodeType="tmRoot"/>
+      </p:par>
+    </p:tnLst>
+  </p:timing>
 </p:sld>
 </file>
 
@@ -4580,8 +4628,13 @@
           <a:p>
             <a:r>
               <a:rPr lang="en-US" dirty="0" smtClean="0"/>
-              <a:t>Integer division</a:t>
-            </a:r>
+              <a:t>Integer </a:t>
+            </a:r>
+            <a:r>
+              <a:rPr lang="en-US" dirty="0" smtClean="0"/>
+              <a:t>division doesn’t do the intuitive thing in Python 2</a:t>
+            </a:r>
+            <a:endParaRPr lang="en-US" dirty="0" smtClean="0"/>
           </a:p>
           <a:p>
             <a:r>
@@ -4620,7 +4673,7 @@
         </p:blipFill>
         <p:spPr>
           <a:xfrm>
-            <a:off x="1523574" y="4087716"/>
+            <a:off x="1523574" y="4323996"/>
             <a:ext cx="6096851" cy="2534004"/>
           </a:xfrm>
           <a:prstGeom prst="rect">
@@ -5243,33 +5296,115 @@
         </p:nvSpPr>
         <p:spPr/>
         <p:txBody>
-          <a:bodyPr/>
+          <a:bodyPr>
+            <a:normAutofit/>
+          </a:bodyPr>
           <a:lstStyle/>
           <a:p>
             <a:r>
               <a:rPr lang="en-US" b="1" dirty="0" err="1" smtClean="0"/>
-              <a:t>Scipy</a:t>
-            </a:r>
-            <a:r>
-              <a:rPr lang="en-US" b="1" dirty="0" smtClean="0"/>
-              <a:t> </a:t>
-            </a:r>
-            <a:r>
-              <a:rPr lang="en-US" b="1" dirty="0" smtClean="0"/>
-              <a:t>lectures</a:t>
-            </a:r>
-            <a:r>
-              <a:rPr lang="en-US" dirty="0" smtClean="0"/>
+              <a:t>CodeAcademy</a:t>
+            </a:r>
+            <a:r>
+              <a:rPr lang="en-US" b="1" dirty="0"/>
               <a:t/>
             </a:r>
             <a:br>
-              <a:rPr lang="en-US" dirty="0" smtClean="0"/>
+              <a:rPr lang="en-US" b="1" dirty="0"/>
             </a:br>
             <a:r>
               <a:rPr lang="en-US" dirty="0" smtClean="0">
                 <a:hlinkClick r:id="rId2"/>
               </a:rPr>
-              <a:t>https://scipy-lectures.github.io/</a:t>
+              <a:t>https</a:t>
+            </a:r>
+            <a:r>
+              <a:rPr lang="en-US" dirty="0">
+                <a:hlinkClick r:id="rId2"/>
+              </a:rPr>
+              <a:t>://</a:t>
+            </a:r>
+            <a:r>
+              <a:rPr lang="en-US" dirty="0" smtClean="0">
+                <a:hlinkClick r:id="rId2"/>
+              </a:rPr>
+              <a:t>www.codecademy.com/learn/python</a:t>
+            </a:r>
+            <a:r>
+              <a:rPr lang="en-US" dirty="0" smtClean="0"/>
+              <a:t> </a:t>
+            </a:r>
+            <a:endParaRPr lang="en-US" b="1" dirty="0" smtClean="0"/>
+          </a:p>
+          <a:p>
+            <a:r>
+              <a:rPr lang="en-US" b="1" dirty="0" err="1" smtClean="0"/>
+              <a:t>Scipy</a:t>
+            </a:r>
+            <a:r>
+              <a:rPr lang="en-US" b="1" dirty="0" smtClean="0"/>
+              <a:t> lectures</a:t>
+            </a:r>
+            <a:br>
+              <a:rPr lang="en-US" b="1" dirty="0" smtClean="0"/>
+            </a:br>
+            <a:r>
+              <a:rPr lang="en-US" dirty="0" smtClean="0">
+                <a:hlinkClick r:id="rId3"/>
+              </a:rPr>
+              <a:t>https</a:t>
+            </a:r>
+            <a:r>
+              <a:rPr lang="en-US" dirty="0" smtClean="0">
+                <a:hlinkClick r:id="rId3"/>
+              </a:rPr>
+              <a:t>://scipy-lectures.github.io</a:t>
+            </a:r>
+            <a:r>
+              <a:rPr lang="en-US" dirty="0" smtClean="0">
+                <a:hlinkClick r:id="rId3"/>
+              </a:rPr>
+              <a:t>/</a:t>
+            </a:r>
+            <a:endParaRPr lang="en-US" dirty="0" smtClean="0"/>
+          </a:p>
+          <a:p>
+            <a:r>
+              <a:rPr lang="en-US" dirty="0" smtClean="0"/>
+              <a:t>A long list of other resources available on GitHub, along with </a:t>
+            </a:r>
+            <a:r>
+              <a:rPr lang="en-US" dirty="0"/>
+              <a:t>this </a:t>
+            </a:r>
+            <a:r>
+              <a:rPr lang="en-US" dirty="0" smtClean="0"/>
+              <a:t>presentation:</a:t>
+            </a:r>
+            <a:br>
+              <a:rPr lang="en-US" dirty="0" smtClean="0"/>
+            </a:br>
+            <a:r>
+              <a:rPr lang="en-US" dirty="0" smtClean="0">
+                <a:hlinkClick r:id="rId4"/>
+              </a:rPr>
+              <a:t>https</a:t>
+            </a:r>
+            <a:r>
+              <a:rPr lang="en-US" dirty="0">
+                <a:hlinkClick r:id="rId4"/>
+              </a:rPr>
+              <a:t>://</a:t>
+            </a:r>
+            <a:r>
+              <a:rPr lang="en-US" dirty="0" smtClean="0">
+                <a:hlinkClick r:id="rId4"/>
+              </a:rPr>
+              <a:t>github.com/jgerity/talks</a:t>
+            </a:r>
+            <a:r>
+              <a:rPr lang="en-US" dirty="0" smtClean="0"/>
+              <a:t> </a:t>
             </a:r>
             <a:endParaRPr lang="en-US" dirty="0" smtClean="0"/>
           </a:p>
@@ -5285,6 +5420,13 @@
   <p:clrMapOvr>
     <a:masterClrMapping/>
   </p:clrMapOvr>
+  <p:timing>
+    <p:tnLst>
+      <p:par>
+        <p:cTn id="1" dur="indefinite" restart="never" nodeType="tmRoot"/>
+      </p:par>
+    </p:tnLst>
+  </p:timing>
 </p:sld>
 </file>
 
@@ -5343,6 +5485,13 @@
   <p:clrMapOvr>
     <a:masterClrMapping/>
   </p:clrMapOvr>
+  <p:timing>
+    <p:tnLst>
+      <p:par>
+        <p:cTn id="1" dur="indefinite" restart="never" nodeType="tmRoot"/>
+      </p:par>
+    </p:tnLst>
+  </p:timing>
 </p:sld>
 </file>
 
@@ -5373,37 +5522,20 @@
             <p:ph type="title"/>
           </p:nvPr>
         </p:nvSpPr>
-        <p:spPr/>
+        <p:spPr>
+          <a:xfrm>
+            <a:off x="457200" y="2874722"/>
+            <a:ext cx="8229600" cy="803756"/>
+          </a:xfrm>
+        </p:spPr>
         <p:txBody>
           <a:bodyPr/>
           <a:lstStyle/>
           <a:p>
             <a:r>
               <a:rPr lang="en-US" dirty="0" smtClean="0"/>
-              <a:t>Backup Slides</a:t>
-            </a:r>
-            <a:endParaRPr lang="en-US" dirty="0"/>
-          </a:p>
-        </p:txBody>
-      </p:sp>
-      <p:sp>
-        <p:nvSpPr>
-          <p:cNvPr id="3" name="Content Placeholder 2"/>
-          <p:cNvSpPr>
-            <a:spLocks noGrp="1"/>
-          </p:cNvSpPr>
-          <p:nvPr>
-            <p:ph idx="1"/>
-          </p:nvPr>
-        </p:nvSpPr>
-        <p:spPr/>
-        <p:txBody>
-          <a:bodyPr/>
-          <a:lstStyle/>
-          <a:p>
-            <a:pPr marL="0" indent="0">
-              <a:buNone/>
-            </a:pPr>
+              <a:t>Feedback?</a:t>
+            </a:r>
             <a:endParaRPr lang="en-US" dirty="0"/>
           </a:p>
         </p:txBody>
@@ -5411,7 +5543,7 @@
     </p:spTree>
     <p:extLst>
       <p:ext uri="{BB962C8B-B14F-4D97-AF65-F5344CB8AC3E}">
-        <p14:creationId xmlns:p14="http://schemas.microsoft.com/office/powerpoint/2010/main" val="1589961851"/>
+        <p14:creationId xmlns:p14="http://schemas.microsoft.com/office/powerpoint/2010/main" val="891265136"/>
       </p:ext>
     </p:extLst>
   </p:cSld>
@@ -5462,7 +5594,7 @@
           <a:p>
             <a:r>
               <a:rPr lang="en-US" dirty="0" smtClean="0"/>
-              <a:t>First class functions</a:t>
+              <a:t>Backup Slides</a:t>
             </a:r>
             <a:endParaRPr lang="en-US" dirty="0"/>
           </a:p>
@@ -5483,6 +5615,88 @@
           <a:bodyPr/>
           <a:lstStyle/>
           <a:p>
+            <a:pPr marL="0" indent="0">
+              <a:buNone/>
+            </a:pPr>
+            <a:endParaRPr lang="en-US" dirty="0"/>
+          </a:p>
+        </p:txBody>
+      </p:sp>
+    </p:spTree>
+    <p:extLst>
+      <p:ext uri="{BB962C8B-B14F-4D97-AF65-F5344CB8AC3E}">
+        <p14:creationId xmlns:p14="http://schemas.microsoft.com/office/powerpoint/2010/main" val="1589961851"/>
+      </p:ext>
+    </p:extLst>
+  </p:cSld>
+  <p:clrMapOvr>
+    <a:masterClrMapping/>
+  </p:clrMapOvr>
+  <p:timing>
+    <p:tnLst>
+      <p:par>
+        <p:cTn id="1" dur="indefinite" restart="never" nodeType="tmRoot"/>
+      </p:par>
+    </p:tnLst>
+  </p:timing>
+</p:sld>
+</file>
+
+<file path=ppt/slides/slide24.xml><?xml version="1.0" encoding="utf-8"?>
+<p:sld xmlns:a="http://schemas.openxmlformats.org/drawingml/2006/main" xmlns:r="http://schemas.openxmlformats.org/officeDocument/2006/relationships" xmlns:p="http://schemas.openxmlformats.org/presentationml/2006/main">
+  <p:cSld>
+    <p:spTree>
+      <p:nvGrpSpPr>
+        <p:cNvPr id="1" name=""/>
+        <p:cNvGrpSpPr/>
+        <p:nvPr/>
+      </p:nvGrpSpPr>
+      <p:grpSpPr>
+        <a:xfrm>
+          <a:off x="0" y="0"/>
+          <a:ext cx="0" cy="0"/>
+          <a:chOff x="0" y="0"/>
+          <a:chExt cx="0" cy="0"/>
+        </a:xfrm>
+      </p:grpSpPr>
+      <p:sp>
+        <p:nvSpPr>
+          <p:cNvPr id="2" name="Title 1"/>
+          <p:cNvSpPr>
+            <a:spLocks noGrp="1"/>
+          </p:cNvSpPr>
+          <p:nvPr>
+            <p:ph type="title"/>
+          </p:nvPr>
+        </p:nvSpPr>
+        <p:spPr/>
+        <p:txBody>
+          <a:bodyPr/>
+          <a:lstStyle/>
+          <a:p>
+            <a:r>
+              <a:rPr lang="en-US" dirty="0" smtClean="0"/>
+              <a:t>First class functions</a:t>
+            </a:r>
+            <a:endParaRPr lang="en-US" dirty="0"/>
+          </a:p>
+        </p:txBody>
+      </p:sp>
+      <p:sp>
+        <p:nvSpPr>
+          <p:cNvPr id="3" name="Content Placeholder 2"/>
+          <p:cNvSpPr>
+            <a:spLocks noGrp="1"/>
+          </p:cNvSpPr>
+          <p:nvPr>
+            <p:ph idx="1"/>
+          </p:nvPr>
+        </p:nvSpPr>
+        <p:spPr/>
+        <p:txBody>
+          <a:bodyPr/>
+          <a:lstStyle/>
+          <a:p>
             <a:r>
               <a:rPr lang="en-US" dirty="0" smtClean="0"/>
               <a:t>Functions in Python are </a:t>
@@ -5501,7 +5715,6 @@
               <a:rPr lang="en-US" dirty="0" smtClean="0"/>
               <a:t>This allows </a:t>
             </a:r>
-            <a:endParaRPr lang="en-US" dirty="0" smtClean="0"/>
           </a:p>
           <a:p>
             <a:r>
@@ -5540,7 +5753,7 @@
 </p:sld>
 </file>
 
-<file path=ppt/slides/slide24.xml><?xml version="1.0" encoding="utf-8"?>
+<file path=ppt/slides/slide25.xml><?xml version="1.0" encoding="utf-8"?>
 <p:sld xmlns:a="http://schemas.openxmlformats.org/drawingml/2006/main" xmlns:r="http://schemas.openxmlformats.org/officeDocument/2006/relationships" xmlns:p="http://schemas.openxmlformats.org/presentationml/2006/main">
   <p:cSld>
     <p:spTree>
@@ -5780,7 +5993,17 @@
           <a:p>
             <a:r>
               <a:rPr lang="en-US" dirty="0" smtClean="0"/>
-              <a:t>More things to say than will fit in this talk, see the list of notes and reading material online.</a:t>
+              <a:t>More things to say than will fit in this talk, see the list of notes and reading material online</a:t>
+            </a:r>
+            <a:r>
+              <a:rPr lang="en-US" dirty="0" smtClean="0"/>
+              <a:t>.</a:t>
+            </a:r>
+          </a:p>
+          <a:p>
+            <a:r>
+              <a:rPr lang="en-US" dirty="0" smtClean="0"/>
+              <a:t>Programming is most rewarding as an auto-didactic process!</a:t>
             </a:r>
             <a:endParaRPr lang="en-US" dirty="0"/>
           </a:p>
@@ -5892,6 +6115,13 @@
   <p:clrMapOvr>
     <a:masterClrMapping/>
   </p:clrMapOvr>
+  <p:timing>
+    <p:tnLst>
+      <p:par>
+        <p:cTn id="1" dur="indefinite" restart="never" nodeType="tmRoot"/>
+      </p:par>
+    </p:tnLst>
+  </p:timing>
 </p:sld>
 </file>
 
@@ -6030,6 +6260,13 @@
   <p:clrMapOvr>
     <a:masterClrMapping/>
   </p:clrMapOvr>
+  <p:timing>
+    <p:tnLst>
+      <p:par>
+        <p:cTn id="1" dur="indefinite" restart="never" nodeType="tmRoot"/>
+      </p:par>
+    </p:tnLst>
+  </p:timing>
 </p:sld>
 </file>
 
@@ -6536,8 +6773,31 @@
           <a:p>
             <a:r>
               <a:rPr lang="en-US" b="1" dirty="0"/>
-              <a:t>python loops_example.py</a:t>
-            </a:r>
+              <a:t>python </a:t>
+            </a:r>
+            <a:r>
+              <a:rPr lang="en-US" b="1" dirty="0" smtClean="0"/>
+              <a:t>loops_example.py</a:t>
+            </a:r>
+          </a:p>
+          <a:p>
+            <a:r>
+              <a:rPr lang="en-US" dirty="0"/>
+              <a:t>See online at </a:t>
+            </a:r>
+            <a:r>
+              <a:rPr lang="en-US" dirty="0">
+                <a:hlinkClick r:id="rId2"/>
+              </a:rPr>
+              <a:t>https://</a:t>
+            </a:r>
+            <a:r>
+              <a:rPr lang="en-US" dirty="0" smtClean="0">
+                <a:hlinkClick r:id="rId2"/>
+              </a:rPr>
+              <a:t>repl.it/DEQG</a:t>
+            </a:r>
+            <a:endParaRPr lang="en-US" dirty="0" smtClean="0"/>
           </a:p>
         </p:txBody>
       </p:sp>
@@ -6618,19 +6878,50 @@
           <a:p>
             <a:r>
               <a:rPr lang="en-US" dirty="0" smtClean="0"/>
-              <a:t>More complex programs make use of defined functions</a:t>
-            </a:r>
-          </a:p>
-          <a:p>
-            <a:r>
-              <a:rPr lang="en-US" dirty="0" smtClean="0"/>
-              <a:t>Something </a:t>
-            </a:r>
-            <a:r>
-              <a:rPr lang="en-US" dirty="0" smtClean="0"/>
-              <a:t>with a defined method and keyword arguments</a:t>
+              <a:t>More complex programs make use of defined </a:t>
+            </a:r>
+            <a:r>
+              <a:rPr lang="en-US" dirty="0" smtClean="0"/>
+              <a:t>functions</a:t>
             </a:r>
             <a:endParaRPr lang="en-US" dirty="0"/>
+          </a:p>
+          <a:p>
+            <a:r>
+              <a:rPr lang="en-US" b="1" dirty="0" smtClean="0"/>
+              <a:t>python –</a:t>
+            </a:r>
+            <a:r>
+              <a:rPr lang="en-US" b="1" dirty="0" err="1" smtClean="0"/>
+              <a:t>i</a:t>
+            </a:r>
+            <a:r>
+              <a:rPr lang="en-US" b="1" dirty="0" smtClean="0"/>
+              <a:t> functions_example.py</a:t>
+            </a:r>
+          </a:p>
+          <a:p>
+            <a:r>
+              <a:rPr lang="en-US" dirty="0"/>
+              <a:t>See online at </a:t>
+            </a:r>
+            <a:r>
+              <a:rPr lang="en-US" dirty="0">
+                <a:hlinkClick r:id="rId2"/>
+              </a:rPr>
+              <a:t>https://</a:t>
+            </a:r>
+            <a:r>
+              <a:rPr lang="en-US" dirty="0" smtClean="0">
+                <a:hlinkClick r:id="rId2"/>
+              </a:rPr>
+              <a:t>repl.it/DJhr</a:t>
+            </a:r>
+            <a:r>
+              <a:rPr lang="en-US" dirty="0" smtClean="0"/>
+              <a:t> </a:t>
+            </a:r>
+            <a:endParaRPr lang="en-US" dirty="0" smtClean="0"/>
           </a:p>
         </p:txBody>
       </p:sp>

</xml_diff>

<commit_message>
Examples of basic types and associated operations
</commit_message>
<xml_diff>
--- a/2016/computing_workgroup/intro-to-python/intro-to-python.pptx
+++ b/2016/computing_workgroup/intro-to-python/intro-to-python.pptx
@@ -4060,7 +4060,7 @@
         <p:spPr/>
         <p:txBody>
           <a:bodyPr>
-            <a:normAutofit fontScale="92500" lnSpcReduction="10000"/>
+            <a:normAutofit/>
           </a:bodyPr>
           <a:lstStyle/>
           <a:p>
@@ -4084,55 +4084,36 @@
           <a:p>
             <a:pPr lvl="1"/>
             <a:r>
-              <a:rPr lang="en-US" dirty="0" smtClean="0"/>
-              <a:t>Repl.it</a:t>
+              <a:rPr lang="en-US" b="1" smtClean="0"/>
+              <a:t>python basictypes_example.py</a:t>
+            </a:r>
+            <a:endParaRPr lang="en-US" b="1" dirty="0" smtClean="0"/>
+          </a:p>
+          <a:p>
+            <a:pPr lvl="1"/>
+            <a:r>
+              <a:rPr lang="en-US" dirty="0" smtClean="0">
+                <a:hlinkClick r:id="rId2"/>
+              </a:rPr>
+              <a:t>https</a:t>
+            </a:r>
+            <a:r>
+              <a:rPr lang="en-US" dirty="0">
+                <a:hlinkClick r:id="rId2"/>
+              </a:rPr>
+              <a:t>://</a:t>
+            </a:r>
+            <a:r>
+              <a:rPr lang="en-US" dirty="0" smtClean="0">
+                <a:hlinkClick r:id="rId2"/>
+              </a:rPr>
+              <a:t>repl.it/DJv9</a:t>
+            </a:r>
+            <a:r>
+              <a:rPr lang="en-US" dirty="0" smtClean="0"/>
+              <a:t> </a:t>
             </a:r>
             <a:endParaRPr lang="en-US" dirty="0" smtClean="0"/>
-          </a:p>
-          <a:p>
-            <a:pPr lvl="1"/>
-            <a:r>
-              <a:rPr lang="en-US" dirty="0" smtClean="0"/>
-              <a:t>Each of the types previously listed, one basic operation with each</a:t>
-            </a:r>
-          </a:p>
-          <a:p>
-            <a:pPr lvl="1"/>
-            <a:r>
-              <a:rPr lang="en-US" dirty="0" smtClean="0"/>
-              <a:t>List/</a:t>
-            </a:r>
-            <a:r>
-              <a:rPr lang="en-US" dirty="0" err="1" smtClean="0"/>
-              <a:t>dict</a:t>
-            </a:r>
-            <a:r>
-              <a:rPr lang="en-US" dirty="0" smtClean="0"/>
-              <a:t> comprehension examples</a:t>
-            </a:r>
-          </a:p>
-          <a:p>
-            <a:pPr lvl="1"/>
-            <a:r>
-              <a:rPr lang="en-US" dirty="0" smtClean="0"/>
-              <a:t>Sorting simple numeric list</a:t>
-            </a:r>
-          </a:p>
-          <a:p>
-            <a:pPr lvl="1"/>
-            <a:r>
-              <a:rPr lang="en-US" dirty="0" smtClean="0"/>
-              <a:t>Using help() and </a:t>
-            </a:r>
-            <a:r>
-              <a:rPr lang="en-US" dirty="0" err="1" smtClean="0"/>
-              <a:t>dir</a:t>
-            </a:r>
-            <a:r>
-              <a:rPr lang="en-US" dirty="0" smtClean="0"/>
-              <a:t>() for a few types</a:t>
-            </a:r>
-            <a:endParaRPr lang="en-US" dirty="0"/>
           </a:p>
         </p:txBody>
       </p:sp>

</xml_diff>

<commit_message>
First version I'd feel comfortable giving in front of anyone
</commit_message>
<xml_diff>
--- a/2016/computing_workgroup/intro-to-python/intro-to-python.pptx
+++ b/2016/computing_workgroup/intro-to-python/intro-to-python.pptx
@@ -5,34 +5,38 @@
     <p:sldMasterId id="2147483648" r:id="rId1"/>
   </p:sldMasterIdLst>
   <p:notesMasterIdLst>
-    <p:notesMasterId r:id="rId27"/>
+    <p:notesMasterId r:id="rId31"/>
   </p:notesMasterIdLst>
   <p:sldIdLst>
-    <p:sldId id="355" r:id="rId2"/>
-    <p:sldId id="256" r:id="rId3"/>
-    <p:sldId id="352" r:id="rId4"/>
-    <p:sldId id="343" r:id="rId5"/>
-    <p:sldId id="350" r:id="rId6"/>
-    <p:sldId id="349" r:id="rId7"/>
-    <p:sldId id="360" r:id="rId8"/>
-    <p:sldId id="345" r:id="rId9"/>
-    <p:sldId id="361" r:id="rId10"/>
-    <p:sldId id="351" r:id="rId11"/>
-    <p:sldId id="353" r:id="rId12"/>
-    <p:sldId id="357" r:id="rId13"/>
-    <p:sldId id="356" r:id="rId14"/>
-    <p:sldId id="365" r:id="rId15"/>
-    <p:sldId id="358" r:id="rId16"/>
-    <p:sldId id="359" r:id="rId17"/>
-    <p:sldId id="346" r:id="rId18"/>
-    <p:sldId id="363" r:id="rId19"/>
-    <p:sldId id="342" r:id="rId20"/>
-    <p:sldId id="341" r:id="rId21"/>
-    <p:sldId id="339" r:id="rId22"/>
-    <p:sldId id="366" r:id="rId23"/>
-    <p:sldId id="340" r:id="rId24"/>
-    <p:sldId id="364" r:id="rId25"/>
-    <p:sldId id="362" r:id="rId26"/>
+    <p:sldId id="256" r:id="rId2"/>
+    <p:sldId id="352" r:id="rId3"/>
+    <p:sldId id="343" r:id="rId4"/>
+    <p:sldId id="350" r:id="rId5"/>
+    <p:sldId id="349" r:id="rId6"/>
+    <p:sldId id="360" r:id="rId7"/>
+    <p:sldId id="345" r:id="rId8"/>
+    <p:sldId id="361" r:id="rId9"/>
+    <p:sldId id="351" r:id="rId10"/>
+    <p:sldId id="353" r:id="rId11"/>
+    <p:sldId id="357" r:id="rId12"/>
+    <p:sldId id="356" r:id="rId13"/>
+    <p:sldId id="365" r:id="rId14"/>
+    <p:sldId id="358" r:id="rId15"/>
+    <p:sldId id="359" r:id="rId16"/>
+    <p:sldId id="346" r:id="rId17"/>
+    <p:sldId id="363" r:id="rId18"/>
+    <p:sldId id="342" r:id="rId19"/>
+    <p:sldId id="370" r:id="rId20"/>
+    <p:sldId id="371" r:id="rId21"/>
+    <p:sldId id="368" r:id="rId22"/>
+    <p:sldId id="367" r:id="rId23"/>
+    <p:sldId id="369" r:id="rId24"/>
+    <p:sldId id="341" r:id="rId25"/>
+    <p:sldId id="339" r:id="rId26"/>
+    <p:sldId id="366" r:id="rId27"/>
+    <p:sldId id="340" r:id="rId28"/>
+    <p:sldId id="364" r:id="rId29"/>
+    <p:sldId id="362" r:id="rId30"/>
   </p:sldIdLst>
   <p:sldSz cx="9144000" cy="6858000" type="screen4x3"/>
   <p:notesSz cx="6858000" cy="9144000"/>
@@ -565,7 +569,7 @@
           <a:p>
             <a:fld id="{27D32F87-7895-4624-A4AE-ACD3588F6EDE}" type="slidenum">
               <a:rPr lang="en-US" smtClean="0"/>
-              <a:t>2</a:t>
+              <a:t>1</a:t>
             </a:fld>
             <a:endParaRPr lang="en-US"/>
           </a:p>
@@ -2586,6 +2590,24 @@
 <file path=ppt/slides/slide1.xml><?xml version="1.0" encoding="utf-8"?>
 <p:sld xmlns:a="http://schemas.openxmlformats.org/drawingml/2006/main" xmlns:r="http://schemas.openxmlformats.org/officeDocument/2006/relationships" xmlns:p="http://schemas.openxmlformats.org/presentationml/2006/main">
   <p:cSld>
+    <p:bg>
+      <p:bgPr>
+        <a:gradFill>
+          <a:gsLst>
+            <a:gs pos="0">
+              <a:srgbClr val="500000">
+                <a:lumMod val="16000"/>
+              </a:srgbClr>
+            </a:gs>
+            <a:gs pos="100000">
+              <a:srgbClr val="540000"/>
+            </a:gs>
+          </a:gsLst>
+          <a:lin ang="2700000" scaled="0"/>
+        </a:gradFill>
+        <a:effectLst/>
+      </p:bgPr>
+    </p:bg>
     <p:spTree>
       <p:nvGrpSpPr>
         <p:cNvPr id="1" name=""/>
@@ -2607,88 +2629,490 @@
             <a:spLocks noGrp="1"/>
           </p:cNvSpPr>
           <p:nvPr>
-            <p:ph type="title"/>
-          </p:nvPr>
-        </p:nvSpPr>
-        <p:spPr/>
-        <p:txBody>
-          <a:bodyPr/>
+            <p:ph type="ctrTitle"/>
+          </p:nvPr>
+        </p:nvSpPr>
+        <p:spPr>
+          <a:xfrm>
+            <a:off x="1830864" y="2227031"/>
+            <a:ext cx="5361690" cy="1755957"/>
+          </a:xfrm>
+        </p:spPr>
+        <p:txBody>
+          <a:bodyPr>
+            <a:normAutofit/>
+          </a:bodyPr>
           <a:lstStyle/>
           <a:p>
-            <a:r>
-              <a:rPr lang="en-US" dirty="0" smtClean="0"/>
-              <a:t>Before the talk</a:t>
-            </a:r>
-            <a:endParaRPr lang="en-US" dirty="0"/>
-          </a:p>
-        </p:txBody>
-      </p:sp>
-      <p:sp>
-        <p:nvSpPr>
-          <p:cNvPr id="3" name="Content Placeholder 2"/>
-          <p:cNvSpPr>
-            <a:spLocks noGrp="1"/>
-          </p:cNvSpPr>
-          <p:nvPr>
-            <p:ph idx="1"/>
-          </p:nvPr>
-        </p:nvSpPr>
-        <p:spPr/>
-        <p:txBody>
-          <a:bodyPr/>
+            <a:pPr algn="ctr"/>
+            <a:r>
+              <a:rPr lang="en-US" sz="2800" dirty="0" smtClean="0">
+                <a:latin typeface="Miriam" panose="020B0502050101010101" pitchFamily="34" charset="-79"/>
+                <a:cs typeface="Miriam" panose="020B0502050101010101" pitchFamily="34" charset="-79"/>
+              </a:rPr>
+              <a:t>Introduction to Python</a:t>
+            </a:r>
+            <a:endParaRPr lang="en-US" sz="2800" dirty="0">
+              <a:latin typeface="Miriam" panose="020B0502050101010101" pitchFamily="34" charset="-79"/>
+              <a:cs typeface="Miriam" panose="020B0502050101010101" pitchFamily="34" charset="-79"/>
+            </a:endParaRPr>
+          </a:p>
+        </p:txBody>
+      </p:sp>
+      <p:sp>
+        <p:nvSpPr>
+          <p:cNvPr id="3" name="Subtitle 2"/>
+          <p:cNvSpPr>
+            <a:spLocks noGrp="1"/>
+          </p:cNvSpPr>
+          <p:nvPr>
+            <p:ph type="subTitle" idx="1"/>
+          </p:nvPr>
+        </p:nvSpPr>
+        <p:spPr>
+          <a:xfrm>
+            <a:off x="3427069" y="3537793"/>
+            <a:ext cx="2169279" cy="388814"/>
+          </a:xfrm>
+        </p:spPr>
+        <p:txBody>
+          <a:bodyPr>
+            <a:normAutofit lnSpcReduction="10000"/>
+          </a:bodyPr>
           <a:lstStyle/>
           <a:p>
-            <a:r>
-              <a:rPr lang="en-US" dirty="0" smtClean="0"/>
-              <a:t>To follow along with the interactive portions of this talk, you need:</a:t>
-            </a:r>
-            <a:endParaRPr lang="en-US" dirty="0"/>
-          </a:p>
-          <a:p>
-            <a:pPr lvl="1"/>
-            <a:r>
-              <a:rPr lang="en-US" dirty="0" smtClean="0"/>
-              <a:t>A copy </a:t>
-            </a:r>
-            <a:r>
-              <a:rPr lang="en-US" dirty="0"/>
-              <a:t>of Python: </a:t>
-            </a:r>
-            <a:r>
-              <a:rPr lang="en-US" dirty="0">
-                <a:hlinkClick r:id="rId2"/>
+            <a:pPr algn="ctr"/>
+            <a:r>
+              <a:rPr lang="en-US" sz="2000" dirty="0" smtClean="0">
+                <a:latin typeface="Miriam" panose="020B0502050101010101" pitchFamily="34" charset="-79"/>
+                <a:cs typeface="Miriam" panose="020B0502050101010101" pitchFamily="34" charset="-79"/>
               </a:rPr>
-              <a:t>https://www.python.org</a:t>
-            </a:r>
-            <a:r>
-              <a:rPr lang="en-US" dirty="0" smtClean="0">
-                <a:hlinkClick r:id="rId2"/>
+              <a:t>James </a:t>
+            </a:r>
+            <a:r>
+              <a:rPr lang="en-US" sz="2000" dirty="0" err="1" smtClean="0">
+                <a:latin typeface="Miriam" panose="020B0502050101010101" pitchFamily="34" charset="-79"/>
+                <a:cs typeface="Miriam" panose="020B0502050101010101" pitchFamily="34" charset="-79"/>
               </a:rPr>
-              <a:t>/</a:t>
-            </a:r>
-            <a:endParaRPr lang="en-US" dirty="0" smtClean="0"/>
-          </a:p>
-          <a:p>
-            <a:pPr lvl="2"/>
-            <a:r>
-              <a:rPr lang="en-US" dirty="0" smtClean="0"/>
-              <a:t>All examples shown will be compatible with either Python 2.7 or Python 3.x, use either</a:t>
-            </a:r>
-          </a:p>
-          <a:p>
-            <a:pPr lvl="1"/>
-            <a:r>
-              <a:rPr lang="en-US" dirty="0" smtClean="0"/>
-              <a:t>The example programs</a:t>
-            </a:r>
-            <a:endParaRPr lang="en-US" dirty="0"/>
+              <a:t>Gerity</a:t>
+            </a:r>
+            <a:endParaRPr lang="en-US" sz="2000" dirty="0" smtClean="0">
+              <a:latin typeface="Miriam" panose="020B0502050101010101" pitchFamily="34" charset="-79"/>
+              <a:cs typeface="Miriam" panose="020B0502050101010101" pitchFamily="34" charset="-79"/>
+            </a:endParaRPr>
+          </a:p>
+        </p:txBody>
+      </p:sp>
+      <p:pic>
+        <p:nvPicPr>
+          <p:cNvPr id="8" name="Picture 7"/>
+          <p:cNvPicPr>
+            <a:picLocks noChangeAspect="1"/>
+          </p:cNvPicPr>
+          <p:nvPr/>
+        </p:nvPicPr>
+        <p:blipFill>
+          <a:blip r:embed="rId3">
+            <a:extLst>
+              <a:ext uri="{28A0092B-C50C-407E-A947-70E740481C1C}">
+                <a14:useLocalDpi xmlns:a14="http://schemas.microsoft.com/office/drawing/2010/main" val="0"/>
+              </a:ext>
+            </a:extLst>
+          </a:blip>
+          <a:stretch>
+            <a:fillRect/>
+          </a:stretch>
+        </p:blipFill>
+        <p:spPr>
+          <a:xfrm>
+            <a:off x="4511709" y="170249"/>
+            <a:ext cx="4632291" cy="1158073"/>
+          </a:xfrm>
+          <a:prstGeom prst="rect">
+            <a:avLst/>
+          </a:prstGeom>
+        </p:spPr>
+      </p:pic>
+      <p:sp>
+        <p:nvSpPr>
+          <p:cNvPr id="6" name="Subtitle 2"/>
+          <p:cNvSpPr txBox="1">
+            <a:spLocks/>
+          </p:cNvSpPr>
+          <p:nvPr/>
+        </p:nvSpPr>
+        <p:spPr>
+          <a:xfrm>
+            <a:off x="3659089" y="3926607"/>
+            <a:ext cx="1705239" cy="455526"/>
+          </a:xfrm>
+          <a:prstGeom prst="rect">
+            <a:avLst/>
+          </a:prstGeom>
+        </p:spPr>
+        <p:txBody>
+          <a:bodyPr vert="horz" lIns="91440" tIns="45720" rIns="91440" bIns="45720" rtlCol="0">
+            <a:normAutofit fontScale="92500"/>
+          </a:bodyPr>
+          <a:lstStyle>
+            <a:lvl1pPr marL="0" indent="0" algn="r" defTabSz="457200" rtl="0" eaLnBrk="1" latinLnBrk="0" hangingPunct="1">
+              <a:spcBef>
+                <a:spcPct val="20000"/>
+              </a:spcBef>
+              <a:buFont typeface="Arial"/>
+              <a:buNone/>
+              <a:defRPr sz="2800" kern="1200">
+                <a:solidFill>
+                  <a:srgbClr val="FFFFFF"/>
+                </a:solidFill>
+                <a:latin typeface="+mn-lt"/>
+                <a:ea typeface="+mn-ea"/>
+                <a:cs typeface="+mn-cs"/>
+              </a:defRPr>
+            </a:lvl1pPr>
+            <a:lvl2pPr marL="457200" indent="0" algn="ctr" defTabSz="457200" rtl="0" eaLnBrk="1" latinLnBrk="0" hangingPunct="1">
+              <a:spcBef>
+                <a:spcPct val="20000"/>
+              </a:spcBef>
+              <a:buFont typeface="Arial"/>
+              <a:buNone/>
+              <a:defRPr sz="2800" kern="1200">
+                <a:solidFill>
+                  <a:schemeClr val="tx1">
+                    <a:tint val="75000"/>
+                  </a:schemeClr>
+                </a:solidFill>
+                <a:latin typeface="+mn-lt"/>
+                <a:ea typeface="+mn-ea"/>
+                <a:cs typeface="+mn-cs"/>
+              </a:defRPr>
+            </a:lvl2pPr>
+            <a:lvl3pPr marL="914400" indent="0" algn="ctr" defTabSz="457200" rtl="0" eaLnBrk="1" latinLnBrk="0" hangingPunct="1">
+              <a:spcBef>
+                <a:spcPct val="20000"/>
+              </a:spcBef>
+              <a:buFont typeface="Arial"/>
+              <a:buNone/>
+              <a:defRPr sz="2400" kern="1200">
+                <a:solidFill>
+                  <a:schemeClr val="tx1">
+                    <a:tint val="75000"/>
+                  </a:schemeClr>
+                </a:solidFill>
+                <a:latin typeface="+mn-lt"/>
+                <a:ea typeface="+mn-ea"/>
+                <a:cs typeface="+mn-cs"/>
+              </a:defRPr>
+            </a:lvl3pPr>
+            <a:lvl4pPr marL="1371600" indent="0" algn="ctr" defTabSz="457200" rtl="0" eaLnBrk="1" latinLnBrk="0" hangingPunct="1">
+              <a:spcBef>
+                <a:spcPct val="20000"/>
+              </a:spcBef>
+              <a:buFont typeface="Arial"/>
+              <a:buNone/>
+              <a:defRPr sz="2000" kern="1200">
+                <a:solidFill>
+                  <a:schemeClr val="tx1">
+                    <a:tint val="75000"/>
+                  </a:schemeClr>
+                </a:solidFill>
+                <a:latin typeface="+mn-lt"/>
+                <a:ea typeface="+mn-ea"/>
+                <a:cs typeface="+mn-cs"/>
+              </a:defRPr>
+            </a:lvl4pPr>
+            <a:lvl5pPr marL="1828800" indent="0" algn="ctr" defTabSz="457200" rtl="0" eaLnBrk="1" latinLnBrk="0" hangingPunct="1">
+              <a:spcBef>
+                <a:spcPct val="20000"/>
+              </a:spcBef>
+              <a:buFont typeface="Arial"/>
+              <a:buNone/>
+              <a:defRPr sz="2000" kern="1200">
+                <a:solidFill>
+                  <a:schemeClr val="tx1">
+                    <a:tint val="75000"/>
+                  </a:schemeClr>
+                </a:solidFill>
+                <a:latin typeface="+mn-lt"/>
+                <a:ea typeface="+mn-ea"/>
+                <a:cs typeface="+mn-cs"/>
+              </a:defRPr>
+            </a:lvl5pPr>
+            <a:lvl6pPr marL="2286000" indent="0" algn="ctr" defTabSz="457200" rtl="0" eaLnBrk="1" latinLnBrk="0" hangingPunct="1">
+              <a:spcBef>
+                <a:spcPct val="20000"/>
+              </a:spcBef>
+              <a:buFont typeface="Arial"/>
+              <a:buNone/>
+              <a:defRPr sz="2000" kern="1200">
+                <a:solidFill>
+                  <a:schemeClr val="tx1">
+                    <a:tint val="75000"/>
+                  </a:schemeClr>
+                </a:solidFill>
+                <a:latin typeface="+mn-lt"/>
+                <a:ea typeface="+mn-ea"/>
+                <a:cs typeface="+mn-cs"/>
+              </a:defRPr>
+            </a:lvl6pPr>
+            <a:lvl7pPr marL="2743200" indent="0" algn="ctr" defTabSz="457200" rtl="0" eaLnBrk="1" latinLnBrk="0" hangingPunct="1">
+              <a:spcBef>
+                <a:spcPct val="20000"/>
+              </a:spcBef>
+              <a:buFont typeface="Arial"/>
+              <a:buNone/>
+              <a:defRPr sz="2000" kern="1200">
+                <a:solidFill>
+                  <a:schemeClr val="tx1">
+                    <a:tint val="75000"/>
+                  </a:schemeClr>
+                </a:solidFill>
+                <a:latin typeface="+mn-lt"/>
+                <a:ea typeface="+mn-ea"/>
+                <a:cs typeface="+mn-cs"/>
+              </a:defRPr>
+            </a:lvl7pPr>
+            <a:lvl8pPr marL="3200400" indent="0" algn="ctr" defTabSz="457200" rtl="0" eaLnBrk="1" latinLnBrk="0" hangingPunct="1">
+              <a:spcBef>
+                <a:spcPct val="20000"/>
+              </a:spcBef>
+              <a:buFont typeface="Arial"/>
+              <a:buNone/>
+              <a:defRPr sz="2000" kern="1200">
+                <a:solidFill>
+                  <a:schemeClr val="tx1">
+                    <a:tint val="75000"/>
+                  </a:schemeClr>
+                </a:solidFill>
+                <a:latin typeface="+mn-lt"/>
+                <a:ea typeface="+mn-ea"/>
+                <a:cs typeface="+mn-cs"/>
+              </a:defRPr>
+            </a:lvl8pPr>
+            <a:lvl9pPr marL="3657600" indent="0" algn="ctr" defTabSz="457200" rtl="0" eaLnBrk="1" latinLnBrk="0" hangingPunct="1">
+              <a:spcBef>
+                <a:spcPct val="20000"/>
+              </a:spcBef>
+              <a:buFont typeface="Arial"/>
+              <a:buNone/>
+              <a:defRPr sz="2000" kern="1200">
+                <a:solidFill>
+                  <a:schemeClr val="tx1">
+                    <a:tint val="75000"/>
+                  </a:schemeClr>
+                </a:solidFill>
+                <a:latin typeface="+mn-lt"/>
+                <a:ea typeface="+mn-ea"/>
+                <a:cs typeface="+mn-cs"/>
+              </a:defRPr>
+            </a:lvl9pPr>
+          </a:lstStyle>
+          <a:p>
+            <a:pPr algn="ctr"/>
+            <a:r>
+              <a:rPr lang="en-US" sz="1600" dirty="0" smtClean="0">
+                <a:latin typeface="Miriam" panose="020B0502050101010101" pitchFamily="34" charset="-79"/>
+                <a:cs typeface="Miriam" panose="020B0502050101010101" pitchFamily="34" charset="-79"/>
+              </a:rPr>
+              <a:t>September 1, 2016</a:t>
+            </a:r>
+            <a:endParaRPr lang="en-US" sz="1600" dirty="0" smtClean="0">
+              <a:latin typeface="Miriam" panose="020B0502050101010101" pitchFamily="34" charset="-79"/>
+              <a:cs typeface="Miriam" panose="020B0502050101010101" pitchFamily="34" charset="-79"/>
+            </a:endParaRPr>
+          </a:p>
+        </p:txBody>
+      </p:sp>
+      <p:sp>
+        <p:nvSpPr>
+          <p:cNvPr id="9" name="Subtitle 2"/>
+          <p:cNvSpPr txBox="1">
+            <a:spLocks/>
+          </p:cNvSpPr>
+          <p:nvPr/>
+        </p:nvSpPr>
+        <p:spPr>
+          <a:xfrm>
+            <a:off x="2057996" y="6328391"/>
+            <a:ext cx="4907425" cy="455526"/>
+          </a:xfrm>
+          <a:prstGeom prst="rect">
+            <a:avLst/>
+          </a:prstGeom>
+        </p:spPr>
+        <p:txBody>
+          <a:bodyPr vert="horz" lIns="91440" tIns="45720" rIns="91440" bIns="45720" rtlCol="0">
+            <a:normAutofit/>
+          </a:bodyPr>
+          <a:lstStyle>
+            <a:lvl1pPr marL="0" indent="0" algn="r" defTabSz="457200" rtl="0" eaLnBrk="1" latinLnBrk="0" hangingPunct="1">
+              <a:spcBef>
+                <a:spcPct val="20000"/>
+              </a:spcBef>
+              <a:buFont typeface="Arial"/>
+              <a:buNone/>
+              <a:defRPr sz="2800" kern="1200">
+                <a:solidFill>
+                  <a:srgbClr val="FFFFFF"/>
+                </a:solidFill>
+                <a:latin typeface="+mn-lt"/>
+                <a:ea typeface="+mn-ea"/>
+                <a:cs typeface="+mn-cs"/>
+              </a:defRPr>
+            </a:lvl1pPr>
+            <a:lvl2pPr marL="457200" indent="0" algn="ctr" defTabSz="457200" rtl="0" eaLnBrk="1" latinLnBrk="0" hangingPunct="1">
+              <a:spcBef>
+                <a:spcPct val="20000"/>
+              </a:spcBef>
+              <a:buFont typeface="Arial"/>
+              <a:buNone/>
+              <a:defRPr sz="2800" kern="1200">
+                <a:solidFill>
+                  <a:schemeClr val="tx1">
+                    <a:tint val="75000"/>
+                  </a:schemeClr>
+                </a:solidFill>
+                <a:latin typeface="+mn-lt"/>
+                <a:ea typeface="+mn-ea"/>
+                <a:cs typeface="+mn-cs"/>
+              </a:defRPr>
+            </a:lvl2pPr>
+            <a:lvl3pPr marL="914400" indent="0" algn="ctr" defTabSz="457200" rtl="0" eaLnBrk="1" latinLnBrk="0" hangingPunct="1">
+              <a:spcBef>
+                <a:spcPct val="20000"/>
+              </a:spcBef>
+              <a:buFont typeface="Arial"/>
+              <a:buNone/>
+              <a:defRPr sz="2400" kern="1200">
+                <a:solidFill>
+                  <a:schemeClr val="tx1">
+                    <a:tint val="75000"/>
+                  </a:schemeClr>
+                </a:solidFill>
+                <a:latin typeface="+mn-lt"/>
+                <a:ea typeface="+mn-ea"/>
+                <a:cs typeface="+mn-cs"/>
+              </a:defRPr>
+            </a:lvl3pPr>
+            <a:lvl4pPr marL="1371600" indent="0" algn="ctr" defTabSz="457200" rtl="0" eaLnBrk="1" latinLnBrk="0" hangingPunct="1">
+              <a:spcBef>
+                <a:spcPct val="20000"/>
+              </a:spcBef>
+              <a:buFont typeface="Arial"/>
+              <a:buNone/>
+              <a:defRPr sz="2000" kern="1200">
+                <a:solidFill>
+                  <a:schemeClr val="tx1">
+                    <a:tint val="75000"/>
+                  </a:schemeClr>
+                </a:solidFill>
+                <a:latin typeface="+mn-lt"/>
+                <a:ea typeface="+mn-ea"/>
+                <a:cs typeface="+mn-cs"/>
+              </a:defRPr>
+            </a:lvl4pPr>
+            <a:lvl5pPr marL="1828800" indent="0" algn="ctr" defTabSz="457200" rtl="0" eaLnBrk="1" latinLnBrk="0" hangingPunct="1">
+              <a:spcBef>
+                <a:spcPct val="20000"/>
+              </a:spcBef>
+              <a:buFont typeface="Arial"/>
+              <a:buNone/>
+              <a:defRPr sz="2000" kern="1200">
+                <a:solidFill>
+                  <a:schemeClr val="tx1">
+                    <a:tint val="75000"/>
+                  </a:schemeClr>
+                </a:solidFill>
+                <a:latin typeface="+mn-lt"/>
+                <a:ea typeface="+mn-ea"/>
+                <a:cs typeface="+mn-cs"/>
+              </a:defRPr>
+            </a:lvl5pPr>
+            <a:lvl6pPr marL="2286000" indent="0" algn="ctr" defTabSz="457200" rtl="0" eaLnBrk="1" latinLnBrk="0" hangingPunct="1">
+              <a:spcBef>
+                <a:spcPct val="20000"/>
+              </a:spcBef>
+              <a:buFont typeface="Arial"/>
+              <a:buNone/>
+              <a:defRPr sz="2000" kern="1200">
+                <a:solidFill>
+                  <a:schemeClr val="tx1">
+                    <a:tint val="75000"/>
+                  </a:schemeClr>
+                </a:solidFill>
+                <a:latin typeface="+mn-lt"/>
+                <a:ea typeface="+mn-ea"/>
+                <a:cs typeface="+mn-cs"/>
+              </a:defRPr>
+            </a:lvl6pPr>
+            <a:lvl7pPr marL="2743200" indent="0" algn="ctr" defTabSz="457200" rtl="0" eaLnBrk="1" latinLnBrk="0" hangingPunct="1">
+              <a:spcBef>
+                <a:spcPct val="20000"/>
+              </a:spcBef>
+              <a:buFont typeface="Arial"/>
+              <a:buNone/>
+              <a:defRPr sz="2000" kern="1200">
+                <a:solidFill>
+                  <a:schemeClr val="tx1">
+                    <a:tint val="75000"/>
+                  </a:schemeClr>
+                </a:solidFill>
+                <a:latin typeface="+mn-lt"/>
+                <a:ea typeface="+mn-ea"/>
+                <a:cs typeface="+mn-cs"/>
+              </a:defRPr>
+            </a:lvl7pPr>
+            <a:lvl8pPr marL="3200400" indent="0" algn="ctr" defTabSz="457200" rtl="0" eaLnBrk="1" latinLnBrk="0" hangingPunct="1">
+              <a:spcBef>
+                <a:spcPct val="20000"/>
+              </a:spcBef>
+              <a:buFont typeface="Arial"/>
+              <a:buNone/>
+              <a:defRPr sz="2000" kern="1200">
+                <a:solidFill>
+                  <a:schemeClr val="tx1">
+                    <a:tint val="75000"/>
+                  </a:schemeClr>
+                </a:solidFill>
+                <a:latin typeface="+mn-lt"/>
+                <a:ea typeface="+mn-ea"/>
+                <a:cs typeface="+mn-cs"/>
+              </a:defRPr>
+            </a:lvl8pPr>
+            <a:lvl9pPr marL="3657600" indent="0" algn="ctr" defTabSz="457200" rtl="0" eaLnBrk="1" latinLnBrk="0" hangingPunct="1">
+              <a:spcBef>
+                <a:spcPct val="20000"/>
+              </a:spcBef>
+              <a:buFont typeface="Arial"/>
+              <a:buNone/>
+              <a:defRPr sz="2000" kern="1200">
+                <a:solidFill>
+                  <a:schemeClr val="tx1">
+                    <a:tint val="75000"/>
+                  </a:schemeClr>
+                </a:solidFill>
+                <a:latin typeface="+mn-lt"/>
+                <a:ea typeface="+mn-ea"/>
+                <a:cs typeface="+mn-cs"/>
+              </a:defRPr>
+            </a:lvl9pPr>
+          </a:lstStyle>
+          <a:p>
+            <a:pPr algn="ctr"/>
+            <a:r>
+              <a:rPr lang="en-US" sz="1600" dirty="0" smtClean="0">
+                <a:latin typeface="Miriam" panose="020B0502050101010101" pitchFamily="34" charset="-79"/>
+                <a:cs typeface="Miriam" panose="020B0502050101010101" pitchFamily="34" charset="-79"/>
+              </a:rPr>
+              <a:t>Slides available at http://www.github.com/jgerity/talks</a:t>
+            </a:r>
           </a:p>
         </p:txBody>
       </p:sp>
     </p:spTree>
     <p:extLst>
       <p:ext uri="{BB962C8B-B14F-4D97-AF65-F5344CB8AC3E}">
-        <p14:creationId xmlns:p14="http://schemas.microsoft.com/office/powerpoint/2010/main" val="1778177330"/>
+        <p14:creationId xmlns:p14="http://schemas.microsoft.com/office/powerpoint/2010/main" val="1628571770"/>
       </p:ext>
     </p:extLst>
   </p:cSld>
@@ -2739,128 +3163,6 @@
           <a:p>
             <a:r>
               <a:rPr lang="en-US" dirty="0" smtClean="0"/>
-              <a:t>What is Python good for?</a:t>
-            </a:r>
-            <a:endParaRPr lang="en-US" dirty="0"/>
-          </a:p>
-        </p:txBody>
-      </p:sp>
-      <p:sp>
-        <p:nvSpPr>
-          <p:cNvPr id="3" name="Content Placeholder 2"/>
-          <p:cNvSpPr>
-            <a:spLocks noGrp="1"/>
-          </p:cNvSpPr>
-          <p:nvPr>
-            <p:ph idx="1"/>
-          </p:nvPr>
-        </p:nvSpPr>
-        <p:spPr>
-          <a:xfrm>
-            <a:off x="457200" y="2049270"/>
-            <a:ext cx="8229600" cy="4482159"/>
-          </a:xfrm>
-        </p:spPr>
-        <p:txBody>
-          <a:bodyPr>
-            <a:normAutofit/>
-          </a:bodyPr>
-          <a:lstStyle/>
-          <a:p>
-            <a:r>
-              <a:rPr lang="en-US" dirty="0" smtClean="0"/>
-              <a:t>Development quality of life</a:t>
-            </a:r>
-          </a:p>
-          <a:p>
-            <a:pPr lvl="1"/>
-            <a:r>
-              <a:rPr lang="en-US" dirty="0" smtClean="0"/>
-              <a:t>More time writing easy to read code, quickly</a:t>
-            </a:r>
-          </a:p>
-          <a:p>
-            <a:r>
-              <a:rPr lang="en-US" dirty="0" smtClean="0"/>
-              <a:t>Portability</a:t>
-            </a:r>
-          </a:p>
-          <a:p>
-            <a:pPr lvl="1"/>
-            <a:r>
-              <a:rPr lang="en-US" dirty="0" smtClean="0"/>
-              <a:t>As long as the target has a Python interpreter, we can run Python there!</a:t>
-            </a:r>
-          </a:p>
-          <a:p>
-            <a:r>
-              <a:rPr lang="en-US" dirty="0" smtClean="0"/>
-              <a:t>Rich scientific ecosystem</a:t>
-            </a:r>
-          </a:p>
-          <a:p>
-            <a:pPr lvl="1"/>
-            <a:r>
-              <a:rPr lang="en-US" dirty="0" smtClean="0"/>
-              <a:t>Great libraries exist for most common tasks</a:t>
-            </a:r>
-          </a:p>
-        </p:txBody>
-      </p:sp>
-    </p:spTree>
-    <p:extLst>
-      <p:ext uri="{BB962C8B-B14F-4D97-AF65-F5344CB8AC3E}">
-        <p14:creationId xmlns:p14="http://schemas.microsoft.com/office/powerpoint/2010/main" val="533240533"/>
-      </p:ext>
-    </p:extLst>
-  </p:cSld>
-  <p:clrMapOvr>
-    <a:masterClrMapping/>
-  </p:clrMapOvr>
-  <p:timing>
-    <p:tnLst>
-      <p:par>
-        <p:cTn id="1" dur="indefinite" restart="never" nodeType="tmRoot"/>
-      </p:par>
-    </p:tnLst>
-  </p:timing>
-</p:sld>
-</file>
-
-<file path=ppt/slides/slide11.xml><?xml version="1.0" encoding="utf-8"?>
-<p:sld xmlns:a="http://schemas.openxmlformats.org/drawingml/2006/main" xmlns:r="http://schemas.openxmlformats.org/officeDocument/2006/relationships" xmlns:p="http://schemas.openxmlformats.org/presentationml/2006/main">
-  <p:cSld>
-    <p:spTree>
-      <p:nvGrpSpPr>
-        <p:cNvPr id="1" name=""/>
-        <p:cNvGrpSpPr/>
-        <p:nvPr/>
-      </p:nvGrpSpPr>
-      <p:grpSpPr>
-        <a:xfrm>
-          <a:off x="0" y="0"/>
-          <a:ext cx="0" cy="0"/>
-          <a:chOff x="0" y="0"/>
-          <a:chExt cx="0" cy="0"/>
-        </a:xfrm>
-      </p:grpSpPr>
-      <p:sp>
-        <p:nvSpPr>
-          <p:cNvPr id="2" name="Title 1"/>
-          <p:cNvSpPr>
-            <a:spLocks noGrp="1"/>
-          </p:cNvSpPr>
-          <p:nvPr>
-            <p:ph type="title"/>
-          </p:nvPr>
-        </p:nvSpPr>
-        <p:spPr/>
-        <p:txBody>
-          <a:bodyPr/>
-          <a:lstStyle/>
-          <a:p>
-            <a:r>
-              <a:rPr lang="en-US" dirty="0" smtClean="0"/>
               <a:t>What is Python </a:t>
             </a:r>
             <a:r>
@@ -2950,14 +3252,135 @@
   <p:timing>
     <p:tnLst>
       <p:par>
-        <p:cTn id="1" dur="indefinite" restart="never" nodeType="tmRoot"/>
+        <p:cTn id="1" dur="indefinite" restart="never" nodeType="tmRoot">
+          <p:childTnLst>
+            <p:seq concurrent="1" nextAc="seek">
+              <p:cTn id="2" dur="indefinite" nodeType="mainSeq">
+                <p:childTnLst>
+                  <p:par>
+                    <p:cTn id="3" fill="hold">
+                      <p:stCondLst>
+                        <p:cond delay="indefinite"/>
+                      </p:stCondLst>
+                      <p:childTnLst>
+                        <p:par>
+                          <p:cTn id="4" fill="hold">
+                            <p:stCondLst>
+                              <p:cond delay="0"/>
+                            </p:stCondLst>
+                            <p:childTnLst>
+                              <p:par>
+                                <p:cTn id="5" presetID="1" presetClass="entr" presetSubtype="0" fill="hold" nodeType="clickEffect">
+                                  <p:stCondLst>
+                                    <p:cond delay="0"/>
+                                  </p:stCondLst>
+                                  <p:childTnLst>
+                                    <p:set>
+                                      <p:cBhvr>
+                                        <p:cTn id="6" dur="1" fill="hold">
+                                          <p:stCondLst>
+                                            <p:cond delay="0"/>
+                                          </p:stCondLst>
+                                        </p:cTn>
+                                        <p:tgtEl>
+                                          <p:spTgt spid="3">
+                                            <p:txEl>
+                                              <p:pRg st="1" end="1"/>
+                                            </p:txEl>
+                                          </p:spTgt>
+                                        </p:tgtEl>
+                                        <p:attrNameLst>
+                                          <p:attrName>style.visibility</p:attrName>
+                                        </p:attrNameLst>
+                                      </p:cBhvr>
+                                      <p:to>
+                                        <p:strVal val="visible"/>
+                                      </p:to>
+                                    </p:set>
+                                  </p:childTnLst>
+                                </p:cTn>
+                              </p:par>
+                            </p:childTnLst>
+                          </p:cTn>
+                        </p:par>
+                      </p:childTnLst>
+                    </p:cTn>
+                  </p:par>
+                  <p:par>
+                    <p:cTn id="7" fill="hold">
+                      <p:stCondLst>
+                        <p:cond delay="indefinite"/>
+                      </p:stCondLst>
+                      <p:childTnLst>
+                        <p:par>
+                          <p:cTn id="8" fill="hold">
+                            <p:stCondLst>
+                              <p:cond delay="0"/>
+                            </p:stCondLst>
+                            <p:childTnLst>
+                              <p:par>
+                                <p:cTn id="9" presetID="1" presetClass="entr" presetSubtype="0" fill="hold" nodeType="clickEffect">
+                                  <p:stCondLst>
+                                    <p:cond delay="0"/>
+                                  </p:stCondLst>
+                                  <p:childTnLst>
+                                    <p:set>
+                                      <p:cBhvr>
+                                        <p:cTn id="10" dur="1" fill="hold">
+                                          <p:stCondLst>
+                                            <p:cond delay="0"/>
+                                          </p:stCondLst>
+                                        </p:cTn>
+                                        <p:tgtEl>
+                                          <p:spTgt spid="3">
+                                            <p:txEl>
+                                              <p:pRg st="2" end="2"/>
+                                            </p:txEl>
+                                          </p:spTgt>
+                                        </p:tgtEl>
+                                        <p:attrNameLst>
+                                          <p:attrName>style.visibility</p:attrName>
+                                        </p:attrNameLst>
+                                      </p:cBhvr>
+                                      <p:to>
+                                        <p:strVal val="visible"/>
+                                      </p:to>
+                                    </p:set>
+                                  </p:childTnLst>
+                                </p:cTn>
+                              </p:par>
+                            </p:childTnLst>
+                          </p:cTn>
+                        </p:par>
+                      </p:childTnLst>
+                    </p:cTn>
+                  </p:par>
+                </p:childTnLst>
+              </p:cTn>
+              <p:prevCondLst>
+                <p:cond evt="onPrev" delay="0">
+                  <p:tgtEl>
+                    <p:sldTgt/>
+                  </p:tgtEl>
+                </p:cond>
+              </p:prevCondLst>
+              <p:nextCondLst>
+                <p:cond evt="onNext" delay="0">
+                  <p:tgtEl>
+                    <p:sldTgt/>
+                  </p:tgtEl>
+                </p:cond>
+              </p:nextCondLst>
+            </p:seq>
+          </p:childTnLst>
+        </p:cTn>
       </p:par>
     </p:tnLst>
   </p:timing>
 </p:sld>
 </file>
 
-<file path=ppt/slides/slide12.xml><?xml version="1.0" encoding="utf-8"?>
+<file path=ppt/slides/slide11.xml><?xml version="1.0" encoding="utf-8"?>
 <p:sld xmlns:a="http://schemas.openxmlformats.org/drawingml/2006/main" xmlns:r="http://schemas.openxmlformats.org/officeDocument/2006/relationships" xmlns:p="http://schemas.openxmlformats.org/presentationml/2006/main">
   <p:cSld>
     <p:spTree>
@@ -3379,7 +3802,7 @@
 </p:sld>
 </file>
 
-<file path=ppt/slides/slide13.xml><?xml version="1.0" encoding="utf-8"?>
+<file path=ppt/slides/slide12.xml><?xml version="1.0" encoding="utf-8"?>
 <p:sld xmlns:a="http://schemas.openxmlformats.org/drawingml/2006/main" xmlns:r="http://schemas.openxmlformats.org/officeDocument/2006/relationships" xmlns:p="http://schemas.openxmlformats.org/presentationml/2006/main">
   <p:cSld>
     <p:spTree>
@@ -3877,6 +4300,257 @@
 </p:sld>
 </file>
 
+<file path=ppt/slides/slide13.xml><?xml version="1.0" encoding="utf-8"?>
+<p:sld xmlns:a="http://schemas.openxmlformats.org/drawingml/2006/main" xmlns:r="http://schemas.openxmlformats.org/officeDocument/2006/relationships" xmlns:p="http://schemas.openxmlformats.org/presentationml/2006/main">
+  <p:cSld>
+    <p:spTree>
+      <p:nvGrpSpPr>
+        <p:cNvPr id="1" name=""/>
+        <p:cNvGrpSpPr/>
+        <p:nvPr/>
+      </p:nvGrpSpPr>
+      <p:grpSpPr>
+        <a:xfrm>
+          <a:off x="0" y="0"/>
+          <a:ext cx="0" cy="0"/>
+          <a:chOff x="0" y="0"/>
+          <a:chExt cx="0" cy="0"/>
+        </a:xfrm>
+      </p:grpSpPr>
+      <p:sp>
+        <p:nvSpPr>
+          <p:cNvPr id="2" name="Title 1"/>
+          <p:cNvSpPr>
+            <a:spLocks noGrp="1"/>
+          </p:cNvSpPr>
+          <p:nvPr>
+            <p:ph type="title"/>
+          </p:nvPr>
+        </p:nvSpPr>
+        <p:spPr/>
+        <p:txBody>
+          <a:bodyPr/>
+          <a:lstStyle/>
+          <a:p>
+            <a:r>
+              <a:rPr lang="en-US" dirty="0" smtClean="0"/>
+              <a:t>Lists and tuples</a:t>
+            </a:r>
+            <a:endParaRPr lang="en-US" dirty="0"/>
+          </a:p>
+        </p:txBody>
+      </p:sp>
+      <p:sp>
+        <p:nvSpPr>
+          <p:cNvPr id="3" name="Content Placeholder 2"/>
+          <p:cNvSpPr>
+            <a:spLocks noGrp="1"/>
+          </p:cNvSpPr>
+          <p:nvPr>
+            <p:ph idx="1"/>
+          </p:nvPr>
+        </p:nvSpPr>
+        <p:spPr/>
+        <p:txBody>
+          <a:bodyPr/>
+          <a:lstStyle/>
+          <a:p>
+            <a:r>
+              <a:rPr lang="en-US" dirty="0" smtClean="0"/>
+              <a:t>Lists </a:t>
+            </a:r>
+            <a:r>
+              <a:rPr lang="en-US" dirty="0" smtClean="0"/>
+              <a:t>and tuples are </a:t>
+            </a:r>
+            <a:r>
+              <a:rPr lang="en-US" dirty="0" smtClean="0"/>
+              <a:t>linear sequences of objects, enumerated from 0.</a:t>
+            </a:r>
+          </a:p>
+          <a:p>
+            <a:r>
+              <a:rPr lang="en-US" dirty="0" smtClean="0"/>
+              <a:t>Lists are </a:t>
+            </a:r>
+            <a:r>
+              <a:rPr lang="en-US" b="1" dirty="0" smtClean="0"/>
+              <a:t>mutable</a:t>
+            </a:r>
+            <a:r>
+              <a:rPr lang="en-US" dirty="0" smtClean="0"/>
+              <a:t>, meaning they can be changed.  Contrast with </a:t>
+            </a:r>
+            <a:r>
+              <a:rPr lang="en-US" b="1" dirty="0" smtClean="0"/>
+              <a:t>immutable</a:t>
+            </a:r>
+            <a:r>
+              <a:rPr lang="en-US" dirty="0" smtClean="0"/>
+              <a:t> </a:t>
+            </a:r>
+            <a:r>
+              <a:rPr lang="en-US" dirty="0" smtClean="0"/>
+              <a:t>tuples.</a:t>
+            </a:r>
+          </a:p>
+          <a:p>
+            <a:pPr lvl="1"/>
+            <a:r>
+              <a:rPr lang="en-US" dirty="0" smtClean="0"/>
+              <a:t>Once a tuple is created, it never changes!</a:t>
+            </a:r>
+            <a:endParaRPr lang="en-US" dirty="0" smtClean="0"/>
+          </a:p>
+          <a:p>
+            <a:pPr marL="0" indent="0">
+              <a:buNone/>
+            </a:pPr>
+            <a:endParaRPr lang="en-US" dirty="0"/>
+          </a:p>
+        </p:txBody>
+      </p:sp>
+    </p:spTree>
+    <p:extLst>
+      <p:ext uri="{BB962C8B-B14F-4D97-AF65-F5344CB8AC3E}">
+        <p14:creationId xmlns:p14="http://schemas.microsoft.com/office/powerpoint/2010/main" val="2775519337"/>
+      </p:ext>
+    </p:extLst>
+  </p:cSld>
+  <p:clrMapOvr>
+    <a:masterClrMapping/>
+  </p:clrMapOvr>
+  <p:timing>
+    <p:tnLst>
+      <p:par>
+        <p:cTn id="1" dur="indefinite" restart="never" nodeType="tmRoot">
+          <p:childTnLst>
+            <p:seq concurrent="1" nextAc="seek">
+              <p:cTn id="2" dur="indefinite" nodeType="mainSeq">
+                <p:childTnLst>
+                  <p:par>
+                    <p:cTn id="3" fill="hold">
+                      <p:stCondLst>
+                        <p:cond delay="indefinite"/>
+                      </p:stCondLst>
+                      <p:childTnLst>
+                        <p:par>
+                          <p:cTn id="4" fill="hold">
+                            <p:stCondLst>
+                              <p:cond delay="0"/>
+                            </p:stCondLst>
+                            <p:childTnLst>
+                              <p:par>
+                                <p:cTn id="5" presetID="1" presetClass="entr" presetSubtype="0" fill="hold" nodeType="clickEffect">
+                                  <p:stCondLst>
+                                    <p:cond delay="0"/>
+                                  </p:stCondLst>
+                                  <p:childTnLst>
+                                    <p:set>
+                                      <p:cBhvr>
+                                        <p:cTn id="6" dur="1" fill="hold">
+                                          <p:stCondLst>
+                                            <p:cond delay="0"/>
+                                          </p:stCondLst>
+                                        </p:cTn>
+                                        <p:tgtEl>
+                                          <p:spTgt spid="3">
+                                            <p:txEl>
+                                              <p:pRg st="1" end="1"/>
+                                            </p:txEl>
+                                          </p:spTgt>
+                                        </p:tgtEl>
+                                        <p:attrNameLst>
+                                          <p:attrName>style.visibility</p:attrName>
+                                        </p:attrNameLst>
+                                      </p:cBhvr>
+                                      <p:to>
+                                        <p:strVal val="visible"/>
+                                      </p:to>
+                                    </p:set>
+                                  </p:childTnLst>
+                                </p:cTn>
+                              </p:par>
+                            </p:childTnLst>
+                          </p:cTn>
+                        </p:par>
+                      </p:childTnLst>
+                    </p:cTn>
+                  </p:par>
+                  <p:par>
+                    <p:cTn id="7" fill="hold">
+                      <p:stCondLst>
+                        <p:cond delay="indefinite"/>
+                      </p:stCondLst>
+                      <p:childTnLst>
+                        <p:par>
+                          <p:cTn id="8" fill="hold">
+                            <p:stCondLst>
+                              <p:cond delay="0"/>
+                            </p:stCondLst>
+                            <p:childTnLst>
+                              <p:par>
+                                <p:cTn id="9" presetID="1" presetClass="entr" presetSubtype="0" fill="hold" nodeType="clickEffect">
+                                  <p:stCondLst>
+                                    <p:cond delay="0"/>
+                                  </p:stCondLst>
+                                  <p:childTnLst>
+                                    <p:set>
+                                      <p:cBhvr>
+                                        <p:cTn id="10" dur="1" fill="hold">
+                                          <p:stCondLst>
+                                            <p:cond delay="0"/>
+                                          </p:stCondLst>
+                                        </p:cTn>
+                                        <p:tgtEl>
+                                          <p:spTgt spid="3">
+                                            <p:txEl>
+                                              <p:pRg st="2" end="2"/>
+                                            </p:txEl>
+                                          </p:spTgt>
+                                        </p:tgtEl>
+                                        <p:attrNameLst>
+                                          <p:attrName>style.visibility</p:attrName>
+                                        </p:attrNameLst>
+                                      </p:cBhvr>
+                                      <p:to>
+                                        <p:strVal val="visible"/>
+                                      </p:to>
+                                    </p:set>
+                                  </p:childTnLst>
+                                </p:cTn>
+                              </p:par>
+                            </p:childTnLst>
+                          </p:cTn>
+                        </p:par>
+                      </p:childTnLst>
+                    </p:cTn>
+                  </p:par>
+                </p:childTnLst>
+              </p:cTn>
+              <p:prevCondLst>
+                <p:cond evt="onPrev" delay="0">
+                  <p:tgtEl>
+                    <p:sldTgt/>
+                  </p:tgtEl>
+                </p:cond>
+              </p:prevCondLst>
+              <p:nextCondLst>
+                <p:cond evt="onNext" delay="0">
+                  <p:tgtEl>
+                    <p:sldTgt/>
+                  </p:tgtEl>
+                </p:cond>
+              </p:nextCondLst>
+            </p:seq>
+          </p:childTnLst>
+        </p:cTn>
+      </p:par>
+    </p:tnLst>
+  </p:timing>
+</p:sld>
+</file>
+
 <file path=ppt/slides/slide14.xml><?xml version="1.0" encoding="utf-8"?>
 <p:sld xmlns:a="http://schemas.openxmlformats.org/drawingml/2006/main" xmlns:r="http://schemas.openxmlformats.org/officeDocument/2006/relationships" xmlns:p="http://schemas.openxmlformats.org/presentationml/2006/main">
   <p:cSld>
@@ -3911,7 +4585,7 @@
           <a:p>
             <a:r>
               <a:rPr lang="en-US" dirty="0" smtClean="0"/>
-              <a:t>Lists and tuples</a:t>
+              <a:t>Exploring these types in REPL</a:t>
             </a:r>
             <a:endParaRPr lang="en-US" dirty="0"/>
           </a:p>
@@ -3929,68 +4603,61 @@
         </p:nvSpPr>
         <p:spPr/>
         <p:txBody>
-          <a:bodyPr/>
+          <a:bodyPr>
+            <a:normAutofit/>
+          </a:bodyPr>
           <a:lstStyle/>
           <a:p>
             <a:r>
               <a:rPr lang="en-US" dirty="0" smtClean="0"/>
-              <a:t>Lists </a:t>
-            </a:r>
-            <a:r>
-              <a:rPr lang="en-US" dirty="0" smtClean="0"/>
-              <a:t>and tuples are </a:t>
-            </a:r>
-            <a:r>
-              <a:rPr lang="en-US" dirty="0" smtClean="0"/>
-              <a:t>linear sequences of objects, enumerated from 0.</a:t>
-            </a:r>
-          </a:p>
-          <a:p>
-            <a:r>
-              <a:rPr lang="en-US" dirty="0" smtClean="0"/>
-              <a:t>Lists are </a:t>
-            </a:r>
+              <a:t>Let’s explore each of these types using the Python interpreter’s REPL (Read, </a:t>
+            </a:r>
+            <a:r>
+              <a:rPr lang="en-US" dirty="0" err="1" smtClean="0"/>
+              <a:t>Eval</a:t>
+            </a:r>
+            <a:r>
+              <a:rPr lang="en-US" dirty="0" smtClean="0"/>
+              <a:t>, Print Loop</a:t>
+            </a:r>
+            <a:r>
+              <a:rPr lang="en-US" dirty="0" smtClean="0"/>
+              <a:t>)</a:t>
+            </a:r>
+          </a:p>
+          <a:p>
+            <a:pPr lvl="1"/>
             <a:r>
               <a:rPr lang="en-US" b="1" dirty="0" smtClean="0"/>
-              <a:t>mutable</a:t>
-            </a:r>
-            <a:r>
-              <a:rPr lang="en-US" dirty="0" smtClean="0"/>
-              <a:t>, meaning they can be changed.  Contrast with </a:t>
-            </a:r>
-            <a:r>
-              <a:rPr lang="en-US" b="1" dirty="0" smtClean="0"/>
-              <a:t>immutable</a:t>
+              <a:t>python basictypes_example.py</a:t>
+            </a:r>
+          </a:p>
+          <a:p>
+            <a:pPr lvl="1"/>
+            <a:r>
+              <a:rPr lang="en-US" dirty="0">
+                <a:hlinkClick r:id="rId2"/>
+              </a:rPr>
+              <a:t>https://</a:t>
+            </a:r>
+            <a:r>
+              <a:rPr lang="en-US" dirty="0" smtClean="0">
+                <a:hlinkClick r:id="rId2"/>
+              </a:rPr>
+              <a:t>repl.it/DJvj</a:t>
             </a:r>
             <a:r>
               <a:rPr lang="en-US" dirty="0" smtClean="0"/>
               <a:t> </a:t>
             </a:r>
-            <a:r>
-              <a:rPr lang="en-US" dirty="0" smtClean="0"/>
-              <a:t>tuples.</a:t>
-            </a:r>
-          </a:p>
-          <a:p>
-            <a:pPr lvl="1"/>
-            <a:r>
-              <a:rPr lang="en-US" dirty="0" smtClean="0"/>
-              <a:t>Once a tuple is created, it never changes!</a:t>
-            </a:r>
             <a:endParaRPr lang="en-US" dirty="0" smtClean="0"/>
-          </a:p>
-          <a:p>
-            <a:pPr marL="0" indent="0">
-              <a:buNone/>
-            </a:pPr>
-            <a:endParaRPr lang="en-US" dirty="0"/>
           </a:p>
         </p:txBody>
       </p:sp>
     </p:spTree>
     <p:extLst>
       <p:ext uri="{BB962C8B-B14F-4D97-AF65-F5344CB8AC3E}">
-        <p14:creationId xmlns:p14="http://schemas.microsoft.com/office/powerpoint/2010/main" val="2775519337"/>
+        <p14:creationId xmlns:p14="http://schemas.microsoft.com/office/powerpoint/2010/main" val="756144120"/>
       </p:ext>
     </p:extLst>
   </p:cSld>
@@ -4041,7 +4708,7 @@
           <a:p>
             <a:r>
               <a:rPr lang="en-US" dirty="0" smtClean="0"/>
-              <a:t>Exploring these types in REPL</a:t>
+              <a:t>Managing your Python environment</a:t>
             </a:r>
             <a:endParaRPr lang="en-US" dirty="0"/>
           </a:p>
@@ -4057,70 +4724,127 @@
             <p:ph idx="1"/>
           </p:nvPr>
         </p:nvSpPr>
-        <p:spPr/>
+        <p:spPr>
+          <a:xfrm>
+            <a:off x="457200" y="2049270"/>
+            <a:ext cx="8229600" cy="4449501"/>
+          </a:xfrm>
+        </p:spPr>
         <p:txBody>
           <a:bodyPr>
-            <a:normAutofit/>
+            <a:normAutofit lnSpcReduction="10000"/>
           </a:bodyPr>
           <a:lstStyle/>
           <a:p>
             <a:r>
               <a:rPr lang="en-US" dirty="0" smtClean="0"/>
-              <a:t>Let’s explore each of these types using the Python interpreter’s REPL (Read, </a:t>
+              <a:t>You will likely use libraries like </a:t>
             </a:r>
             <a:r>
               <a:rPr lang="en-US" dirty="0" err="1" smtClean="0"/>
-              <a:t>Eval</a:t>
-            </a:r>
-            <a:r>
-              <a:rPr lang="en-US" dirty="0" smtClean="0"/>
-              <a:t>, Print Loop</a:t>
-            </a:r>
-            <a:r>
-              <a:rPr lang="en-US" dirty="0" smtClean="0"/>
-              <a:t>)</a:t>
-            </a:r>
-          </a:p>
-          <a:p>
-            <a:pPr lvl="1"/>
-            <a:r>
-              <a:rPr lang="en-US" b="1" smtClean="0"/>
-              <a:t>python basictypes_example.py</a:t>
-            </a:r>
-            <a:endParaRPr lang="en-US" b="1" dirty="0" smtClean="0"/>
-          </a:p>
-          <a:p>
-            <a:pPr lvl="1"/>
-            <a:r>
-              <a:rPr lang="en-US" dirty="0" smtClean="0">
-                <a:hlinkClick r:id="rId2"/>
-              </a:rPr>
-              <a:t>https</a:t>
-            </a:r>
-            <a:r>
-              <a:rPr lang="en-US" dirty="0">
-                <a:hlinkClick r:id="rId2"/>
-              </a:rPr>
-              <a:t>://</a:t>
-            </a:r>
-            <a:r>
-              <a:rPr lang="en-US" dirty="0" smtClean="0">
-                <a:hlinkClick r:id="rId2"/>
-              </a:rPr>
-              <a:t>repl.it/DJv9</a:t>
-            </a:r>
-            <a:r>
-              <a:rPr lang="en-US" dirty="0" smtClean="0"/>
-              <a:t> </a:t>
-            </a:r>
-            <a:endParaRPr lang="en-US" dirty="0" smtClean="0"/>
+              <a:t>numpy</a:t>
+            </a:r>
+            <a:r>
+              <a:rPr lang="en-US" dirty="0" smtClean="0"/>
+              <a:t>/</a:t>
+            </a:r>
+            <a:r>
+              <a:rPr lang="en-US" dirty="0" err="1" smtClean="0"/>
+              <a:t>scipy</a:t>
+            </a:r>
+            <a:r>
+              <a:rPr lang="en-US" dirty="0"/>
+              <a:t>, </a:t>
+            </a:r>
+            <a:r>
+              <a:rPr lang="en-US" dirty="0" err="1"/>
+              <a:t>astropy</a:t>
+            </a:r>
+            <a:r>
+              <a:rPr lang="en-US" dirty="0"/>
+              <a:t>, </a:t>
+            </a:r>
+            <a:r>
+              <a:rPr lang="en-US" dirty="0" err="1"/>
+              <a:t>matplotlib</a:t>
+            </a:r>
+            <a:r>
+              <a:rPr lang="en-US" dirty="0"/>
+              <a:t>, pandas, </a:t>
+            </a:r>
+            <a:r>
+              <a:rPr lang="en-US" dirty="0" smtClean="0"/>
+              <a:t>hdf5.</a:t>
+            </a:r>
+          </a:p>
+          <a:p>
+            <a:r>
+              <a:rPr lang="en-US" b="1" dirty="0" smtClean="0"/>
+              <a:t>pip</a:t>
+            </a:r>
+            <a:r>
+              <a:rPr lang="en-US" dirty="0" smtClean="0"/>
+              <a:t> and </a:t>
+            </a:r>
+            <a:r>
+              <a:rPr lang="en-US" b="1" dirty="0" smtClean="0"/>
+              <a:t>Anaconda</a:t>
+            </a:r>
+            <a:r>
+              <a:rPr lang="en-US" dirty="0" smtClean="0"/>
+              <a:t> are two excellent tools for managing what’s installed.</a:t>
+            </a:r>
+          </a:p>
+          <a:p>
+            <a:r>
+              <a:rPr lang="en-US" dirty="0" smtClean="0"/>
+              <a:t>E.g. to install </a:t>
+            </a:r>
+            <a:r>
+              <a:rPr lang="en-US" dirty="0" err="1" smtClean="0"/>
+              <a:t>numpy</a:t>
+            </a:r>
+            <a:r>
+              <a:rPr lang="en-US" dirty="0" smtClean="0"/>
+              <a:t>: ‘</a:t>
+            </a:r>
+            <a:r>
+              <a:rPr lang="en-US" b="1" dirty="0" smtClean="0"/>
+              <a:t>pip install </a:t>
+            </a:r>
+            <a:r>
+              <a:rPr lang="en-US" b="1" dirty="0" err="1" smtClean="0"/>
+              <a:t>numpy</a:t>
+            </a:r>
+            <a:r>
+              <a:rPr lang="en-US" dirty="0" smtClean="0"/>
+              <a:t>’</a:t>
+            </a:r>
+          </a:p>
+          <a:p>
+            <a:r>
+              <a:rPr lang="en-US" b="1" dirty="0" smtClean="0"/>
+              <a:t>Anaconda</a:t>
+            </a:r>
+            <a:r>
+              <a:rPr lang="en-US" dirty="0" smtClean="0"/>
+              <a:t> allows you to create </a:t>
+            </a:r>
+            <a:r>
+              <a:rPr lang="en-US" u="sng" dirty="0" smtClean="0"/>
+              <a:t>separate</a:t>
+            </a:r>
+            <a:r>
+              <a:rPr lang="en-US" dirty="0" smtClean="0"/>
+              <a:t> collections of packages, for version conflicts, etc.</a:t>
+            </a:r>
           </a:p>
         </p:txBody>
       </p:sp>
     </p:spTree>
     <p:extLst>
       <p:ext uri="{BB962C8B-B14F-4D97-AF65-F5344CB8AC3E}">
-        <p14:creationId xmlns:p14="http://schemas.microsoft.com/office/powerpoint/2010/main" val="756144120"/>
+        <p14:creationId xmlns:p14="http://schemas.microsoft.com/office/powerpoint/2010/main" val="729192639"/>
       </p:ext>
     </p:extLst>
   </p:cSld>
@@ -4130,7 +4854,177 @@
   <p:timing>
     <p:tnLst>
       <p:par>
-        <p:cTn id="1" dur="indefinite" restart="never" nodeType="tmRoot"/>
+        <p:cTn id="1" dur="indefinite" restart="never" nodeType="tmRoot">
+          <p:childTnLst>
+            <p:seq concurrent="1" nextAc="seek">
+              <p:cTn id="2" dur="indefinite" nodeType="mainSeq">
+                <p:childTnLst>
+                  <p:par>
+                    <p:cTn id="3" fill="hold">
+                      <p:stCondLst>
+                        <p:cond delay="indefinite"/>
+                      </p:stCondLst>
+                      <p:childTnLst>
+                        <p:par>
+                          <p:cTn id="4" fill="hold">
+                            <p:stCondLst>
+                              <p:cond delay="0"/>
+                            </p:stCondLst>
+                            <p:childTnLst>
+                              <p:par>
+                                <p:cTn id="5" presetID="1" presetClass="entr" presetSubtype="0" fill="hold" nodeType="clickEffect">
+                                  <p:stCondLst>
+                                    <p:cond delay="0"/>
+                                  </p:stCondLst>
+                                  <p:childTnLst>
+                                    <p:set>
+                                      <p:cBhvr>
+                                        <p:cTn id="6" dur="1" fill="hold">
+                                          <p:stCondLst>
+                                            <p:cond delay="0"/>
+                                          </p:stCondLst>
+                                        </p:cTn>
+                                        <p:tgtEl>
+                                          <p:spTgt spid="3">
+                                            <p:txEl>
+                                              <p:pRg st="1" end="1"/>
+                                            </p:txEl>
+                                          </p:spTgt>
+                                        </p:tgtEl>
+                                        <p:attrNameLst>
+                                          <p:attrName>style.visibility</p:attrName>
+                                        </p:attrNameLst>
+                                      </p:cBhvr>
+                                      <p:to>
+                                        <p:strVal val="visible"/>
+                                      </p:to>
+                                    </p:set>
+                                  </p:childTnLst>
+                                </p:cTn>
+                              </p:par>
+                            </p:childTnLst>
+                          </p:cTn>
+                        </p:par>
+                      </p:childTnLst>
+                    </p:cTn>
+                  </p:par>
+                  <p:par>
+                    <p:cTn id="7" fill="hold">
+                      <p:stCondLst>
+                        <p:cond delay="indefinite"/>
+                      </p:stCondLst>
+                      <p:childTnLst>
+                        <p:par>
+                          <p:cTn id="8" fill="hold">
+                            <p:stCondLst>
+                              <p:cond delay="0"/>
+                            </p:stCondLst>
+                            <p:childTnLst>
+                              <p:par>
+                                <p:cTn id="9" presetID="1" presetClass="entr" presetSubtype="0" fill="hold" nodeType="clickEffect">
+                                  <p:stCondLst>
+                                    <p:cond delay="0"/>
+                                  </p:stCondLst>
+                                  <p:childTnLst>
+                                    <p:set>
+                                      <p:cBhvr>
+                                        <p:cTn id="10" dur="1" fill="hold">
+                                          <p:stCondLst>
+                                            <p:cond delay="0"/>
+                                          </p:stCondLst>
+                                        </p:cTn>
+                                        <p:tgtEl>
+                                          <p:spTgt spid="3">
+                                            <p:txEl>
+                                              <p:pRg st="2" end="2"/>
+                                            </p:txEl>
+                                          </p:spTgt>
+                                        </p:tgtEl>
+                                        <p:attrNameLst>
+                                          <p:attrName>style.visibility</p:attrName>
+                                        </p:attrNameLst>
+                                      </p:cBhvr>
+                                      <p:to>
+                                        <p:strVal val="visible"/>
+                                      </p:to>
+                                    </p:set>
+                                  </p:childTnLst>
+                                </p:cTn>
+                              </p:par>
+                            </p:childTnLst>
+                          </p:cTn>
+                        </p:par>
+                      </p:childTnLst>
+                    </p:cTn>
+                  </p:par>
+                  <p:par>
+                    <p:cTn id="11" fill="hold">
+                      <p:stCondLst>
+                        <p:cond delay="indefinite"/>
+                      </p:stCondLst>
+                      <p:childTnLst>
+                        <p:par>
+                          <p:cTn id="12" fill="hold">
+                            <p:stCondLst>
+                              <p:cond delay="0"/>
+                            </p:stCondLst>
+                            <p:childTnLst>
+                              <p:par>
+                                <p:cTn id="13" presetID="1" presetClass="entr" presetSubtype="0" fill="hold" nodeType="clickEffect">
+                                  <p:stCondLst>
+                                    <p:cond delay="0"/>
+                                  </p:stCondLst>
+                                  <p:childTnLst>
+                                    <p:set>
+                                      <p:cBhvr>
+                                        <p:cTn id="14" dur="1" fill="hold">
+                                          <p:stCondLst>
+                                            <p:cond delay="0"/>
+                                          </p:stCondLst>
+                                        </p:cTn>
+                                        <p:tgtEl>
+                                          <p:spTgt spid="3">
+                                            <p:txEl>
+                                              <p:pRg st="3" end="3"/>
+                                            </p:txEl>
+                                          </p:spTgt>
+                                        </p:tgtEl>
+                                        <p:attrNameLst>
+                                          <p:attrName>style.visibility</p:attrName>
+                                        </p:attrNameLst>
+                                      </p:cBhvr>
+                                      <p:to>
+                                        <p:strVal val="visible"/>
+                                      </p:to>
+                                    </p:set>
+                                  </p:childTnLst>
+                                </p:cTn>
+                              </p:par>
+                            </p:childTnLst>
+                          </p:cTn>
+                        </p:par>
+                      </p:childTnLst>
+                    </p:cTn>
+                  </p:par>
+                </p:childTnLst>
+              </p:cTn>
+              <p:prevCondLst>
+                <p:cond evt="onPrev" delay="0">
+                  <p:tgtEl>
+                    <p:sldTgt/>
+                  </p:tgtEl>
+                </p:cond>
+              </p:prevCondLst>
+              <p:nextCondLst>
+                <p:cond evt="onNext" delay="0">
+                  <p:tgtEl>
+                    <p:sldTgt/>
+                  </p:tgtEl>
+                </p:cond>
+              </p:nextCondLst>
+            </p:seq>
+          </p:childTnLst>
+        </p:cTn>
       </p:par>
     </p:tnLst>
   </p:timing>
@@ -4171,7 +5065,15 @@
           <a:p>
             <a:r>
               <a:rPr lang="en-US" dirty="0" smtClean="0"/>
-              <a:t>Managing your Python environment</a:t>
+              <a:t>Three </a:t>
+            </a:r>
+            <a:r>
+              <a:rPr lang="en-US" dirty="0" smtClean="0"/>
+              <a:t>more Python </a:t>
+            </a:r>
+            <a:r>
+              <a:rPr lang="en-US" dirty="0" smtClean="0"/>
+              <a:t>Programs</a:t>
             </a:r>
             <a:endParaRPr lang="en-US" dirty="0"/>
           </a:p>
@@ -4187,12 +5089,7 @@
             <p:ph idx="1"/>
           </p:nvPr>
         </p:nvSpPr>
-        <p:spPr>
-          <a:xfrm>
-            <a:off x="457200" y="2049270"/>
-            <a:ext cx="8229600" cy="4449501"/>
-          </a:xfrm>
-        </p:spPr>
+        <p:spPr/>
         <p:txBody>
           <a:bodyPr>
             <a:normAutofit lnSpcReduction="10000"/>
@@ -4201,113 +5098,70 @@
           <a:p>
             <a:r>
               <a:rPr lang="en-US" dirty="0" smtClean="0"/>
-              <a:t>You will likely use libraries like </a:t>
-            </a:r>
-            <a:r>
-              <a:rPr lang="en-US" dirty="0" err="1" smtClean="0"/>
-              <a:t>numpy</a:t>
-            </a:r>
-            <a:r>
-              <a:rPr lang="en-US" dirty="0" smtClean="0"/>
-              <a:t>/</a:t>
-            </a:r>
-            <a:r>
-              <a:rPr lang="en-US" dirty="0" err="1" smtClean="0"/>
-              <a:t>scipy</a:t>
-            </a:r>
-            <a:r>
-              <a:rPr lang="en-US" dirty="0"/>
-              <a:t>, </a:t>
-            </a:r>
-            <a:r>
-              <a:rPr lang="en-US" dirty="0" err="1"/>
-              <a:t>astropy</a:t>
-            </a:r>
-            <a:r>
-              <a:rPr lang="en-US" dirty="0"/>
-              <a:t>, </a:t>
-            </a:r>
-            <a:r>
-              <a:rPr lang="en-US" dirty="0" err="1"/>
-              <a:t>matplotlib</a:t>
-            </a:r>
-            <a:r>
-              <a:rPr lang="en-US" dirty="0"/>
-              <a:t>, pandas, </a:t>
-            </a:r>
-            <a:r>
-              <a:rPr lang="en-US" dirty="0" smtClean="0"/>
-              <a:t>hdf5.</a:t>
-            </a:r>
-          </a:p>
-          <a:p>
-            <a:r>
-              <a:rPr lang="en-US" b="1" dirty="0" smtClean="0"/>
-              <a:t>pip</a:t>
-            </a:r>
-            <a:r>
-              <a:rPr lang="en-US" dirty="0" smtClean="0"/>
-              <a:t> and </a:t>
-            </a:r>
-            <a:r>
-              <a:rPr lang="en-US" b="1" dirty="0" smtClean="0"/>
-              <a:t>Anaconda</a:t>
-            </a:r>
-            <a:r>
-              <a:rPr lang="en-US" dirty="0" smtClean="0"/>
-              <a:t> are two excellent tools for managing what’s installed.</a:t>
-            </a:r>
-          </a:p>
-          <a:p>
-            <a:r>
-              <a:rPr lang="en-US" dirty="0" smtClean="0"/>
-              <a:t>E.g. to install </a:t>
-            </a:r>
-            <a:r>
-              <a:rPr lang="en-US" dirty="0" err="1" smtClean="0"/>
-              <a:t>numpy</a:t>
-            </a:r>
-            <a:r>
-              <a:rPr lang="en-US" dirty="0" smtClean="0"/>
-              <a:t>: ‘</a:t>
-            </a:r>
-            <a:r>
-              <a:rPr lang="en-US" b="1" dirty="0" smtClean="0"/>
-              <a:t>pip install </a:t>
-            </a:r>
-            <a:r>
-              <a:rPr lang="en-US" b="1" dirty="0" err="1" smtClean="0"/>
-              <a:t>numpy</a:t>
-            </a:r>
-            <a:r>
-              <a:rPr lang="en-US" dirty="0" smtClean="0"/>
-              <a:t>’</a:t>
-            </a:r>
-          </a:p>
-          <a:p>
-            <a:r>
-              <a:rPr lang="en-US" b="1" dirty="0" smtClean="0"/>
-              <a:t>Anaconda</a:t>
-            </a:r>
-            <a:r>
-              <a:rPr lang="en-US" dirty="0" smtClean="0"/>
-              <a:t> allows you to create </a:t>
-            </a:r>
-            <a:r>
-              <a:rPr lang="en-US" u="sng" dirty="0" smtClean="0"/>
-              <a:t>separate</a:t>
-            </a:r>
-            <a:r>
-              <a:rPr lang="en-US" dirty="0" smtClean="0"/>
-              <a:t> collections of packages, for version conflicts, etc.</a:t>
-            </a:r>
+              <a:t>Determining last Friday’s date</a:t>
+            </a:r>
+          </a:p>
+          <a:p>
+            <a:pPr lvl="1"/>
+            <a:r>
+              <a:rPr lang="en-US" dirty="0" smtClean="0">
+                <a:hlinkClick r:id="rId2"/>
+              </a:rPr>
+              <a:t>https://git.io/v6bXt</a:t>
+            </a:r>
+            <a:endParaRPr lang="en-US" dirty="0" smtClean="0"/>
+          </a:p>
+          <a:p>
+            <a:r>
+              <a:rPr lang="en-US" dirty="0" smtClean="0"/>
+              <a:t>Reading data from a text file</a:t>
+            </a:r>
+          </a:p>
+          <a:p>
+            <a:pPr lvl="1"/>
+            <a:r>
+              <a:rPr lang="en-US" dirty="0">
+                <a:hlinkClick r:id="rId3"/>
+              </a:rPr>
+              <a:t>https://</a:t>
+            </a:r>
+            <a:r>
+              <a:rPr lang="en-US" dirty="0" smtClean="0">
+                <a:hlinkClick r:id="rId3"/>
+              </a:rPr>
+              <a:t>git.io/viqsg</a:t>
+            </a:r>
+            <a:r>
+              <a:rPr lang="en-US" dirty="0" smtClean="0"/>
+              <a:t> </a:t>
+            </a:r>
+            <a:endParaRPr lang="en-US" dirty="0" smtClean="0"/>
+          </a:p>
+          <a:p>
+            <a:r>
+              <a:rPr lang="en-US" dirty="0" smtClean="0"/>
+              <a:t>Brownian motion</a:t>
+            </a:r>
+          </a:p>
+          <a:p>
+            <a:pPr lvl="1"/>
+            <a:r>
+              <a:rPr lang="en-US" dirty="0" smtClean="0">
+                <a:hlinkClick r:id="rId4"/>
+              </a:rPr>
+              <a:t>http://scipy-cookbook.readthedocs.io/items/BrownianMotion.html</a:t>
+            </a:r>
+            <a:endParaRPr lang="en-US" dirty="0" smtClean="0"/>
+          </a:p>
+          <a:p>
+            <a:endParaRPr lang="en-US" dirty="0" smtClean="0"/>
           </a:p>
         </p:txBody>
       </p:sp>
     </p:spTree>
     <p:extLst>
       <p:ext uri="{BB962C8B-B14F-4D97-AF65-F5344CB8AC3E}">
-        <p14:creationId xmlns:p14="http://schemas.microsoft.com/office/powerpoint/2010/main" val="729192639"/>
+        <p14:creationId xmlns:p14="http://schemas.microsoft.com/office/powerpoint/2010/main" val="908582744"/>
       </p:ext>
     </p:extLst>
   </p:cSld>
@@ -4357,8 +5211,20 @@
           <a:lstStyle/>
           <a:p>
             <a:r>
-              <a:rPr lang="en-US" dirty="0" smtClean="0"/>
-              <a:t>Three Longer Python Programs</a:t>
+              <a:rPr lang="en-US" dirty="0" err="1" smtClean="0"/>
+              <a:t>IPython</a:t>
+            </a:r>
+            <a:r>
+              <a:rPr lang="en-US" dirty="0" smtClean="0"/>
+              <a:t>/</a:t>
+            </a:r>
+            <a:r>
+              <a:rPr lang="en-US" dirty="0" err="1" smtClean="0"/>
+              <a:t>Jupyter</a:t>
+            </a:r>
+            <a:r>
+              <a:rPr lang="en-US" dirty="0" smtClean="0"/>
+              <a:t> interface</a:t>
             </a:r>
             <a:endParaRPr lang="en-US" dirty="0"/>
           </a:p>
@@ -4372,112 +5238,6 @@
           </p:cNvSpPr>
           <p:nvPr>
             <p:ph idx="1"/>
-          </p:nvPr>
-        </p:nvSpPr>
-        <p:spPr/>
-        <p:txBody>
-          <a:bodyPr>
-            <a:normAutofit lnSpcReduction="10000"/>
-          </a:bodyPr>
-          <a:lstStyle/>
-          <a:p>
-            <a:r>
-              <a:rPr lang="en-US" dirty="0" smtClean="0"/>
-              <a:t>Determining last Friday’s date</a:t>
-            </a:r>
-          </a:p>
-          <a:p>
-            <a:pPr lvl="1"/>
-            <a:r>
-              <a:rPr lang="en-US" dirty="0" smtClean="0">
-                <a:hlinkClick r:id="rId2"/>
-              </a:rPr>
-              <a:t>https://git.io/v6bXt</a:t>
-            </a:r>
-            <a:endParaRPr lang="en-US" dirty="0" smtClean="0"/>
-          </a:p>
-          <a:p>
-            <a:r>
-              <a:rPr lang="en-US" dirty="0" smtClean="0"/>
-              <a:t>Parsing and plotting data from a CSV</a:t>
-            </a:r>
-          </a:p>
-          <a:p>
-            <a:pPr lvl="1"/>
-            <a:r>
-              <a:rPr lang="en-US" dirty="0" smtClean="0">
-                <a:hlinkClick r:id="rId3"/>
-              </a:rPr>
-              <a:t>https://git.io/v6bXf</a:t>
-            </a:r>
-            <a:endParaRPr lang="en-US" dirty="0" smtClean="0"/>
-          </a:p>
-          <a:p>
-            <a:r>
-              <a:rPr lang="en-US" dirty="0" smtClean="0"/>
-              <a:t>Brownian motion</a:t>
-            </a:r>
-          </a:p>
-          <a:p>
-            <a:pPr lvl="1"/>
-            <a:r>
-              <a:rPr lang="en-US" dirty="0" smtClean="0">
-                <a:hlinkClick r:id="rId4"/>
-              </a:rPr>
-              <a:t>http://scipy-cookbook.readthedocs.io/items/BrownianMotion.html</a:t>
-            </a:r>
-            <a:endParaRPr lang="en-US" dirty="0" smtClean="0"/>
-          </a:p>
-          <a:p>
-            <a:endParaRPr lang="en-US" dirty="0" smtClean="0"/>
-          </a:p>
-        </p:txBody>
-      </p:sp>
-    </p:spTree>
-    <p:extLst>
-      <p:ext uri="{BB962C8B-B14F-4D97-AF65-F5344CB8AC3E}">
-        <p14:creationId xmlns:p14="http://schemas.microsoft.com/office/powerpoint/2010/main" val="908582744"/>
-      </p:ext>
-    </p:extLst>
-  </p:cSld>
-  <p:clrMapOvr>
-    <a:masterClrMapping/>
-  </p:clrMapOvr>
-  <p:timing>
-    <p:tnLst>
-      <p:par>
-        <p:cTn id="1" dur="indefinite" restart="never" nodeType="tmRoot"/>
-      </p:par>
-    </p:tnLst>
-  </p:timing>
-</p:sld>
-</file>
-
-<file path=ppt/slides/slide18.xml><?xml version="1.0" encoding="utf-8"?>
-<p:sld xmlns:a="http://schemas.openxmlformats.org/drawingml/2006/main" xmlns:r="http://schemas.openxmlformats.org/officeDocument/2006/relationships" xmlns:p="http://schemas.openxmlformats.org/presentationml/2006/main">
-  <p:cSld>
-    <p:spTree>
-      <p:nvGrpSpPr>
-        <p:cNvPr id="1" name=""/>
-        <p:cNvGrpSpPr/>
-        <p:nvPr/>
-      </p:nvGrpSpPr>
-      <p:grpSpPr>
-        <a:xfrm>
-          <a:off x="0" y="0"/>
-          <a:ext cx="0" cy="0"/>
-          <a:chOff x="0" y="0"/>
-          <a:chExt cx="0" cy="0"/>
-        </a:xfrm>
-      </p:grpSpPr>
-      <p:sp>
-        <p:nvSpPr>
-          <p:cNvPr id="2" name="Title 1"/>
-          <p:cNvSpPr>
-            <a:spLocks noGrp="1"/>
-          </p:cNvSpPr>
-          <p:nvPr>
-            <p:ph type="title"/>
           </p:nvPr>
         </p:nvSpPr>
         <p:spPr/>
@@ -4486,49 +5246,27 @@
           <a:lstStyle/>
           <a:p>
             <a:r>
+              <a:rPr lang="en-US" dirty="0" smtClean="0"/>
+              <a:t>A REPL is helpful when you want to type a handful of lines once, but not useful for long sessions</a:t>
+            </a:r>
+          </a:p>
+          <a:p>
+            <a:r>
               <a:rPr lang="en-US" dirty="0" err="1" smtClean="0"/>
               <a:t>Jupyter</a:t>
             </a:r>
             <a:r>
               <a:rPr lang="en-US" dirty="0" smtClean="0"/>
-              <a:t> notebooks</a:t>
-            </a:r>
-            <a:endParaRPr lang="en-US" dirty="0"/>
-          </a:p>
-        </p:txBody>
-      </p:sp>
-      <p:sp>
-        <p:nvSpPr>
-          <p:cNvPr id="3" name="Content Placeholder 2"/>
-          <p:cNvSpPr>
-            <a:spLocks noGrp="1"/>
-          </p:cNvSpPr>
-          <p:nvPr>
-            <p:ph idx="1"/>
-          </p:nvPr>
-        </p:nvSpPr>
-        <p:spPr/>
-        <p:txBody>
-          <a:bodyPr/>
-          <a:lstStyle/>
-          <a:p>
-            <a:r>
-              <a:rPr lang="en-US" dirty="0"/>
-              <a:t>Specifically mention Markdown (and </a:t>
-            </a:r>
-            <a:r>
-              <a:rPr lang="en-US" dirty="0" err="1"/>
-              <a:t>pandoc</a:t>
-            </a:r>
-            <a:r>
-              <a:rPr lang="en-US" dirty="0"/>
-              <a:t>), draw analogy to </a:t>
-            </a:r>
-            <a:r>
-              <a:rPr lang="en-US" dirty="0" smtClean="0"/>
-              <a:t>Mathematica</a:t>
-            </a:r>
-            <a:endParaRPr lang="en-US" dirty="0"/>
+              <a:t> notebooks allow the user to define “cells” of Python input which produce output, and can be run/edited arbitrarily.</a:t>
+            </a:r>
+          </a:p>
+          <a:p>
+            <a:pPr lvl="1"/>
+            <a:r>
+              <a:rPr lang="en-US" dirty="0" smtClean="0"/>
+              <a:t>Think Mathematica without the symbolic math</a:t>
+            </a:r>
+            <a:endParaRPr lang="en-US" dirty="0" smtClean="0"/>
           </a:p>
         </p:txBody>
       </p:sp>
@@ -4545,14 +5283,135 @@
   <p:timing>
     <p:tnLst>
       <p:par>
-        <p:cTn id="1" dur="indefinite" restart="never" nodeType="tmRoot"/>
+        <p:cTn id="1" dur="indefinite" restart="never" nodeType="tmRoot">
+          <p:childTnLst>
+            <p:seq concurrent="1" nextAc="seek">
+              <p:cTn id="2" dur="indefinite" nodeType="mainSeq">
+                <p:childTnLst>
+                  <p:par>
+                    <p:cTn id="3" fill="hold">
+                      <p:stCondLst>
+                        <p:cond delay="indefinite"/>
+                      </p:stCondLst>
+                      <p:childTnLst>
+                        <p:par>
+                          <p:cTn id="4" fill="hold">
+                            <p:stCondLst>
+                              <p:cond delay="0"/>
+                            </p:stCondLst>
+                            <p:childTnLst>
+                              <p:par>
+                                <p:cTn id="5" presetID="1" presetClass="entr" presetSubtype="0" fill="hold" nodeType="clickEffect">
+                                  <p:stCondLst>
+                                    <p:cond delay="0"/>
+                                  </p:stCondLst>
+                                  <p:childTnLst>
+                                    <p:set>
+                                      <p:cBhvr>
+                                        <p:cTn id="6" dur="1" fill="hold">
+                                          <p:stCondLst>
+                                            <p:cond delay="0"/>
+                                          </p:stCondLst>
+                                        </p:cTn>
+                                        <p:tgtEl>
+                                          <p:spTgt spid="3">
+                                            <p:txEl>
+                                              <p:pRg st="1" end="1"/>
+                                            </p:txEl>
+                                          </p:spTgt>
+                                        </p:tgtEl>
+                                        <p:attrNameLst>
+                                          <p:attrName>style.visibility</p:attrName>
+                                        </p:attrNameLst>
+                                      </p:cBhvr>
+                                      <p:to>
+                                        <p:strVal val="visible"/>
+                                      </p:to>
+                                    </p:set>
+                                  </p:childTnLst>
+                                </p:cTn>
+                              </p:par>
+                            </p:childTnLst>
+                          </p:cTn>
+                        </p:par>
+                      </p:childTnLst>
+                    </p:cTn>
+                  </p:par>
+                  <p:par>
+                    <p:cTn id="7" fill="hold">
+                      <p:stCondLst>
+                        <p:cond delay="indefinite"/>
+                      </p:stCondLst>
+                      <p:childTnLst>
+                        <p:par>
+                          <p:cTn id="8" fill="hold">
+                            <p:stCondLst>
+                              <p:cond delay="0"/>
+                            </p:stCondLst>
+                            <p:childTnLst>
+                              <p:par>
+                                <p:cTn id="9" presetID="1" presetClass="entr" presetSubtype="0" fill="hold" nodeType="clickEffect">
+                                  <p:stCondLst>
+                                    <p:cond delay="0"/>
+                                  </p:stCondLst>
+                                  <p:childTnLst>
+                                    <p:set>
+                                      <p:cBhvr>
+                                        <p:cTn id="10" dur="1" fill="hold">
+                                          <p:stCondLst>
+                                            <p:cond delay="0"/>
+                                          </p:stCondLst>
+                                        </p:cTn>
+                                        <p:tgtEl>
+                                          <p:spTgt spid="3">
+                                            <p:txEl>
+                                              <p:pRg st="2" end="2"/>
+                                            </p:txEl>
+                                          </p:spTgt>
+                                        </p:tgtEl>
+                                        <p:attrNameLst>
+                                          <p:attrName>style.visibility</p:attrName>
+                                        </p:attrNameLst>
+                                      </p:cBhvr>
+                                      <p:to>
+                                        <p:strVal val="visible"/>
+                                      </p:to>
+                                    </p:set>
+                                  </p:childTnLst>
+                                </p:cTn>
+                              </p:par>
+                            </p:childTnLst>
+                          </p:cTn>
+                        </p:par>
+                      </p:childTnLst>
+                    </p:cTn>
+                  </p:par>
+                </p:childTnLst>
+              </p:cTn>
+              <p:prevCondLst>
+                <p:cond evt="onPrev" delay="0">
+                  <p:tgtEl>
+                    <p:sldTgt/>
+                  </p:tgtEl>
+                </p:cond>
+              </p:prevCondLst>
+              <p:nextCondLst>
+                <p:cond evt="onNext" delay="0">
+                  <p:tgtEl>
+                    <p:sldTgt/>
+                  </p:tgtEl>
+                </p:cond>
+              </p:nextCondLst>
+            </p:seq>
+          </p:childTnLst>
+        </p:cTn>
       </p:par>
     </p:tnLst>
   </p:timing>
 </p:sld>
 </file>
 
-<file path=ppt/slides/slide19.xml><?xml version="1.0" encoding="utf-8"?>
+<file path=ppt/slides/slide18.xml><?xml version="1.0" encoding="utf-8"?>
 <p:sld xmlns:a="http://schemas.openxmlformats.org/drawingml/2006/main" xmlns:r="http://schemas.openxmlformats.org/officeDocument/2006/relationships" xmlns:p="http://schemas.openxmlformats.org/presentationml/2006/main">
   <p:cSld>
     <p:spTree>
@@ -4682,27 +5541,9 @@
 </p:sld>
 </file>
 
-<file path=ppt/slides/slide2.xml><?xml version="1.0" encoding="utf-8"?>
+<file path=ppt/slides/slide19.xml><?xml version="1.0" encoding="utf-8"?>
 <p:sld xmlns:a="http://schemas.openxmlformats.org/drawingml/2006/main" xmlns:r="http://schemas.openxmlformats.org/officeDocument/2006/relationships" xmlns:p="http://schemas.openxmlformats.org/presentationml/2006/main">
   <p:cSld>
-    <p:bg>
-      <p:bgPr>
-        <a:gradFill>
-          <a:gsLst>
-            <a:gs pos="0">
-              <a:srgbClr val="500000">
-                <a:lumMod val="16000"/>
-              </a:srgbClr>
-            </a:gs>
-            <a:gs pos="100000">
-              <a:srgbClr val="540000"/>
-            </a:gs>
-          </a:gsLst>
-          <a:lin ang="2700000" scaled="0"/>
-        </a:gradFill>
-        <a:effectLst/>
-      </p:bgPr>
-    </p:bg>
     <p:spTree>
       <p:nvGrpSpPr>
         <p:cNvPr id="1" name=""/>
@@ -4724,13 +5565,36 @@
             <a:spLocks noGrp="1"/>
           </p:cNvSpPr>
           <p:nvPr>
-            <p:ph type="ctrTitle"/>
+            <p:ph type="title"/>
+          </p:nvPr>
+        </p:nvSpPr>
+        <p:spPr/>
+        <p:txBody>
+          <a:bodyPr/>
+          <a:lstStyle/>
+          <a:p>
+            <a:r>
+              <a:rPr lang="en-US" dirty="0" smtClean="0"/>
+              <a:t>Writing code that doesn’t suck</a:t>
+            </a:r>
+            <a:endParaRPr lang="en-US" dirty="0"/>
+          </a:p>
+        </p:txBody>
+      </p:sp>
+      <p:sp>
+        <p:nvSpPr>
+          <p:cNvPr id="3" name="Content Placeholder 2"/>
+          <p:cNvSpPr>
+            <a:spLocks noGrp="1"/>
+          </p:cNvSpPr>
+          <p:nvPr>
+            <p:ph idx="1"/>
           </p:nvPr>
         </p:nvSpPr>
         <p:spPr>
           <a:xfrm>
-            <a:off x="1830864" y="2227031"/>
-            <a:ext cx="5361690" cy="1755957"/>
+            <a:off x="457200" y="2049270"/>
+            <a:ext cx="8229600" cy="4564472"/>
           </a:xfrm>
         </p:spPr>
         <p:txBody>
@@ -4739,476 +5603,58 @@
           </a:bodyPr>
           <a:lstStyle/>
           <a:p>
-            <a:pPr algn="ctr"/>
-            <a:r>
-              <a:rPr lang="en-US" sz="2800" dirty="0" smtClean="0">
-                <a:latin typeface="Miriam" panose="020B0502050101010101" pitchFamily="34" charset="-79"/>
-                <a:cs typeface="Miriam" panose="020B0502050101010101" pitchFamily="34" charset="-79"/>
+            <a:r>
+              <a:rPr lang="en-US" dirty="0" smtClean="0"/>
+              <a:t>Python makes it easier to write code that is simple to read</a:t>
+            </a:r>
+          </a:p>
+          <a:p>
+            <a:pPr lvl="1"/>
+            <a:r>
+              <a:rPr lang="en-US" dirty="0" smtClean="0"/>
+              <a:t>Enforced indentation and lack of braces helps</a:t>
+            </a:r>
+          </a:p>
+          <a:p>
+            <a:r>
+              <a:rPr lang="en-US" dirty="0" smtClean="0"/>
+              <a:t>It doesn’t make writing bad code impossible!</a:t>
+            </a:r>
+          </a:p>
+          <a:p>
+            <a:r>
+              <a:rPr lang="en-US" dirty="0" smtClean="0"/>
+              <a:t>Python’s PEP 8 is long, but has good guidelines</a:t>
+            </a:r>
+          </a:p>
+          <a:p>
+            <a:pPr lvl="1"/>
+            <a:r>
+              <a:rPr lang="en-US" dirty="0">
+                <a:hlinkClick r:id="rId2"/>
               </a:rPr>
-              <a:t>Introduction to Python</a:t>
-            </a:r>
-            <a:endParaRPr lang="en-US" sz="2800" dirty="0">
-              <a:latin typeface="Miriam" panose="020B0502050101010101" pitchFamily="34" charset="-79"/>
-              <a:cs typeface="Miriam" panose="020B0502050101010101" pitchFamily="34" charset="-79"/>
-            </a:endParaRPr>
-          </a:p>
-        </p:txBody>
-      </p:sp>
-      <p:sp>
-        <p:nvSpPr>
-          <p:cNvPr id="3" name="Subtitle 2"/>
-          <p:cNvSpPr>
-            <a:spLocks noGrp="1"/>
-          </p:cNvSpPr>
-          <p:nvPr>
-            <p:ph type="subTitle" idx="1"/>
-          </p:nvPr>
-        </p:nvSpPr>
-        <p:spPr>
-          <a:xfrm>
-            <a:off x="3427069" y="3537793"/>
-            <a:ext cx="2169279" cy="388814"/>
-          </a:xfrm>
-        </p:spPr>
-        <p:txBody>
-          <a:bodyPr>
-            <a:normAutofit lnSpcReduction="10000"/>
-          </a:bodyPr>
-          <a:lstStyle/>
-          <a:p>
-            <a:pPr algn="ctr"/>
-            <a:r>
-              <a:rPr lang="en-US" sz="2000" dirty="0" smtClean="0">
-                <a:latin typeface="Miriam" panose="020B0502050101010101" pitchFamily="34" charset="-79"/>
-                <a:cs typeface="Miriam" panose="020B0502050101010101" pitchFamily="34" charset="-79"/>
+              <a:t>https://www.python.org/dev/peps/pep-0008</a:t>
+            </a:r>
+            <a:r>
+              <a:rPr lang="en-US" dirty="0" smtClean="0">
+                <a:hlinkClick r:id="rId2"/>
               </a:rPr>
-              <a:t>James </a:t>
-            </a:r>
-            <a:r>
-              <a:rPr lang="en-US" sz="2000" dirty="0" err="1" smtClean="0">
-                <a:latin typeface="Miriam" panose="020B0502050101010101" pitchFamily="34" charset="-79"/>
-                <a:cs typeface="Miriam" panose="020B0502050101010101" pitchFamily="34" charset="-79"/>
-              </a:rPr>
-              <a:t>Gerity</a:t>
-            </a:r>
-            <a:endParaRPr lang="en-US" sz="2000" dirty="0" smtClean="0">
-              <a:latin typeface="Miriam" panose="020B0502050101010101" pitchFamily="34" charset="-79"/>
-              <a:cs typeface="Miriam" panose="020B0502050101010101" pitchFamily="34" charset="-79"/>
-            </a:endParaRPr>
-          </a:p>
-        </p:txBody>
-      </p:sp>
-      <p:pic>
-        <p:nvPicPr>
-          <p:cNvPr id="8" name="Picture 7"/>
-          <p:cNvPicPr>
-            <a:picLocks noChangeAspect="1"/>
-          </p:cNvPicPr>
-          <p:nvPr/>
-        </p:nvPicPr>
-        <p:blipFill>
-          <a:blip r:embed="rId3">
-            <a:extLst>
-              <a:ext uri="{28A0092B-C50C-407E-A947-70E740481C1C}">
-                <a14:useLocalDpi xmlns:a14="http://schemas.microsoft.com/office/drawing/2010/main" val="0"/>
-              </a:ext>
-            </a:extLst>
-          </a:blip>
-          <a:stretch>
-            <a:fillRect/>
-          </a:stretch>
-        </p:blipFill>
-        <p:spPr>
-          <a:xfrm>
-            <a:off x="4511709" y="170249"/>
-            <a:ext cx="4632291" cy="1158073"/>
-          </a:xfrm>
-          <a:prstGeom prst="rect">
-            <a:avLst/>
-          </a:prstGeom>
-        </p:spPr>
-      </p:pic>
-      <p:sp>
-        <p:nvSpPr>
-          <p:cNvPr id="6" name="Subtitle 2"/>
-          <p:cNvSpPr txBox="1">
-            <a:spLocks/>
-          </p:cNvSpPr>
-          <p:nvPr/>
-        </p:nvSpPr>
-        <p:spPr>
-          <a:xfrm>
-            <a:off x="3659089" y="3926607"/>
-            <a:ext cx="1705239" cy="455526"/>
-          </a:xfrm>
-          <a:prstGeom prst="rect">
-            <a:avLst/>
-          </a:prstGeom>
-        </p:spPr>
-        <p:txBody>
-          <a:bodyPr vert="horz" lIns="91440" tIns="45720" rIns="91440" bIns="45720" rtlCol="0">
-            <a:normAutofit/>
-          </a:bodyPr>
-          <a:lstStyle>
-            <a:lvl1pPr marL="0" indent="0" algn="r" defTabSz="457200" rtl="0" eaLnBrk="1" latinLnBrk="0" hangingPunct="1">
-              <a:spcBef>
-                <a:spcPct val="20000"/>
-              </a:spcBef>
-              <a:buFont typeface="Arial"/>
-              <a:buNone/>
-              <a:defRPr sz="2800" kern="1200">
-                <a:solidFill>
-                  <a:srgbClr val="FFFFFF"/>
-                </a:solidFill>
-                <a:latin typeface="+mn-lt"/>
-                <a:ea typeface="+mn-ea"/>
-                <a:cs typeface="+mn-cs"/>
-              </a:defRPr>
-            </a:lvl1pPr>
-            <a:lvl2pPr marL="457200" indent="0" algn="ctr" defTabSz="457200" rtl="0" eaLnBrk="1" latinLnBrk="0" hangingPunct="1">
-              <a:spcBef>
-                <a:spcPct val="20000"/>
-              </a:spcBef>
-              <a:buFont typeface="Arial"/>
-              <a:buNone/>
-              <a:defRPr sz="2800" kern="1200">
-                <a:solidFill>
-                  <a:schemeClr val="tx1">
-                    <a:tint val="75000"/>
-                  </a:schemeClr>
-                </a:solidFill>
-                <a:latin typeface="+mn-lt"/>
-                <a:ea typeface="+mn-ea"/>
-                <a:cs typeface="+mn-cs"/>
-              </a:defRPr>
-            </a:lvl2pPr>
-            <a:lvl3pPr marL="914400" indent="0" algn="ctr" defTabSz="457200" rtl="0" eaLnBrk="1" latinLnBrk="0" hangingPunct="1">
-              <a:spcBef>
-                <a:spcPct val="20000"/>
-              </a:spcBef>
-              <a:buFont typeface="Arial"/>
-              <a:buNone/>
-              <a:defRPr sz="2400" kern="1200">
-                <a:solidFill>
-                  <a:schemeClr val="tx1">
-                    <a:tint val="75000"/>
-                  </a:schemeClr>
-                </a:solidFill>
-                <a:latin typeface="+mn-lt"/>
-                <a:ea typeface="+mn-ea"/>
-                <a:cs typeface="+mn-cs"/>
-              </a:defRPr>
-            </a:lvl3pPr>
-            <a:lvl4pPr marL="1371600" indent="0" algn="ctr" defTabSz="457200" rtl="0" eaLnBrk="1" latinLnBrk="0" hangingPunct="1">
-              <a:spcBef>
-                <a:spcPct val="20000"/>
-              </a:spcBef>
-              <a:buFont typeface="Arial"/>
-              <a:buNone/>
-              <a:defRPr sz="2000" kern="1200">
-                <a:solidFill>
-                  <a:schemeClr val="tx1">
-                    <a:tint val="75000"/>
-                  </a:schemeClr>
-                </a:solidFill>
-                <a:latin typeface="+mn-lt"/>
-                <a:ea typeface="+mn-ea"/>
-                <a:cs typeface="+mn-cs"/>
-              </a:defRPr>
-            </a:lvl4pPr>
-            <a:lvl5pPr marL="1828800" indent="0" algn="ctr" defTabSz="457200" rtl="0" eaLnBrk="1" latinLnBrk="0" hangingPunct="1">
-              <a:spcBef>
-                <a:spcPct val="20000"/>
-              </a:spcBef>
-              <a:buFont typeface="Arial"/>
-              <a:buNone/>
-              <a:defRPr sz="2000" kern="1200">
-                <a:solidFill>
-                  <a:schemeClr val="tx1">
-                    <a:tint val="75000"/>
-                  </a:schemeClr>
-                </a:solidFill>
-                <a:latin typeface="+mn-lt"/>
-                <a:ea typeface="+mn-ea"/>
-                <a:cs typeface="+mn-cs"/>
-              </a:defRPr>
-            </a:lvl5pPr>
-            <a:lvl6pPr marL="2286000" indent="0" algn="ctr" defTabSz="457200" rtl="0" eaLnBrk="1" latinLnBrk="0" hangingPunct="1">
-              <a:spcBef>
-                <a:spcPct val="20000"/>
-              </a:spcBef>
-              <a:buFont typeface="Arial"/>
-              <a:buNone/>
-              <a:defRPr sz="2000" kern="1200">
-                <a:solidFill>
-                  <a:schemeClr val="tx1">
-                    <a:tint val="75000"/>
-                  </a:schemeClr>
-                </a:solidFill>
-                <a:latin typeface="+mn-lt"/>
-                <a:ea typeface="+mn-ea"/>
-                <a:cs typeface="+mn-cs"/>
-              </a:defRPr>
-            </a:lvl6pPr>
-            <a:lvl7pPr marL="2743200" indent="0" algn="ctr" defTabSz="457200" rtl="0" eaLnBrk="1" latinLnBrk="0" hangingPunct="1">
-              <a:spcBef>
-                <a:spcPct val="20000"/>
-              </a:spcBef>
-              <a:buFont typeface="Arial"/>
-              <a:buNone/>
-              <a:defRPr sz="2000" kern="1200">
-                <a:solidFill>
-                  <a:schemeClr val="tx1">
-                    <a:tint val="75000"/>
-                  </a:schemeClr>
-                </a:solidFill>
-                <a:latin typeface="+mn-lt"/>
-                <a:ea typeface="+mn-ea"/>
-                <a:cs typeface="+mn-cs"/>
-              </a:defRPr>
-            </a:lvl7pPr>
-            <a:lvl8pPr marL="3200400" indent="0" algn="ctr" defTabSz="457200" rtl="0" eaLnBrk="1" latinLnBrk="0" hangingPunct="1">
-              <a:spcBef>
-                <a:spcPct val="20000"/>
-              </a:spcBef>
-              <a:buFont typeface="Arial"/>
-              <a:buNone/>
-              <a:defRPr sz="2000" kern="1200">
-                <a:solidFill>
-                  <a:schemeClr val="tx1">
-                    <a:tint val="75000"/>
-                  </a:schemeClr>
-                </a:solidFill>
-                <a:latin typeface="+mn-lt"/>
-                <a:ea typeface="+mn-ea"/>
-                <a:cs typeface="+mn-cs"/>
-              </a:defRPr>
-            </a:lvl8pPr>
-            <a:lvl9pPr marL="3657600" indent="0" algn="ctr" defTabSz="457200" rtl="0" eaLnBrk="1" latinLnBrk="0" hangingPunct="1">
-              <a:spcBef>
-                <a:spcPct val="20000"/>
-              </a:spcBef>
-              <a:buFont typeface="Arial"/>
-              <a:buNone/>
-              <a:defRPr sz="2000" kern="1200">
-                <a:solidFill>
-                  <a:schemeClr val="tx1">
-                    <a:tint val="75000"/>
-                  </a:schemeClr>
-                </a:solidFill>
-                <a:latin typeface="+mn-lt"/>
-                <a:ea typeface="+mn-ea"/>
-                <a:cs typeface="+mn-cs"/>
-              </a:defRPr>
-            </a:lvl9pPr>
-          </a:lstStyle>
-          <a:p>
-            <a:pPr algn="ctr"/>
-            <a:fld id="{60F4F9CB-1C05-4986-B519-E0AD17B47FBC}" type="datetime4">
-              <a:rPr lang="en-US" sz="1600" smtClean="0">
-                <a:latin typeface="Miriam" panose="020B0502050101010101" pitchFamily="34" charset="-79"/>
-                <a:cs typeface="Miriam" panose="020B0502050101010101" pitchFamily="34" charset="-79"/>
-              </a:rPr>
-              <a:pPr algn="ctr"/>
-              <a:t>August 30, 2016</a:t>
-            </a:fld>
-            <a:endParaRPr lang="en-US" sz="1600" dirty="0" smtClean="0">
-              <a:latin typeface="Miriam" panose="020B0502050101010101" pitchFamily="34" charset="-79"/>
-              <a:cs typeface="Miriam" panose="020B0502050101010101" pitchFamily="34" charset="-79"/>
-            </a:endParaRPr>
-          </a:p>
-        </p:txBody>
-      </p:sp>
-      <p:sp>
-        <p:nvSpPr>
-          <p:cNvPr id="9" name="Subtitle 2"/>
-          <p:cNvSpPr txBox="1">
-            <a:spLocks/>
-          </p:cNvSpPr>
-          <p:nvPr/>
-        </p:nvSpPr>
-        <p:spPr>
-          <a:xfrm>
-            <a:off x="2057996" y="6328391"/>
-            <a:ext cx="4907425" cy="455526"/>
-          </a:xfrm>
-          <a:prstGeom prst="rect">
-            <a:avLst/>
-          </a:prstGeom>
-        </p:spPr>
-        <p:txBody>
-          <a:bodyPr vert="horz" lIns="91440" tIns="45720" rIns="91440" bIns="45720" rtlCol="0">
-            <a:normAutofit/>
-          </a:bodyPr>
-          <a:lstStyle>
-            <a:lvl1pPr marL="0" indent="0" algn="r" defTabSz="457200" rtl="0" eaLnBrk="1" latinLnBrk="0" hangingPunct="1">
-              <a:spcBef>
-                <a:spcPct val="20000"/>
-              </a:spcBef>
-              <a:buFont typeface="Arial"/>
-              <a:buNone/>
-              <a:defRPr sz="2800" kern="1200">
-                <a:solidFill>
-                  <a:srgbClr val="FFFFFF"/>
-                </a:solidFill>
-                <a:latin typeface="+mn-lt"/>
-                <a:ea typeface="+mn-ea"/>
-                <a:cs typeface="+mn-cs"/>
-              </a:defRPr>
-            </a:lvl1pPr>
-            <a:lvl2pPr marL="457200" indent="0" algn="ctr" defTabSz="457200" rtl="0" eaLnBrk="1" latinLnBrk="0" hangingPunct="1">
-              <a:spcBef>
-                <a:spcPct val="20000"/>
-              </a:spcBef>
-              <a:buFont typeface="Arial"/>
-              <a:buNone/>
-              <a:defRPr sz="2800" kern="1200">
-                <a:solidFill>
-                  <a:schemeClr val="tx1">
-                    <a:tint val="75000"/>
-                  </a:schemeClr>
-                </a:solidFill>
-                <a:latin typeface="+mn-lt"/>
-                <a:ea typeface="+mn-ea"/>
-                <a:cs typeface="+mn-cs"/>
-              </a:defRPr>
-            </a:lvl2pPr>
-            <a:lvl3pPr marL="914400" indent="0" algn="ctr" defTabSz="457200" rtl="0" eaLnBrk="1" latinLnBrk="0" hangingPunct="1">
-              <a:spcBef>
-                <a:spcPct val="20000"/>
-              </a:spcBef>
-              <a:buFont typeface="Arial"/>
-              <a:buNone/>
-              <a:defRPr sz="2400" kern="1200">
-                <a:solidFill>
-                  <a:schemeClr val="tx1">
-                    <a:tint val="75000"/>
-                  </a:schemeClr>
-                </a:solidFill>
-                <a:latin typeface="+mn-lt"/>
-                <a:ea typeface="+mn-ea"/>
-                <a:cs typeface="+mn-cs"/>
-              </a:defRPr>
-            </a:lvl3pPr>
-            <a:lvl4pPr marL="1371600" indent="0" algn="ctr" defTabSz="457200" rtl="0" eaLnBrk="1" latinLnBrk="0" hangingPunct="1">
-              <a:spcBef>
-                <a:spcPct val="20000"/>
-              </a:spcBef>
-              <a:buFont typeface="Arial"/>
-              <a:buNone/>
-              <a:defRPr sz="2000" kern="1200">
-                <a:solidFill>
-                  <a:schemeClr val="tx1">
-                    <a:tint val="75000"/>
-                  </a:schemeClr>
-                </a:solidFill>
-                <a:latin typeface="+mn-lt"/>
-                <a:ea typeface="+mn-ea"/>
-                <a:cs typeface="+mn-cs"/>
-              </a:defRPr>
-            </a:lvl4pPr>
-            <a:lvl5pPr marL="1828800" indent="0" algn="ctr" defTabSz="457200" rtl="0" eaLnBrk="1" latinLnBrk="0" hangingPunct="1">
-              <a:spcBef>
-                <a:spcPct val="20000"/>
-              </a:spcBef>
-              <a:buFont typeface="Arial"/>
-              <a:buNone/>
-              <a:defRPr sz="2000" kern="1200">
-                <a:solidFill>
-                  <a:schemeClr val="tx1">
-                    <a:tint val="75000"/>
-                  </a:schemeClr>
-                </a:solidFill>
-                <a:latin typeface="+mn-lt"/>
-                <a:ea typeface="+mn-ea"/>
-                <a:cs typeface="+mn-cs"/>
-              </a:defRPr>
-            </a:lvl5pPr>
-            <a:lvl6pPr marL="2286000" indent="0" algn="ctr" defTabSz="457200" rtl="0" eaLnBrk="1" latinLnBrk="0" hangingPunct="1">
-              <a:spcBef>
-                <a:spcPct val="20000"/>
-              </a:spcBef>
-              <a:buFont typeface="Arial"/>
-              <a:buNone/>
-              <a:defRPr sz="2000" kern="1200">
-                <a:solidFill>
-                  <a:schemeClr val="tx1">
-                    <a:tint val="75000"/>
-                  </a:schemeClr>
-                </a:solidFill>
-                <a:latin typeface="+mn-lt"/>
-                <a:ea typeface="+mn-ea"/>
-                <a:cs typeface="+mn-cs"/>
-              </a:defRPr>
-            </a:lvl6pPr>
-            <a:lvl7pPr marL="2743200" indent="0" algn="ctr" defTabSz="457200" rtl="0" eaLnBrk="1" latinLnBrk="0" hangingPunct="1">
-              <a:spcBef>
-                <a:spcPct val="20000"/>
-              </a:spcBef>
-              <a:buFont typeface="Arial"/>
-              <a:buNone/>
-              <a:defRPr sz="2000" kern="1200">
-                <a:solidFill>
-                  <a:schemeClr val="tx1">
-                    <a:tint val="75000"/>
-                  </a:schemeClr>
-                </a:solidFill>
-                <a:latin typeface="+mn-lt"/>
-                <a:ea typeface="+mn-ea"/>
-                <a:cs typeface="+mn-cs"/>
-              </a:defRPr>
-            </a:lvl7pPr>
-            <a:lvl8pPr marL="3200400" indent="0" algn="ctr" defTabSz="457200" rtl="0" eaLnBrk="1" latinLnBrk="0" hangingPunct="1">
-              <a:spcBef>
-                <a:spcPct val="20000"/>
-              </a:spcBef>
-              <a:buFont typeface="Arial"/>
-              <a:buNone/>
-              <a:defRPr sz="2000" kern="1200">
-                <a:solidFill>
-                  <a:schemeClr val="tx1">
-                    <a:tint val="75000"/>
-                  </a:schemeClr>
-                </a:solidFill>
-                <a:latin typeface="+mn-lt"/>
-                <a:ea typeface="+mn-ea"/>
-                <a:cs typeface="+mn-cs"/>
-              </a:defRPr>
-            </a:lvl8pPr>
-            <a:lvl9pPr marL="3657600" indent="0" algn="ctr" defTabSz="457200" rtl="0" eaLnBrk="1" latinLnBrk="0" hangingPunct="1">
-              <a:spcBef>
-                <a:spcPct val="20000"/>
-              </a:spcBef>
-              <a:buFont typeface="Arial"/>
-              <a:buNone/>
-              <a:defRPr sz="2000" kern="1200">
-                <a:solidFill>
-                  <a:schemeClr val="tx1">
-                    <a:tint val="75000"/>
-                  </a:schemeClr>
-                </a:solidFill>
-                <a:latin typeface="+mn-lt"/>
-                <a:ea typeface="+mn-ea"/>
-                <a:cs typeface="+mn-cs"/>
-              </a:defRPr>
-            </a:lvl9pPr>
-          </a:lstStyle>
-          <a:p>
-            <a:pPr algn="ctr"/>
-            <a:r>
-              <a:rPr lang="en-US" sz="1600" dirty="0" smtClean="0">
-                <a:latin typeface="Miriam" panose="020B0502050101010101" pitchFamily="34" charset="-79"/>
-                <a:cs typeface="Miriam" panose="020B0502050101010101" pitchFamily="34" charset="-79"/>
-              </a:rPr>
-              <a:t>Slides available at http://www.github.com/jgerity/talks</a:t>
-            </a:r>
+              <a:t>/</a:t>
+            </a:r>
+            <a:r>
+              <a:rPr lang="en-US" dirty="0" smtClean="0"/>
+              <a:t> </a:t>
+            </a:r>
+          </a:p>
+          <a:p>
+            <a:endParaRPr lang="en-US" i="1" dirty="0"/>
           </a:p>
         </p:txBody>
       </p:sp>
     </p:spTree>
     <p:extLst>
       <p:ext uri="{BB962C8B-B14F-4D97-AF65-F5344CB8AC3E}">
-        <p14:creationId xmlns:p14="http://schemas.microsoft.com/office/powerpoint/2010/main" val="1628571770"/>
+        <p14:creationId xmlns:p14="http://schemas.microsoft.com/office/powerpoint/2010/main" val="4076682670"/>
       </p:ext>
     </p:extLst>
   </p:cSld>
@@ -5218,7 +5664,381 @@
   <p:timing>
     <p:tnLst>
       <p:par>
-        <p:cTn id="1" dur="indefinite" restart="never" nodeType="tmRoot"/>
+        <p:cTn id="1" dur="indefinite" restart="never" nodeType="tmRoot">
+          <p:childTnLst>
+            <p:seq concurrent="1" nextAc="seek">
+              <p:cTn id="2" dur="indefinite" nodeType="mainSeq">
+                <p:childTnLst>
+                  <p:par>
+                    <p:cTn id="3" fill="hold">
+                      <p:stCondLst>
+                        <p:cond delay="indefinite"/>
+                      </p:stCondLst>
+                      <p:childTnLst>
+                        <p:par>
+                          <p:cTn id="4" fill="hold">
+                            <p:stCondLst>
+                              <p:cond delay="0"/>
+                            </p:stCondLst>
+                            <p:childTnLst>
+                              <p:par>
+                                <p:cTn id="5" presetID="1" presetClass="entr" presetSubtype="0" fill="hold" nodeType="clickEffect">
+                                  <p:stCondLst>
+                                    <p:cond delay="0"/>
+                                  </p:stCondLst>
+                                  <p:childTnLst>
+                                    <p:set>
+                                      <p:cBhvr>
+                                        <p:cTn id="6" dur="1" fill="hold">
+                                          <p:stCondLst>
+                                            <p:cond delay="0"/>
+                                          </p:stCondLst>
+                                        </p:cTn>
+                                        <p:tgtEl>
+                                          <p:spTgt spid="3">
+                                            <p:txEl>
+                                              <p:pRg st="1" end="1"/>
+                                            </p:txEl>
+                                          </p:spTgt>
+                                        </p:tgtEl>
+                                        <p:attrNameLst>
+                                          <p:attrName>style.visibility</p:attrName>
+                                        </p:attrNameLst>
+                                      </p:cBhvr>
+                                      <p:to>
+                                        <p:strVal val="visible"/>
+                                      </p:to>
+                                    </p:set>
+                                  </p:childTnLst>
+                                </p:cTn>
+                              </p:par>
+                            </p:childTnLst>
+                          </p:cTn>
+                        </p:par>
+                      </p:childTnLst>
+                    </p:cTn>
+                  </p:par>
+                  <p:par>
+                    <p:cTn id="7" fill="hold">
+                      <p:stCondLst>
+                        <p:cond delay="indefinite"/>
+                      </p:stCondLst>
+                      <p:childTnLst>
+                        <p:par>
+                          <p:cTn id="8" fill="hold">
+                            <p:stCondLst>
+                              <p:cond delay="0"/>
+                            </p:stCondLst>
+                            <p:childTnLst>
+                              <p:par>
+                                <p:cTn id="9" presetID="1" presetClass="entr" presetSubtype="0" fill="hold" nodeType="clickEffect">
+                                  <p:stCondLst>
+                                    <p:cond delay="0"/>
+                                  </p:stCondLst>
+                                  <p:childTnLst>
+                                    <p:set>
+                                      <p:cBhvr>
+                                        <p:cTn id="10" dur="1" fill="hold">
+                                          <p:stCondLst>
+                                            <p:cond delay="0"/>
+                                          </p:stCondLst>
+                                        </p:cTn>
+                                        <p:tgtEl>
+                                          <p:spTgt spid="3">
+                                            <p:txEl>
+                                              <p:pRg st="2" end="2"/>
+                                            </p:txEl>
+                                          </p:spTgt>
+                                        </p:tgtEl>
+                                        <p:attrNameLst>
+                                          <p:attrName>style.visibility</p:attrName>
+                                        </p:attrNameLst>
+                                      </p:cBhvr>
+                                      <p:to>
+                                        <p:strVal val="visible"/>
+                                      </p:to>
+                                    </p:set>
+                                  </p:childTnLst>
+                                </p:cTn>
+                              </p:par>
+                            </p:childTnLst>
+                          </p:cTn>
+                        </p:par>
+                      </p:childTnLst>
+                    </p:cTn>
+                  </p:par>
+                  <p:par>
+                    <p:cTn id="11" fill="hold">
+                      <p:stCondLst>
+                        <p:cond delay="indefinite"/>
+                      </p:stCondLst>
+                      <p:childTnLst>
+                        <p:par>
+                          <p:cTn id="12" fill="hold">
+                            <p:stCondLst>
+                              <p:cond delay="0"/>
+                            </p:stCondLst>
+                            <p:childTnLst>
+                              <p:par>
+                                <p:cTn id="13" presetID="1" presetClass="entr" presetSubtype="0" fill="hold" nodeType="clickEffect">
+                                  <p:stCondLst>
+                                    <p:cond delay="0"/>
+                                  </p:stCondLst>
+                                  <p:childTnLst>
+                                    <p:set>
+                                      <p:cBhvr>
+                                        <p:cTn id="14" dur="1" fill="hold">
+                                          <p:stCondLst>
+                                            <p:cond delay="0"/>
+                                          </p:stCondLst>
+                                        </p:cTn>
+                                        <p:tgtEl>
+                                          <p:spTgt spid="3">
+                                            <p:txEl>
+                                              <p:pRg st="3" end="3"/>
+                                            </p:txEl>
+                                          </p:spTgt>
+                                        </p:tgtEl>
+                                        <p:attrNameLst>
+                                          <p:attrName>style.visibility</p:attrName>
+                                        </p:attrNameLst>
+                                      </p:cBhvr>
+                                      <p:to>
+                                        <p:strVal val="visible"/>
+                                      </p:to>
+                                    </p:set>
+                                  </p:childTnLst>
+                                </p:cTn>
+                              </p:par>
+                              <p:par>
+                                <p:cTn id="15" presetID="1" presetClass="entr" presetSubtype="0" fill="hold" nodeType="withEffect">
+                                  <p:stCondLst>
+                                    <p:cond delay="0"/>
+                                  </p:stCondLst>
+                                  <p:childTnLst>
+                                    <p:set>
+                                      <p:cBhvr>
+                                        <p:cTn id="16" dur="1" fill="hold">
+                                          <p:stCondLst>
+                                            <p:cond delay="0"/>
+                                          </p:stCondLst>
+                                        </p:cTn>
+                                        <p:tgtEl>
+                                          <p:spTgt spid="3">
+                                            <p:txEl>
+                                              <p:pRg st="4" end="4"/>
+                                            </p:txEl>
+                                          </p:spTgt>
+                                        </p:tgtEl>
+                                        <p:attrNameLst>
+                                          <p:attrName>style.visibility</p:attrName>
+                                        </p:attrNameLst>
+                                      </p:cBhvr>
+                                      <p:to>
+                                        <p:strVal val="visible"/>
+                                      </p:to>
+                                    </p:set>
+                                  </p:childTnLst>
+                                </p:cTn>
+                              </p:par>
+                            </p:childTnLst>
+                          </p:cTn>
+                        </p:par>
+                      </p:childTnLst>
+                    </p:cTn>
+                  </p:par>
+                </p:childTnLst>
+              </p:cTn>
+              <p:prevCondLst>
+                <p:cond evt="onPrev" delay="0">
+                  <p:tgtEl>
+                    <p:sldTgt/>
+                  </p:tgtEl>
+                </p:cond>
+              </p:prevCondLst>
+              <p:nextCondLst>
+                <p:cond evt="onNext" delay="0">
+                  <p:tgtEl>
+                    <p:sldTgt/>
+                  </p:tgtEl>
+                </p:cond>
+              </p:nextCondLst>
+            </p:seq>
+          </p:childTnLst>
+        </p:cTn>
+      </p:par>
+    </p:tnLst>
+  </p:timing>
+</p:sld>
+</file>
+
+<file path=ppt/slides/slide2.xml><?xml version="1.0" encoding="utf-8"?>
+<p:sld xmlns:a="http://schemas.openxmlformats.org/drawingml/2006/main" xmlns:r="http://schemas.openxmlformats.org/officeDocument/2006/relationships" xmlns:p="http://schemas.openxmlformats.org/presentationml/2006/main">
+  <p:cSld>
+    <p:spTree>
+      <p:nvGrpSpPr>
+        <p:cNvPr id="1" name=""/>
+        <p:cNvGrpSpPr/>
+        <p:nvPr/>
+      </p:nvGrpSpPr>
+      <p:grpSpPr>
+        <a:xfrm>
+          <a:off x="0" y="0"/>
+          <a:ext cx="0" cy="0"/>
+          <a:chOff x="0" y="0"/>
+          <a:chExt cx="0" cy="0"/>
+        </a:xfrm>
+      </p:grpSpPr>
+      <p:sp>
+        <p:nvSpPr>
+          <p:cNvPr id="2" name="Title 1"/>
+          <p:cNvSpPr>
+            <a:spLocks noGrp="1"/>
+          </p:cNvSpPr>
+          <p:nvPr>
+            <p:ph type="title"/>
+          </p:nvPr>
+        </p:nvSpPr>
+        <p:spPr/>
+        <p:txBody>
+          <a:bodyPr/>
+          <a:lstStyle/>
+          <a:p>
+            <a:r>
+              <a:rPr lang="en-US" dirty="0" smtClean="0"/>
+              <a:t>Scope of this talk</a:t>
+            </a:r>
+            <a:endParaRPr lang="en-US" dirty="0"/>
+          </a:p>
+        </p:txBody>
+      </p:sp>
+      <p:sp>
+        <p:nvSpPr>
+          <p:cNvPr id="3" name="Content Placeholder 2"/>
+          <p:cNvSpPr>
+            <a:spLocks noGrp="1"/>
+          </p:cNvSpPr>
+          <p:nvPr>
+            <p:ph idx="1"/>
+          </p:nvPr>
+        </p:nvSpPr>
+        <p:spPr/>
+        <p:txBody>
+          <a:bodyPr/>
+          <a:lstStyle/>
+          <a:p>
+            <a:r>
+              <a:rPr lang="en-US" dirty="0" smtClean="0"/>
+              <a:t>More things to say than will fit in this talk, see the list of notes and reading material online</a:t>
+            </a:r>
+            <a:r>
+              <a:rPr lang="en-US" dirty="0" smtClean="0"/>
+              <a:t>.</a:t>
+            </a:r>
+          </a:p>
+          <a:p>
+            <a:pPr lvl="1"/>
+            <a:r>
+              <a:rPr lang="en-US" dirty="0" smtClean="0"/>
+              <a:t>And ask questions!</a:t>
+            </a:r>
+            <a:endParaRPr lang="en-US" dirty="0" smtClean="0"/>
+          </a:p>
+          <a:p>
+            <a:r>
+              <a:rPr lang="en-US" dirty="0" smtClean="0"/>
+              <a:t>Programming is most rewarding as an auto-didactic process!</a:t>
+            </a:r>
+            <a:endParaRPr lang="en-US" dirty="0"/>
+          </a:p>
+        </p:txBody>
+      </p:sp>
+    </p:spTree>
+    <p:extLst>
+      <p:ext uri="{BB962C8B-B14F-4D97-AF65-F5344CB8AC3E}">
+        <p14:creationId xmlns:p14="http://schemas.microsoft.com/office/powerpoint/2010/main" val="239801139"/>
+      </p:ext>
+    </p:extLst>
+  </p:cSld>
+  <p:clrMapOvr>
+    <a:masterClrMapping/>
+  </p:clrMapOvr>
+  <p:timing>
+    <p:tnLst>
+      <p:par>
+        <p:cTn id="1" dur="indefinite" restart="never" nodeType="tmRoot">
+          <p:childTnLst>
+            <p:seq concurrent="1" nextAc="seek">
+              <p:cTn id="2" dur="indefinite" nodeType="mainSeq">
+                <p:childTnLst>
+                  <p:par>
+                    <p:cTn id="3" fill="hold">
+                      <p:stCondLst>
+                        <p:cond delay="indefinite"/>
+                      </p:stCondLst>
+                      <p:childTnLst>
+                        <p:par>
+                          <p:cTn id="4" fill="hold">
+                            <p:stCondLst>
+                              <p:cond delay="0"/>
+                            </p:stCondLst>
+                            <p:childTnLst>
+                              <p:par>
+                                <p:cTn id="5" presetID="1" presetClass="entr" presetSubtype="0" fill="hold" nodeType="clickEffect">
+                                  <p:stCondLst>
+                                    <p:cond delay="0"/>
+                                  </p:stCondLst>
+                                  <p:childTnLst>
+                                    <p:set>
+                                      <p:cBhvr>
+                                        <p:cTn id="6" dur="1" fill="hold">
+                                          <p:stCondLst>
+                                            <p:cond delay="0"/>
+                                          </p:stCondLst>
+                                        </p:cTn>
+                                        <p:tgtEl>
+                                          <p:spTgt spid="3">
+                                            <p:txEl>
+                                              <p:pRg st="2" end="2"/>
+                                            </p:txEl>
+                                          </p:spTgt>
+                                        </p:tgtEl>
+                                        <p:attrNameLst>
+                                          <p:attrName>style.visibility</p:attrName>
+                                        </p:attrNameLst>
+                                      </p:cBhvr>
+                                      <p:to>
+                                        <p:strVal val="visible"/>
+                                      </p:to>
+                                    </p:set>
+                                  </p:childTnLst>
+                                </p:cTn>
+                              </p:par>
+                            </p:childTnLst>
+                          </p:cTn>
+                        </p:par>
+                      </p:childTnLst>
+                    </p:cTn>
+                  </p:par>
+                </p:childTnLst>
+              </p:cTn>
+              <p:prevCondLst>
+                <p:cond evt="onPrev" delay="0">
+                  <p:tgtEl>
+                    <p:sldTgt/>
+                  </p:tgtEl>
+                </p:cond>
+              </p:prevCondLst>
+              <p:nextCondLst>
+                <p:cond evt="onNext" delay="0">
+                  <p:tgtEl>
+                    <p:sldTgt/>
+                  </p:tgtEl>
+                </p:cond>
+              </p:nextCondLst>
+            </p:seq>
+          </p:childTnLst>
+        </p:cTn>
       </p:par>
     </p:tnLst>
   </p:timing>
@@ -5259,142 +6079,50 @@
           <a:p>
             <a:r>
               <a:rPr lang="en-US" dirty="0" smtClean="0"/>
-              <a:t>Useful resources</a:t>
+              <a:t>The Zen </a:t>
+            </a:r>
+            <a:r>
+              <a:rPr lang="en-US" smtClean="0"/>
+              <a:t>of Python</a:t>
+            </a:r>
+            <a:endParaRPr lang="en-US"/>
+          </a:p>
+        </p:txBody>
+      </p:sp>
+      <p:sp>
+        <p:nvSpPr>
+          <p:cNvPr id="3" name="Content Placeholder 2"/>
+          <p:cNvSpPr>
+            <a:spLocks noGrp="1"/>
+          </p:cNvSpPr>
+          <p:nvPr>
+            <p:ph idx="1"/>
+          </p:nvPr>
+        </p:nvSpPr>
+        <p:spPr/>
+        <p:txBody>
+          <a:bodyPr/>
+          <a:lstStyle/>
+          <a:p>
+            <a:r>
+              <a:rPr lang="en-US" dirty="0" smtClean="0"/>
+              <a:t>When in doubt…</a:t>
+            </a:r>
+          </a:p>
+          <a:p>
+            <a:pPr lvl="1"/>
+            <a:r>
+              <a:rPr lang="en-US" b="1" dirty="0" smtClean="0"/>
+              <a:t>import this</a:t>
             </a:r>
             <a:endParaRPr lang="en-US" dirty="0"/>
-          </a:p>
-        </p:txBody>
-      </p:sp>
-      <p:sp>
-        <p:nvSpPr>
-          <p:cNvPr id="3" name="Content Placeholder 2"/>
-          <p:cNvSpPr>
-            <a:spLocks noGrp="1"/>
-          </p:cNvSpPr>
-          <p:nvPr>
-            <p:ph idx="1"/>
-          </p:nvPr>
-        </p:nvSpPr>
-        <p:spPr/>
-        <p:txBody>
-          <a:bodyPr>
-            <a:normAutofit/>
-          </a:bodyPr>
-          <a:lstStyle/>
-          <a:p>
-            <a:r>
-              <a:rPr lang="en-US" b="1" dirty="0" err="1" smtClean="0"/>
-              <a:t>CodeAcademy</a:t>
-            </a:r>
-            <a:r>
-              <a:rPr lang="en-US" b="1" dirty="0"/>
-              <a:t/>
-            </a:r>
-            <a:br>
-              <a:rPr lang="en-US" b="1" dirty="0"/>
-            </a:br>
-            <a:r>
-              <a:rPr lang="en-US" dirty="0" smtClean="0">
-                <a:hlinkClick r:id="rId2"/>
-              </a:rPr>
-              <a:t>https</a:t>
-            </a:r>
-            <a:r>
-              <a:rPr lang="en-US" dirty="0">
-                <a:hlinkClick r:id="rId2"/>
-              </a:rPr>
-              <a:t>://</a:t>
-            </a:r>
-            <a:r>
-              <a:rPr lang="en-US" dirty="0" smtClean="0">
-                <a:hlinkClick r:id="rId2"/>
-              </a:rPr>
-              <a:t>www.codecademy.com/learn/python</a:t>
-            </a:r>
-            <a:r>
-              <a:rPr lang="en-US" dirty="0" smtClean="0"/>
-              <a:t> </a:t>
-            </a:r>
-            <a:endParaRPr lang="en-US" b="1" dirty="0" smtClean="0"/>
-          </a:p>
-          <a:p>
-            <a:r>
-              <a:rPr lang="en-US" b="1" dirty="0" err="1" smtClean="0"/>
-              <a:t>Scipy</a:t>
-            </a:r>
-            <a:r>
-              <a:rPr lang="en-US" b="1" dirty="0" smtClean="0"/>
-              <a:t> lectures</a:t>
-            </a:r>
-            <a:br>
-              <a:rPr lang="en-US" b="1" dirty="0" smtClean="0"/>
-            </a:br>
-            <a:r>
-              <a:rPr lang="en-US" dirty="0" smtClean="0">
-                <a:hlinkClick r:id="rId3"/>
-              </a:rPr>
-              <a:t>https</a:t>
-            </a:r>
-            <a:r>
-              <a:rPr lang="en-US" dirty="0" smtClean="0">
-                <a:hlinkClick r:id="rId3"/>
-              </a:rPr>
-              <a:t>://scipy-lectures.github.io</a:t>
-            </a:r>
-            <a:r>
-              <a:rPr lang="en-US" dirty="0" smtClean="0">
-                <a:hlinkClick r:id="rId3"/>
-              </a:rPr>
-              <a:t>/</a:t>
-            </a:r>
-            <a:endParaRPr lang="en-US" dirty="0" smtClean="0"/>
-          </a:p>
-          <a:p>
-            <a:r>
-              <a:rPr lang="en-US" dirty="0" smtClean="0"/>
-              <a:t>A long list of other resources available on GitHub, along with </a:t>
-            </a:r>
-            <a:r>
-              <a:rPr lang="en-US" dirty="0"/>
-              <a:t>this </a:t>
-            </a:r>
-            <a:r>
-              <a:rPr lang="en-US" dirty="0" smtClean="0"/>
-              <a:t>presentation:</a:t>
-            </a:r>
-            <a:br>
-              <a:rPr lang="en-US" dirty="0" smtClean="0"/>
-            </a:br>
-            <a:r>
-              <a:rPr lang="en-US" dirty="0" smtClean="0">
-                <a:hlinkClick r:id="rId4"/>
-              </a:rPr>
-              <a:t>https</a:t>
-            </a:r>
-            <a:r>
-              <a:rPr lang="en-US" dirty="0">
-                <a:hlinkClick r:id="rId4"/>
-              </a:rPr>
-              <a:t>://</a:t>
-            </a:r>
-            <a:r>
-              <a:rPr lang="en-US" dirty="0" smtClean="0">
-                <a:hlinkClick r:id="rId4"/>
-              </a:rPr>
-              <a:t>github.com/jgerity/talks</a:t>
-            </a:r>
-            <a:r>
-              <a:rPr lang="en-US" dirty="0" smtClean="0"/>
-              <a:t> </a:t>
-            </a:r>
-            <a:endParaRPr lang="en-US" dirty="0" smtClean="0"/>
           </a:p>
         </p:txBody>
       </p:sp>
     </p:spTree>
     <p:extLst>
       <p:ext uri="{BB962C8B-B14F-4D97-AF65-F5344CB8AC3E}">
-        <p14:creationId xmlns:p14="http://schemas.microsoft.com/office/powerpoint/2010/main" val="3584811499"/>
+        <p14:creationId xmlns:p14="http://schemas.microsoft.com/office/powerpoint/2010/main" val="162521288"/>
       </p:ext>
     </p:extLst>
   </p:cSld>
@@ -5438,28 +6166,95 @@
             <p:ph type="title"/>
           </p:nvPr>
         </p:nvSpPr>
+        <p:spPr/>
+        <p:txBody>
+          <a:bodyPr/>
+          <a:lstStyle/>
+          <a:p>
+            <a:r>
+              <a:rPr lang="en-US" dirty="0" smtClean="0"/>
+              <a:t>Things I </a:t>
+            </a:r>
+            <a:r>
+              <a:rPr lang="en-US" i="1" dirty="0" smtClean="0"/>
+              <a:t>didn’t</a:t>
+            </a:r>
+            <a:r>
+              <a:rPr lang="en-US" dirty="0" smtClean="0"/>
+              <a:t> mention…</a:t>
+            </a:r>
+            <a:endParaRPr lang="en-US" dirty="0"/>
+          </a:p>
+        </p:txBody>
+      </p:sp>
+      <p:sp>
+        <p:nvSpPr>
+          <p:cNvPr id="3" name="Content Placeholder 2"/>
+          <p:cNvSpPr>
+            <a:spLocks noGrp="1"/>
+          </p:cNvSpPr>
+          <p:nvPr>
+            <p:ph idx="1"/>
+          </p:nvPr>
+        </p:nvSpPr>
+        <p:spPr/>
+        <p:txBody>
+          <a:bodyPr/>
+          <a:lstStyle/>
+          <a:p>
+            <a:r>
+              <a:rPr lang="en-US" dirty="0" smtClean="0"/>
+              <a:t>A whole bunch of keywords</a:t>
+            </a:r>
+          </a:p>
+          <a:p>
+            <a:pPr marL="0" indent="0">
+              <a:buNone/>
+            </a:pPr>
+            <a:endParaRPr lang="en-US" dirty="0"/>
+          </a:p>
+          <a:p>
+            <a:pPr marL="0" indent="0">
+              <a:buNone/>
+            </a:pPr>
+            <a:endParaRPr lang="en-US" dirty="0" smtClean="0"/>
+          </a:p>
+        </p:txBody>
+      </p:sp>
+      <p:pic>
+        <p:nvPicPr>
+          <p:cNvPr id="4" name="Picture 3"/>
+          <p:cNvPicPr>
+            <a:picLocks noChangeAspect="1"/>
+          </p:cNvPicPr>
+          <p:nvPr/>
+        </p:nvPicPr>
+        <p:blipFill>
+          <a:blip r:embed="rId2">
+            <a:extLst>
+              <a:ext uri="{28A0092B-C50C-407E-A947-70E740481C1C}">
+                <a14:useLocalDpi xmlns:a14="http://schemas.microsoft.com/office/drawing/2010/main" val="0"/>
+              </a:ext>
+            </a:extLst>
+          </a:blip>
+          <a:stretch>
+            <a:fillRect/>
+          </a:stretch>
+        </p:blipFill>
         <p:spPr>
           <a:xfrm>
-            <a:off x="457200" y="2874722"/>
-            <a:ext cx="8229600" cy="803756"/>
+            <a:off x="704591" y="2994669"/>
+            <a:ext cx="7734818" cy="2893500"/>
           </a:xfrm>
+          <a:prstGeom prst="rect">
+            <a:avLst/>
+          </a:prstGeom>
         </p:spPr>
-        <p:txBody>
-          <a:bodyPr/>
-          <a:lstStyle/>
-          <a:p>
-            <a:r>
-              <a:rPr lang="en-US" dirty="0" smtClean="0"/>
-              <a:t>Thank you!</a:t>
-            </a:r>
-            <a:endParaRPr lang="en-US" dirty="0"/>
-          </a:p>
-        </p:txBody>
-      </p:sp>
+      </p:pic>
     </p:spTree>
     <p:extLst>
       <p:ext uri="{BB962C8B-B14F-4D97-AF65-F5344CB8AC3E}">
-        <p14:creationId xmlns:p14="http://schemas.microsoft.com/office/powerpoint/2010/main" val="1844849267"/>
+        <p14:creationId xmlns:p14="http://schemas.microsoft.com/office/powerpoint/2010/main" val="3192961759"/>
       </p:ext>
     </p:extLst>
   </p:cSld>
@@ -5503,20 +6298,128 @@
             <p:ph type="title"/>
           </p:nvPr>
         </p:nvSpPr>
+        <p:spPr/>
+        <p:txBody>
+          <a:bodyPr/>
+          <a:lstStyle/>
+          <a:p>
+            <a:r>
+              <a:rPr lang="en-US" dirty="0" smtClean="0"/>
+              <a:t>Things I </a:t>
+            </a:r>
+            <a:r>
+              <a:rPr lang="en-US" i="1" dirty="0" smtClean="0"/>
+              <a:t>didn’t</a:t>
+            </a:r>
+            <a:r>
+              <a:rPr lang="en-US" dirty="0" smtClean="0"/>
+              <a:t> mention…</a:t>
+            </a:r>
+            <a:endParaRPr lang="en-US" dirty="0"/>
+          </a:p>
+        </p:txBody>
+      </p:sp>
+      <p:sp>
+        <p:nvSpPr>
+          <p:cNvPr id="3" name="Content Placeholder 2"/>
+          <p:cNvSpPr>
+            <a:spLocks noGrp="1"/>
+          </p:cNvSpPr>
+          <p:nvPr>
+            <p:ph idx="1"/>
+          </p:nvPr>
+        </p:nvSpPr>
         <p:spPr>
           <a:xfrm>
-            <a:off x="457200" y="2874722"/>
-            <a:ext cx="8229600" cy="803756"/>
+            <a:off x="457200" y="2049270"/>
+            <a:ext cx="8229600" cy="4639629"/>
           </a:xfrm>
         </p:spPr>
         <p:txBody>
-          <a:bodyPr/>
+          <a:bodyPr>
+            <a:normAutofit/>
+          </a:bodyPr>
           <a:lstStyle/>
           <a:p>
             <a:r>
               <a:rPr lang="en-US" dirty="0" smtClean="0"/>
-              <a:t>Feedback?</a:t>
-            </a:r>
+              <a:t>Classes and inheritance</a:t>
+            </a:r>
+          </a:p>
+          <a:p>
+            <a:r>
+              <a:rPr lang="en-US" dirty="0" smtClean="0"/>
+              <a:t>What the hell is </a:t>
+            </a:r>
+            <a:r>
+              <a:rPr lang="en-US" b="1" dirty="0" smtClean="0"/>
+              <a:t>__name__</a:t>
+            </a:r>
+            <a:r>
+              <a:rPr lang="en-US" dirty="0" smtClean="0"/>
+              <a:t>?</a:t>
+            </a:r>
+          </a:p>
+          <a:p>
+            <a:r>
+              <a:rPr lang="en-US" dirty="0" smtClean="0"/>
+              <a:t>Partial imports, module </a:t>
+            </a:r>
+            <a:r>
+              <a:rPr lang="en-US" dirty="0" err="1" smtClean="0"/>
+              <a:t>namespacing</a:t>
+            </a:r>
+            <a:endParaRPr lang="en-US" dirty="0" smtClean="0"/>
+          </a:p>
+          <a:p>
+            <a:pPr lvl="1"/>
+            <a:r>
+              <a:rPr lang="en-US" b="1" dirty="0" smtClean="0"/>
+              <a:t>from </a:t>
+            </a:r>
+            <a:r>
+              <a:rPr lang="en-US" b="1" dirty="0" err="1" smtClean="0"/>
+              <a:t>foo.bar</a:t>
+            </a:r>
+            <a:r>
+              <a:rPr lang="en-US" b="1" dirty="0" smtClean="0"/>
+              <a:t> import </a:t>
+            </a:r>
+            <a:r>
+              <a:rPr lang="en-US" b="1" dirty="0" err="1" smtClean="0"/>
+              <a:t>baz</a:t>
+            </a:r>
+            <a:endParaRPr lang="en-US" b="1" dirty="0" smtClean="0"/>
+          </a:p>
+          <a:p>
+            <a:r>
+              <a:rPr lang="en-US" dirty="0" smtClean="0"/>
+              <a:t>String formatting</a:t>
+            </a:r>
+          </a:p>
+          <a:p>
+            <a:r>
+              <a:rPr lang="en-US" dirty="0" err="1" smtClean="0"/>
+              <a:t>Iterables</a:t>
+            </a:r>
+            <a:r>
+              <a:rPr lang="en-US" dirty="0" smtClean="0"/>
+              <a:t>, generators</a:t>
+            </a:r>
+          </a:p>
+          <a:p>
+            <a:r>
+              <a:rPr lang="en-US" dirty="0" smtClean="0"/>
+              <a:t>Decorators</a:t>
+            </a:r>
+          </a:p>
+          <a:p>
+            <a:r>
+              <a:rPr lang="en-US" dirty="0" smtClean="0"/>
+              <a:t>Scope and closures</a:t>
+            </a:r>
+          </a:p>
+          <a:p>
             <a:endParaRPr lang="en-US" dirty="0"/>
           </a:p>
         </p:txBody>
@@ -5524,7 +6427,7 @@
     </p:spTree>
     <p:extLst>
       <p:ext uri="{BB962C8B-B14F-4D97-AF65-F5344CB8AC3E}">
-        <p14:creationId xmlns:p14="http://schemas.microsoft.com/office/powerpoint/2010/main" val="891265136"/>
+        <p14:creationId xmlns:p14="http://schemas.microsoft.com/office/powerpoint/2010/main" val="3474212174"/>
       </p:ext>
     </p:extLst>
   </p:cSld>
@@ -5575,7 +6478,15 @@
           <a:p>
             <a:r>
               <a:rPr lang="en-US" dirty="0" smtClean="0"/>
-              <a:t>Backup Slides</a:t>
+              <a:t>Things I </a:t>
+            </a:r>
+            <a:r>
+              <a:rPr lang="en-US" i="1" dirty="0" smtClean="0"/>
+              <a:t>didn’t</a:t>
+            </a:r>
+            <a:r>
+              <a:rPr lang="en-US" dirty="0" smtClean="0"/>
+              <a:t> mention…</a:t>
             </a:r>
             <a:endParaRPr lang="en-US" dirty="0"/>
           </a:p>
@@ -5591,22 +6502,53 @@
             <p:ph idx="1"/>
           </p:nvPr>
         </p:nvSpPr>
-        <p:spPr/>
-        <p:txBody>
-          <a:bodyPr/>
+        <p:spPr>
+          <a:xfrm>
+            <a:off x="457200" y="2049270"/>
+            <a:ext cx="8229600" cy="4639629"/>
+          </a:xfrm>
+        </p:spPr>
+        <p:txBody>
+          <a:bodyPr>
+            <a:normAutofit/>
+          </a:bodyPr>
           <a:lstStyle/>
           <a:p>
-            <a:pPr marL="0" indent="0">
-              <a:buNone/>
-            </a:pPr>
-            <a:endParaRPr lang="en-US" dirty="0"/>
+            <a:r>
+              <a:rPr lang="en-US" dirty="0" smtClean="0"/>
+              <a:t>Command line arguments</a:t>
+            </a:r>
+          </a:p>
+          <a:p>
+            <a:r>
+              <a:rPr lang="en-US" dirty="0" smtClean="0"/>
+              <a:t>Debugging</a:t>
+            </a:r>
+          </a:p>
+          <a:p>
+            <a:r>
+              <a:rPr lang="en-US" dirty="0" smtClean="0"/>
+              <a:t>References (where are the pointers?!)</a:t>
+            </a:r>
+          </a:p>
+          <a:p>
+            <a:r>
+              <a:rPr lang="en-US" dirty="0" smtClean="0"/>
+              <a:t>…</a:t>
+            </a:r>
+          </a:p>
+          <a:p>
+            <a:r>
+              <a:rPr lang="en-US" dirty="0" smtClean="0"/>
+              <a:t>Perhaps you can tell me?</a:t>
+            </a:r>
           </a:p>
         </p:txBody>
       </p:sp>
     </p:spTree>
     <p:extLst>
       <p:ext uri="{BB962C8B-B14F-4D97-AF65-F5344CB8AC3E}">
-        <p14:creationId xmlns:p14="http://schemas.microsoft.com/office/powerpoint/2010/main" val="1589961851"/>
+        <p14:creationId xmlns:p14="http://schemas.microsoft.com/office/powerpoint/2010/main" val="3416555919"/>
       </p:ext>
     </p:extLst>
   </p:cSld>
@@ -5657,7 +6599,7 @@
           <a:p>
             <a:r>
               <a:rPr lang="en-US" dirty="0" smtClean="0"/>
-              <a:t>First class functions</a:t>
+              <a:t>Useful resources</a:t>
             </a:r>
             <a:endParaRPr lang="en-US" dirty="0"/>
           </a:p>
@@ -5674,12 +6616,410 @@
           </p:nvPr>
         </p:nvSpPr>
         <p:spPr/>
+        <p:txBody>
+          <a:bodyPr>
+            <a:normAutofit/>
+          </a:bodyPr>
+          <a:lstStyle/>
+          <a:p>
+            <a:r>
+              <a:rPr lang="en-US" b="1" dirty="0" err="1" smtClean="0"/>
+              <a:t>CodeAcademy</a:t>
+            </a:r>
+            <a:r>
+              <a:rPr lang="en-US" b="1" dirty="0"/>
+              <a:t/>
+            </a:r>
+            <a:br>
+              <a:rPr lang="en-US" b="1" dirty="0"/>
+            </a:br>
+            <a:r>
+              <a:rPr lang="en-US" dirty="0" smtClean="0">
+                <a:hlinkClick r:id="rId2"/>
+              </a:rPr>
+              <a:t>https</a:t>
+            </a:r>
+            <a:r>
+              <a:rPr lang="en-US" dirty="0">
+                <a:hlinkClick r:id="rId2"/>
+              </a:rPr>
+              <a:t>://</a:t>
+            </a:r>
+            <a:r>
+              <a:rPr lang="en-US" dirty="0" smtClean="0">
+                <a:hlinkClick r:id="rId2"/>
+              </a:rPr>
+              <a:t>www.codecademy.com/learn/python</a:t>
+            </a:r>
+            <a:r>
+              <a:rPr lang="en-US" dirty="0" smtClean="0"/>
+              <a:t> </a:t>
+            </a:r>
+            <a:endParaRPr lang="en-US" b="1" dirty="0" smtClean="0"/>
+          </a:p>
+          <a:p>
+            <a:r>
+              <a:rPr lang="en-US" b="1" dirty="0" err="1" smtClean="0"/>
+              <a:t>Scipy</a:t>
+            </a:r>
+            <a:r>
+              <a:rPr lang="en-US" b="1" dirty="0" smtClean="0"/>
+              <a:t> lectures</a:t>
+            </a:r>
+            <a:br>
+              <a:rPr lang="en-US" b="1" dirty="0" smtClean="0"/>
+            </a:br>
+            <a:r>
+              <a:rPr lang="en-US" dirty="0" smtClean="0">
+                <a:hlinkClick r:id="rId3"/>
+              </a:rPr>
+              <a:t>https</a:t>
+            </a:r>
+            <a:r>
+              <a:rPr lang="en-US" dirty="0" smtClean="0">
+                <a:hlinkClick r:id="rId3"/>
+              </a:rPr>
+              <a:t>://scipy-lectures.github.io</a:t>
+            </a:r>
+            <a:r>
+              <a:rPr lang="en-US" dirty="0" smtClean="0">
+                <a:hlinkClick r:id="rId3"/>
+              </a:rPr>
+              <a:t>/</a:t>
+            </a:r>
+            <a:endParaRPr lang="en-US" dirty="0" smtClean="0"/>
+          </a:p>
+          <a:p>
+            <a:r>
+              <a:rPr lang="en-US" dirty="0" smtClean="0"/>
+              <a:t>A long list of other resources available on GitHub, along with </a:t>
+            </a:r>
+            <a:r>
+              <a:rPr lang="en-US" dirty="0"/>
+              <a:t>this </a:t>
+            </a:r>
+            <a:r>
+              <a:rPr lang="en-US" dirty="0" smtClean="0"/>
+              <a:t>presentation:</a:t>
+            </a:r>
+            <a:br>
+              <a:rPr lang="en-US" dirty="0" smtClean="0"/>
+            </a:br>
+            <a:r>
+              <a:rPr lang="en-US" dirty="0" smtClean="0">
+                <a:hlinkClick r:id="rId4"/>
+              </a:rPr>
+              <a:t>https</a:t>
+            </a:r>
+            <a:r>
+              <a:rPr lang="en-US" dirty="0">
+                <a:hlinkClick r:id="rId4"/>
+              </a:rPr>
+              <a:t>://</a:t>
+            </a:r>
+            <a:r>
+              <a:rPr lang="en-US" dirty="0" smtClean="0">
+                <a:hlinkClick r:id="rId4"/>
+              </a:rPr>
+              <a:t>github.com/jgerity/talks</a:t>
+            </a:r>
+            <a:r>
+              <a:rPr lang="en-US" dirty="0" smtClean="0"/>
+              <a:t> </a:t>
+            </a:r>
+            <a:endParaRPr lang="en-US" dirty="0" smtClean="0"/>
+          </a:p>
+        </p:txBody>
+      </p:sp>
+    </p:spTree>
+    <p:extLst>
+      <p:ext uri="{BB962C8B-B14F-4D97-AF65-F5344CB8AC3E}">
+        <p14:creationId xmlns:p14="http://schemas.microsoft.com/office/powerpoint/2010/main" val="3584811499"/>
+      </p:ext>
+    </p:extLst>
+  </p:cSld>
+  <p:clrMapOvr>
+    <a:masterClrMapping/>
+  </p:clrMapOvr>
+  <p:timing>
+    <p:tnLst>
+      <p:par>
+        <p:cTn id="1" dur="indefinite" restart="never" nodeType="tmRoot"/>
+      </p:par>
+    </p:tnLst>
+  </p:timing>
+</p:sld>
+</file>
+
+<file path=ppt/slides/slide25.xml><?xml version="1.0" encoding="utf-8"?>
+<p:sld xmlns:a="http://schemas.openxmlformats.org/drawingml/2006/main" xmlns:r="http://schemas.openxmlformats.org/officeDocument/2006/relationships" xmlns:p="http://schemas.openxmlformats.org/presentationml/2006/main">
+  <p:cSld>
+    <p:spTree>
+      <p:nvGrpSpPr>
+        <p:cNvPr id="1" name=""/>
+        <p:cNvGrpSpPr/>
+        <p:nvPr/>
+      </p:nvGrpSpPr>
+      <p:grpSpPr>
+        <a:xfrm>
+          <a:off x="0" y="0"/>
+          <a:ext cx="0" cy="0"/>
+          <a:chOff x="0" y="0"/>
+          <a:chExt cx="0" cy="0"/>
+        </a:xfrm>
+      </p:grpSpPr>
+      <p:sp>
+        <p:nvSpPr>
+          <p:cNvPr id="2" name="Title 1"/>
+          <p:cNvSpPr>
+            <a:spLocks noGrp="1"/>
+          </p:cNvSpPr>
+          <p:nvPr>
+            <p:ph type="title"/>
+          </p:nvPr>
+        </p:nvSpPr>
+        <p:spPr>
+          <a:xfrm>
+            <a:off x="457200" y="2874722"/>
+            <a:ext cx="8229600" cy="803756"/>
+          </a:xfrm>
+        </p:spPr>
         <p:txBody>
           <a:bodyPr/>
           <a:lstStyle/>
           <a:p>
             <a:r>
               <a:rPr lang="en-US" dirty="0" smtClean="0"/>
+              <a:t>Thank you!</a:t>
+            </a:r>
+            <a:endParaRPr lang="en-US" dirty="0"/>
+          </a:p>
+        </p:txBody>
+      </p:sp>
+    </p:spTree>
+    <p:extLst>
+      <p:ext uri="{BB962C8B-B14F-4D97-AF65-F5344CB8AC3E}">
+        <p14:creationId xmlns:p14="http://schemas.microsoft.com/office/powerpoint/2010/main" val="1844849267"/>
+      </p:ext>
+    </p:extLst>
+  </p:cSld>
+  <p:clrMapOvr>
+    <a:masterClrMapping/>
+  </p:clrMapOvr>
+  <p:timing>
+    <p:tnLst>
+      <p:par>
+        <p:cTn id="1" dur="indefinite" restart="never" nodeType="tmRoot"/>
+      </p:par>
+    </p:tnLst>
+  </p:timing>
+</p:sld>
+</file>
+
+<file path=ppt/slides/slide26.xml><?xml version="1.0" encoding="utf-8"?>
+<p:sld xmlns:a="http://schemas.openxmlformats.org/drawingml/2006/main" xmlns:r="http://schemas.openxmlformats.org/officeDocument/2006/relationships" xmlns:p="http://schemas.openxmlformats.org/presentationml/2006/main">
+  <p:cSld>
+    <p:spTree>
+      <p:nvGrpSpPr>
+        <p:cNvPr id="1" name=""/>
+        <p:cNvGrpSpPr/>
+        <p:nvPr/>
+      </p:nvGrpSpPr>
+      <p:grpSpPr>
+        <a:xfrm>
+          <a:off x="0" y="0"/>
+          <a:ext cx="0" cy="0"/>
+          <a:chOff x="0" y="0"/>
+          <a:chExt cx="0" cy="0"/>
+        </a:xfrm>
+      </p:grpSpPr>
+      <p:sp>
+        <p:nvSpPr>
+          <p:cNvPr id="2" name="Title 1"/>
+          <p:cNvSpPr>
+            <a:spLocks noGrp="1"/>
+          </p:cNvSpPr>
+          <p:nvPr>
+            <p:ph type="title"/>
+          </p:nvPr>
+        </p:nvSpPr>
+        <p:spPr>
+          <a:xfrm>
+            <a:off x="457200" y="2874722"/>
+            <a:ext cx="8229600" cy="803756"/>
+          </a:xfrm>
+        </p:spPr>
+        <p:txBody>
+          <a:bodyPr/>
+          <a:lstStyle/>
+          <a:p>
+            <a:r>
+              <a:rPr lang="en-US" dirty="0" smtClean="0"/>
+              <a:t>Feedback?</a:t>
+            </a:r>
+            <a:endParaRPr lang="en-US" dirty="0"/>
+          </a:p>
+        </p:txBody>
+      </p:sp>
+    </p:spTree>
+    <p:extLst>
+      <p:ext uri="{BB962C8B-B14F-4D97-AF65-F5344CB8AC3E}">
+        <p14:creationId xmlns:p14="http://schemas.microsoft.com/office/powerpoint/2010/main" val="891265136"/>
+      </p:ext>
+    </p:extLst>
+  </p:cSld>
+  <p:clrMapOvr>
+    <a:masterClrMapping/>
+  </p:clrMapOvr>
+  <p:timing>
+    <p:tnLst>
+      <p:par>
+        <p:cTn id="1" dur="indefinite" restart="never" nodeType="tmRoot"/>
+      </p:par>
+    </p:tnLst>
+  </p:timing>
+</p:sld>
+</file>
+
+<file path=ppt/slides/slide27.xml><?xml version="1.0" encoding="utf-8"?>
+<p:sld xmlns:a="http://schemas.openxmlformats.org/drawingml/2006/main" xmlns:r="http://schemas.openxmlformats.org/officeDocument/2006/relationships" xmlns:p="http://schemas.openxmlformats.org/presentationml/2006/main">
+  <p:cSld>
+    <p:spTree>
+      <p:nvGrpSpPr>
+        <p:cNvPr id="1" name=""/>
+        <p:cNvGrpSpPr/>
+        <p:nvPr/>
+      </p:nvGrpSpPr>
+      <p:grpSpPr>
+        <a:xfrm>
+          <a:off x="0" y="0"/>
+          <a:ext cx="0" cy="0"/>
+          <a:chOff x="0" y="0"/>
+          <a:chExt cx="0" cy="0"/>
+        </a:xfrm>
+      </p:grpSpPr>
+      <p:sp>
+        <p:nvSpPr>
+          <p:cNvPr id="2" name="Title 1"/>
+          <p:cNvSpPr>
+            <a:spLocks noGrp="1"/>
+          </p:cNvSpPr>
+          <p:nvPr>
+            <p:ph type="title"/>
+          </p:nvPr>
+        </p:nvSpPr>
+        <p:spPr/>
+        <p:txBody>
+          <a:bodyPr/>
+          <a:lstStyle/>
+          <a:p>
+            <a:r>
+              <a:rPr lang="en-US" dirty="0" smtClean="0"/>
+              <a:t>Backup Slides</a:t>
+            </a:r>
+            <a:endParaRPr lang="en-US" dirty="0"/>
+          </a:p>
+        </p:txBody>
+      </p:sp>
+      <p:sp>
+        <p:nvSpPr>
+          <p:cNvPr id="3" name="Content Placeholder 2"/>
+          <p:cNvSpPr>
+            <a:spLocks noGrp="1"/>
+          </p:cNvSpPr>
+          <p:nvPr>
+            <p:ph idx="1"/>
+          </p:nvPr>
+        </p:nvSpPr>
+        <p:spPr/>
+        <p:txBody>
+          <a:bodyPr/>
+          <a:lstStyle/>
+          <a:p>
+            <a:pPr marL="0" indent="0">
+              <a:buNone/>
+            </a:pPr>
+            <a:endParaRPr lang="en-US" dirty="0"/>
+          </a:p>
+        </p:txBody>
+      </p:sp>
+    </p:spTree>
+    <p:extLst>
+      <p:ext uri="{BB962C8B-B14F-4D97-AF65-F5344CB8AC3E}">
+        <p14:creationId xmlns:p14="http://schemas.microsoft.com/office/powerpoint/2010/main" val="1589961851"/>
+      </p:ext>
+    </p:extLst>
+  </p:cSld>
+  <p:clrMapOvr>
+    <a:masterClrMapping/>
+  </p:clrMapOvr>
+  <p:timing>
+    <p:tnLst>
+      <p:par>
+        <p:cTn id="1" dur="indefinite" restart="never" nodeType="tmRoot"/>
+      </p:par>
+    </p:tnLst>
+  </p:timing>
+</p:sld>
+</file>
+
+<file path=ppt/slides/slide28.xml><?xml version="1.0" encoding="utf-8"?>
+<p:sld xmlns:a="http://schemas.openxmlformats.org/drawingml/2006/main" xmlns:r="http://schemas.openxmlformats.org/officeDocument/2006/relationships" xmlns:p="http://schemas.openxmlformats.org/presentationml/2006/main">
+  <p:cSld>
+    <p:spTree>
+      <p:nvGrpSpPr>
+        <p:cNvPr id="1" name=""/>
+        <p:cNvGrpSpPr/>
+        <p:nvPr/>
+      </p:nvGrpSpPr>
+      <p:grpSpPr>
+        <a:xfrm>
+          <a:off x="0" y="0"/>
+          <a:ext cx="0" cy="0"/>
+          <a:chOff x="0" y="0"/>
+          <a:chExt cx="0" cy="0"/>
+        </a:xfrm>
+      </p:grpSpPr>
+      <p:sp>
+        <p:nvSpPr>
+          <p:cNvPr id="2" name="Title 1"/>
+          <p:cNvSpPr>
+            <a:spLocks noGrp="1"/>
+          </p:cNvSpPr>
+          <p:nvPr>
+            <p:ph type="title"/>
+          </p:nvPr>
+        </p:nvSpPr>
+        <p:spPr/>
+        <p:txBody>
+          <a:bodyPr/>
+          <a:lstStyle/>
+          <a:p>
+            <a:r>
+              <a:rPr lang="en-US" dirty="0" smtClean="0"/>
+              <a:t>First class functions</a:t>
+            </a:r>
+            <a:endParaRPr lang="en-US" dirty="0"/>
+          </a:p>
+        </p:txBody>
+      </p:sp>
+      <p:sp>
+        <p:nvSpPr>
+          <p:cNvPr id="3" name="Content Placeholder 2"/>
+          <p:cNvSpPr>
+            <a:spLocks noGrp="1"/>
+          </p:cNvSpPr>
+          <p:nvPr>
+            <p:ph idx="1"/>
+          </p:nvPr>
+        </p:nvSpPr>
+        <p:spPr/>
+        <p:txBody>
+          <a:bodyPr/>
+          <a:lstStyle/>
+          <a:p>
+            <a:r>
+              <a:rPr lang="en-US" dirty="0" smtClean="0"/>
               <a:t>Functions in Python are </a:t>
             </a:r>
             <a:r>
@@ -5689,12 +7029,6 @@
             <a:r>
               <a:rPr lang="en-US" dirty="0" smtClean="0"/>
               <a:t>, which means they can be passed around like any other variable</a:t>
-            </a:r>
-          </a:p>
-          <a:p>
-            <a:r>
-              <a:rPr lang="en-US" dirty="0" smtClean="0"/>
-              <a:t>This allows </a:t>
             </a:r>
           </a:p>
           <a:p>
@@ -5734,7 +7068,7 @@
 </p:sld>
 </file>
 
-<file path=ppt/slides/slide25.xml><?xml version="1.0" encoding="utf-8"?>
+<file path=ppt/slides/slide29.xml><?xml version="1.0" encoding="utf-8"?>
 <p:sld xmlns:a="http://schemas.openxmlformats.org/drawingml/2006/main" xmlns:r="http://schemas.openxmlformats.org/officeDocument/2006/relationships" xmlns:p="http://schemas.openxmlformats.org/presentationml/2006/main">
   <p:cSld>
     <p:spTree>
@@ -5951,7 +7285,7 @@
           <a:p>
             <a:r>
               <a:rPr lang="en-US" dirty="0" smtClean="0"/>
-              <a:t>Scope of this talk</a:t>
+              <a:t>What is Python?</a:t>
             </a:r>
             <a:endParaRPr lang="en-US" dirty="0"/>
           </a:p>
@@ -5969,37 +7303,54 @@
         </p:nvSpPr>
         <p:spPr/>
         <p:txBody>
-          <a:bodyPr/>
+          <a:bodyPr>
+            <a:normAutofit/>
+          </a:bodyPr>
           <a:lstStyle/>
           <a:p>
             <a:r>
               <a:rPr lang="en-US" dirty="0" smtClean="0"/>
-              <a:t>More things to say than will fit in this talk, see the list of notes and reading material online</a:t>
-            </a:r>
-            <a:r>
-              <a:rPr lang="en-US" dirty="0" smtClean="0"/>
-              <a:t>.</a:t>
-            </a:r>
-          </a:p>
-          <a:p>
-            <a:r>
-              <a:rPr lang="en-US" dirty="0" smtClean="0"/>
-              <a:t>Programming is most rewarding as an auto-didactic process!</a:t>
-            </a:r>
-            <a:endParaRPr lang="en-US" dirty="0"/>
+              <a:t>Python in an </a:t>
+            </a:r>
+            <a:r>
+              <a:rPr lang="en-US" b="1" dirty="0" smtClean="0"/>
+              <a:t>interpreted </a:t>
+            </a:r>
+            <a:r>
+              <a:rPr lang="en-US" dirty="0" smtClean="0"/>
+              <a:t>programming language with </a:t>
+            </a:r>
+            <a:r>
+              <a:rPr lang="en-US" b="1" dirty="0" smtClean="0"/>
+              <a:t>dynamic typing</a:t>
+            </a:r>
+            <a:endParaRPr lang="en-US" dirty="0" smtClean="0"/>
+          </a:p>
+          <a:p>
+            <a:pPr marL="0" indent="0">
+              <a:buNone/>
+            </a:pPr>
+            <a:endParaRPr lang="en-US" dirty="0" smtClean="0"/>
           </a:p>
         </p:txBody>
       </p:sp>
     </p:spTree>
     <p:extLst>
       <p:ext uri="{BB962C8B-B14F-4D97-AF65-F5344CB8AC3E}">
-        <p14:creationId xmlns:p14="http://schemas.microsoft.com/office/powerpoint/2010/main" val="239801139"/>
+        <p14:creationId xmlns:p14="http://schemas.microsoft.com/office/powerpoint/2010/main" val="1885548967"/>
       </p:ext>
     </p:extLst>
   </p:cSld>
   <p:clrMapOvr>
     <a:masterClrMapping/>
   </p:clrMapOvr>
+  <p:timing>
+    <p:tnLst>
+      <p:par>
+        <p:cTn id="1" dur="indefinite" restart="never" nodeType="tmRoot"/>
+      </p:par>
+    </p:tnLst>
+  </p:timing>
 </p:sld>
 </file>
 
@@ -6061,35 +7412,77 @@
           <a:lstStyle/>
           <a:p>
             <a:r>
-              <a:rPr lang="en-US" dirty="0" smtClean="0"/>
+              <a:rPr lang="en-US" dirty="0" smtClean="0">
+                <a:solidFill>
+                  <a:schemeClr val="bg1">
+                    <a:lumMod val="85000"/>
+                  </a:schemeClr>
+                </a:solidFill>
+              </a:rPr>
               <a:t>Python in an </a:t>
             </a:r>
             <a:r>
               <a:rPr lang="en-US" b="1" dirty="0" smtClean="0"/>
-              <a:t>interpreted </a:t>
-            </a:r>
-            <a:r>
-              <a:rPr lang="en-US" dirty="0" smtClean="0"/>
+              <a:t>interpreted</a:t>
+            </a:r>
+            <a:r>
+              <a:rPr lang="en-US" b="1" dirty="0" smtClean="0">
+                <a:solidFill>
+                  <a:schemeClr val="bg1">
+                    <a:lumMod val="85000"/>
+                  </a:schemeClr>
+                </a:solidFill>
+              </a:rPr>
+              <a:t> </a:t>
+            </a:r>
+            <a:r>
+              <a:rPr lang="en-US" dirty="0" smtClean="0">
+                <a:solidFill>
+                  <a:schemeClr val="bg1">
+                    <a:lumMod val="85000"/>
+                  </a:schemeClr>
+                </a:solidFill>
+              </a:rPr>
               <a:t>programming language with </a:t>
             </a:r>
             <a:r>
-              <a:rPr lang="en-US" b="1" dirty="0" smtClean="0"/>
+              <a:rPr lang="en-US" b="1" dirty="0" smtClean="0">
+                <a:solidFill>
+                  <a:schemeClr val="bg1">
+                    <a:lumMod val="85000"/>
+                  </a:schemeClr>
+                </a:solidFill>
+              </a:rPr>
               <a:t>dynamic typing</a:t>
             </a:r>
-            <a:endParaRPr lang="en-US" dirty="0" smtClean="0"/>
-          </a:p>
-          <a:p>
-            <a:pPr marL="0" indent="0">
-              <a:buNone/>
-            </a:pPr>
-            <a:endParaRPr lang="en-US" dirty="0" smtClean="0"/>
+            <a:endParaRPr lang="en-US" dirty="0" smtClean="0">
+              <a:solidFill>
+                <a:schemeClr val="bg1">
+                  <a:lumMod val="85000"/>
+                </a:schemeClr>
+              </a:solidFill>
+            </a:endParaRPr>
+          </a:p>
+          <a:p>
+            <a:r>
+              <a:rPr lang="en-US" b="1" dirty="0"/>
+              <a:t>Interpreted</a:t>
+            </a:r>
+            <a:r>
+              <a:rPr lang="en-US" dirty="0"/>
+              <a:t> </a:t>
+            </a:r>
+            <a:r>
+              <a:rPr lang="en-US" dirty="0" smtClean="0"/>
+              <a:t>means instructions are “translated” from a high level to machine code</a:t>
+            </a:r>
           </a:p>
         </p:txBody>
       </p:sp>
     </p:spTree>
     <p:extLst>
       <p:ext uri="{BB962C8B-B14F-4D97-AF65-F5344CB8AC3E}">
-        <p14:creationId xmlns:p14="http://schemas.microsoft.com/office/powerpoint/2010/main" val="1885548967"/>
+        <p14:creationId xmlns:p14="http://schemas.microsoft.com/office/powerpoint/2010/main" val="2487505968"/>
       </p:ext>
     </p:extLst>
   </p:cSld>
@@ -6174,151 +7567,6 @@
               <a:t>Python in an </a:t>
             </a:r>
             <a:r>
-              <a:rPr lang="en-US" b="1" dirty="0" smtClean="0"/>
-              <a:t>interpreted</a:t>
-            </a:r>
-            <a:r>
-              <a:rPr lang="en-US" b="1" dirty="0" smtClean="0">
-                <a:solidFill>
-                  <a:schemeClr val="bg1">
-                    <a:lumMod val="85000"/>
-                  </a:schemeClr>
-                </a:solidFill>
-              </a:rPr>
-              <a:t> </a:t>
-            </a:r>
-            <a:r>
-              <a:rPr lang="en-US" dirty="0" smtClean="0">
-                <a:solidFill>
-                  <a:schemeClr val="bg1">
-                    <a:lumMod val="85000"/>
-                  </a:schemeClr>
-                </a:solidFill>
-              </a:rPr>
-              <a:t>programming language with </a:t>
-            </a:r>
-            <a:r>
-              <a:rPr lang="en-US" b="1" dirty="0" smtClean="0">
-                <a:solidFill>
-                  <a:schemeClr val="bg1">
-                    <a:lumMod val="85000"/>
-                  </a:schemeClr>
-                </a:solidFill>
-              </a:rPr>
-              <a:t>dynamic typing</a:t>
-            </a:r>
-            <a:endParaRPr lang="en-US" dirty="0" smtClean="0">
-              <a:solidFill>
-                <a:schemeClr val="bg1">
-                  <a:lumMod val="85000"/>
-                </a:schemeClr>
-              </a:solidFill>
-            </a:endParaRPr>
-          </a:p>
-          <a:p>
-            <a:r>
-              <a:rPr lang="en-US" b="1" dirty="0"/>
-              <a:t>Interpreted</a:t>
-            </a:r>
-            <a:r>
-              <a:rPr lang="en-US" dirty="0"/>
-              <a:t> </a:t>
-            </a:r>
-            <a:r>
-              <a:rPr lang="en-US" dirty="0" smtClean="0"/>
-              <a:t>means instructions are “translated” from a high level to machine code</a:t>
-            </a:r>
-          </a:p>
-        </p:txBody>
-      </p:sp>
-    </p:spTree>
-    <p:extLst>
-      <p:ext uri="{BB962C8B-B14F-4D97-AF65-F5344CB8AC3E}">
-        <p14:creationId xmlns:p14="http://schemas.microsoft.com/office/powerpoint/2010/main" val="2487505968"/>
-      </p:ext>
-    </p:extLst>
-  </p:cSld>
-  <p:clrMapOvr>
-    <a:masterClrMapping/>
-  </p:clrMapOvr>
-  <p:timing>
-    <p:tnLst>
-      <p:par>
-        <p:cTn id="1" dur="indefinite" restart="never" nodeType="tmRoot"/>
-      </p:par>
-    </p:tnLst>
-  </p:timing>
-</p:sld>
-</file>
-
-<file path=ppt/slides/slide6.xml><?xml version="1.0" encoding="utf-8"?>
-<p:sld xmlns:a="http://schemas.openxmlformats.org/drawingml/2006/main" xmlns:r="http://schemas.openxmlformats.org/officeDocument/2006/relationships" xmlns:p="http://schemas.openxmlformats.org/presentationml/2006/main">
-  <p:cSld>
-    <p:spTree>
-      <p:nvGrpSpPr>
-        <p:cNvPr id="1" name=""/>
-        <p:cNvGrpSpPr/>
-        <p:nvPr/>
-      </p:nvGrpSpPr>
-      <p:grpSpPr>
-        <a:xfrm>
-          <a:off x="0" y="0"/>
-          <a:ext cx="0" cy="0"/>
-          <a:chOff x="0" y="0"/>
-          <a:chExt cx="0" cy="0"/>
-        </a:xfrm>
-      </p:grpSpPr>
-      <p:sp>
-        <p:nvSpPr>
-          <p:cNvPr id="2" name="Title 1"/>
-          <p:cNvSpPr>
-            <a:spLocks noGrp="1"/>
-          </p:cNvSpPr>
-          <p:nvPr>
-            <p:ph type="title"/>
-          </p:nvPr>
-        </p:nvSpPr>
-        <p:spPr/>
-        <p:txBody>
-          <a:bodyPr/>
-          <a:lstStyle/>
-          <a:p>
-            <a:r>
-              <a:rPr lang="en-US" dirty="0" smtClean="0"/>
-              <a:t>What is Python?</a:t>
-            </a:r>
-            <a:endParaRPr lang="en-US" dirty="0"/>
-          </a:p>
-        </p:txBody>
-      </p:sp>
-      <p:sp>
-        <p:nvSpPr>
-          <p:cNvPr id="3" name="Content Placeholder 2"/>
-          <p:cNvSpPr>
-            <a:spLocks noGrp="1"/>
-          </p:cNvSpPr>
-          <p:nvPr>
-            <p:ph idx="1"/>
-          </p:nvPr>
-        </p:nvSpPr>
-        <p:spPr/>
-        <p:txBody>
-          <a:bodyPr>
-            <a:normAutofit/>
-          </a:bodyPr>
-          <a:lstStyle/>
-          <a:p>
-            <a:r>
-              <a:rPr lang="en-US" dirty="0" smtClean="0">
-                <a:solidFill>
-                  <a:schemeClr val="bg1">
-                    <a:lumMod val="85000"/>
-                  </a:schemeClr>
-                </a:solidFill>
-              </a:rPr>
-              <a:t>Python in an </a:t>
-            </a:r>
-            <a:r>
               <a:rPr lang="en-US" b="1" dirty="0" smtClean="0">
                 <a:solidFill>
                   <a:schemeClr val="bg1">
@@ -6408,7 +7656,7 @@
 </p:sld>
 </file>
 
-<file path=ppt/slides/slide7.xml><?xml version="1.0" encoding="utf-8"?>
+<file path=ppt/slides/slide6.xml><?xml version="1.0" encoding="utf-8"?>
 <p:sld xmlns:a="http://schemas.openxmlformats.org/drawingml/2006/main" xmlns:r="http://schemas.openxmlformats.org/officeDocument/2006/relationships" xmlns:p="http://schemas.openxmlformats.org/presentationml/2006/main">
   <p:cSld>
     <p:spTree>
@@ -6697,6 +7945,111 @@
 </p:sld>
 </file>
 
+<file path=ppt/slides/slide7.xml><?xml version="1.0" encoding="utf-8"?>
+<p:sld xmlns:a="http://schemas.openxmlformats.org/drawingml/2006/main" xmlns:r="http://schemas.openxmlformats.org/officeDocument/2006/relationships" xmlns:p="http://schemas.openxmlformats.org/presentationml/2006/main">
+  <p:cSld>
+    <p:spTree>
+      <p:nvGrpSpPr>
+        <p:cNvPr id="1" name=""/>
+        <p:cNvGrpSpPr/>
+        <p:nvPr/>
+      </p:nvGrpSpPr>
+      <p:grpSpPr>
+        <a:xfrm>
+          <a:off x="0" y="0"/>
+          <a:ext cx="0" cy="0"/>
+          <a:chOff x="0" y="0"/>
+          <a:chExt cx="0" cy="0"/>
+        </a:xfrm>
+      </p:grpSpPr>
+      <p:sp>
+        <p:nvSpPr>
+          <p:cNvPr id="2" name="Title 1"/>
+          <p:cNvSpPr>
+            <a:spLocks noGrp="1"/>
+          </p:cNvSpPr>
+          <p:nvPr>
+            <p:ph type="title"/>
+          </p:nvPr>
+        </p:nvSpPr>
+        <p:spPr/>
+        <p:txBody>
+          <a:bodyPr/>
+          <a:lstStyle/>
+          <a:p>
+            <a:r>
+              <a:rPr lang="en-US" dirty="0" smtClean="0"/>
+              <a:t>A second short program in Python</a:t>
+            </a:r>
+            <a:endParaRPr lang="en-US" dirty="0"/>
+          </a:p>
+        </p:txBody>
+      </p:sp>
+      <p:sp>
+        <p:nvSpPr>
+          <p:cNvPr id="3" name="Content Placeholder 2"/>
+          <p:cNvSpPr>
+            <a:spLocks noGrp="1"/>
+          </p:cNvSpPr>
+          <p:nvPr>
+            <p:ph idx="1"/>
+          </p:nvPr>
+        </p:nvSpPr>
+        <p:spPr/>
+        <p:txBody>
+          <a:bodyPr/>
+          <a:lstStyle/>
+          <a:p>
+            <a:r>
+              <a:rPr lang="en-US" b="1" dirty="0"/>
+              <a:t>python </a:t>
+            </a:r>
+            <a:r>
+              <a:rPr lang="en-US" b="1" dirty="0" smtClean="0"/>
+              <a:t>loops_example.py</a:t>
+            </a:r>
+          </a:p>
+          <a:p>
+            <a:r>
+              <a:rPr lang="en-US" dirty="0"/>
+              <a:t>See online at </a:t>
+            </a:r>
+            <a:r>
+              <a:rPr lang="en-US" dirty="0">
+                <a:hlinkClick r:id="rId2"/>
+              </a:rPr>
+              <a:t>https://</a:t>
+            </a:r>
+            <a:r>
+              <a:rPr lang="en-US" dirty="0" smtClean="0">
+                <a:hlinkClick r:id="rId2"/>
+              </a:rPr>
+              <a:t>repl.it/DEQG</a:t>
+            </a:r>
+            <a:endParaRPr lang="en-US" dirty="0" smtClean="0"/>
+          </a:p>
+        </p:txBody>
+      </p:sp>
+    </p:spTree>
+    <p:extLst>
+      <p:ext uri="{BB962C8B-B14F-4D97-AF65-F5344CB8AC3E}">
+        <p14:creationId xmlns:p14="http://schemas.microsoft.com/office/powerpoint/2010/main" val="2697459567"/>
+      </p:ext>
+    </p:extLst>
+  </p:cSld>
+  <p:clrMapOvr>
+    <a:masterClrMapping/>
+  </p:clrMapOvr>
+  <p:timing>
+    <p:tnLst>
+      <p:par>
+        <p:cTn id="1" dur="indefinite" restart="never" nodeType="tmRoot"/>
+      </p:par>
+    </p:tnLst>
+  </p:timing>
+</p:sld>
+</file>
+
 <file path=ppt/slides/slide8.xml><?xml version="1.0" encoding="utf-8"?>
 <p:sld xmlns:a="http://schemas.openxmlformats.org/drawingml/2006/main" xmlns:r="http://schemas.openxmlformats.org/officeDocument/2006/relationships" xmlns:p="http://schemas.openxmlformats.org/presentationml/2006/main">
   <p:cSld>
@@ -6731,7 +8084,15 @@
           <a:p>
             <a:r>
               <a:rPr lang="en-US" dirty="0" smtClean="0"/>
-              <a:t>A second short program in Python</a:t>
+              <a:t>A third </a:t>
+            </a:r>
+            <a:r>
+              <a:rPr lang="en-US" dirty="0" smtClean="0"/>
+              <a:t>program </a:t>
+            </a:r>
+            <a:r>
+              <a:rPr lang="en-US" dirty="0" smtClean="0"/>
+              <a:t>in Python</a:t>
             </a:r>
             <a:endParaRPr lang="en-US" dirty="0"/>
           </a:p>
@@ -6753,12 +8114,27 @@
           <a:lstStyle/>
           <a:p>
             <a:r>
-              <a:rPr lang="en-US" b="1" dirty="0"/>
-              <a:t>python </a:t>
-            </a:r>
+              <a:rPr lang="en-US" dirty="0" smtClean="0"/>
+              <a:t>More complex programs make use of defined </a:t>
+            </a:r>
+            <a:r>
+              <a:rPr lang="en-US" dirty="0" smtClean="0"/>
+              <a:t>functions</a:t>
+            </a:r>
+            <a:endParaRPr lang="en-US" dirty="0"/>
+          </a:p>
+          <a:p>
             <a:r>
               <a:rPr lang="en-US" b="1" dirty="0" smtClean="0"/>
-              <a:t>loops_example.py</a:t>
+              <a:t>python –</a:t>
+            </a:r>
+            <a:r>
+              <a:rPr lang="en-US" b="1" dirty="0" err="1" smtClean="0"/>
+              <a:t>i</a:t>
+            </a:r>
+            <a:r>
+              <a:rPr lang="en-US" b="1" dirty="0" smtClean="0"/>
+              <a:t> functions_example.py</a:t>
             </a:r>
           </a:p>
           <a:p>
@@ -6776,7 +8152,11 @@
               <a:rPr lang="en-US" dirty="0" smtClean="0">
                 <a:hlinkClick r:id="rId2"/>
               </a:rPr>
-              <a:t>repl.it/DEQG</a:t>
+              <a:t>repl.it/DKCn</a:t>
+            </a:r>
+            <a:r>
+              <a:rPr lang="en-US" dirty="0" smtClean="0"/>
+              <a:t> </a:t>
             </a:r>
             <a:endParaRPr lang="en-US" dirty="0" smtClean="0"/>
           </a:p>
@@ -6785,7 +8165,7 @@
     </p:spTree>
     <p:extLst>
       <p:ext uri="{BB962C8B-B14F-4D97-AF65-F5344CB8AC3E}">
-        <p14:creationId xmlns:p14="http://schemas.microsoft.com/office/powerpoint/2010/main" val="2697459567"/>
+        <p14:creationId xmlns:p14="http://schemas.microsoft.com/office/powerpoint/2010/main" val="2542265730"/>
       </p:ext>
     </p:extLst>
   </p:cSld>
@@ -6836,7 +8216,7 @@
           <a:p>
             <a:r>
               <a:rPr lang="en-US" dirty="0" smtClean="0"/>
-              <a:t>A third short program in Python</a:t>
+              <a:t>What is Python good for?</a:t>
             </a:r>
             <a:endParaRPr lang="en-US" dirty="0"/>
           </a:p>
@@ -6852,64 +8232,67 @@
             <p:ph idx="1"/>
           </p:nvPr>
         </p:nvSpPr>
-        <p:spPr/>
-        <p:txBody>
-          <a:bodyPr/>
+        <p:spPr>
+          <a:xfrm>
+            <a:off x="457200" y="2049270"/>
+            <a:ext cx="8229600" cy="4482159"/>
+          </a:xfrm>
+        </p:spPr>
+        <p:txBody>
+          <a:bodyPr>
+            <a:normAutofit/>
+          </a:bodyPr>
           <a:lstStyle/>
           <a:p>
             <a:r>
               <a:rPr lang="en-US" dirty="0" smtClean="0"/>
-              <a:t>More complex programs make use of defined </a:t>
-            </a:r>
-            <a:r>
-              <a:rPr lang="en-US" dirty="0" smtClean="0"/>
-              <a:t>functions</a:t>
-            </a:r>
-            <a:endParaRPr lang="en-US" dirty="0"/>
-          </a:p>
-          <a:p>
-            <a:r>
-              <a:rPr lang="en-US" b="1" dirty="0" smtClean="0"/>
-              <a:t>python –</a:t>
-            </a:r>
-            <a:r>
-              <a:rPr lang="en-US" b="1" dirty="0" err="1" smtClean="0"/>
-              <a:t>i</a:t>
-            </a:r>
-            <a:r>
-              <a:rPr lang="en-US" b="1" dirty="0" smtClean="0"/>
-              <a:t> functions_example.py</a:t>
-            </a:r>
-          </a:p>
-          <a:p>
-            <a:r>
-              <a:rPr lang="en-US" dirty="0"/>
-              <a:t>See online at </a:t>
-            </a:r>
-            <a:r>
-              <a:rPr lang="en-US" dirty="0">
-                <a:hlinkClick r:id="rId2"/>
-              </a:rPr>
-              <a:t>https://</a:t>
-            </a:r>
-            <a:r>
-              <a:rPr lang="en-US" dirty="0" smtClean="0">
-                <a:hlinkClick r:id="rId2"/>
-              </a:rPr>
-              <a:t>repl.it/DJhr</a:t>
-            </a:r>
-            <a:r>
-              <a:rPr lang="en-US" dirty="0" smtClean="0"/>
-              <a:t> </a:t>
+              <a:t>Development quality of life</a:t>
+            </a:r>
+          </a:p>
+          <a:p>
+            <a:pPr lvl="1"/>
+            <a:r>
+              <a:rPr lang="en-US" dirty="0" smtClean="0"/>
+              <a:t>More time writing easy to read code, quickly</a:t>
+            </a:r>
+          </a:p>
+          <a:p>
+            <a:r>
+              <a:rPr lang="en-US" dirty="0" smtClean="0"/>
+              <a:t>Portability</a:t>
+            </a:r>
+          </a:p>
+          <a:p>
+            <a:pPr lvl="1"/>
+            <a:r>
+              <a:rPr lang="en-US" dirty="0" smtClean="0"/>
+              <a:t>As long as the target has a Python interpreter, we can run Python there!</a:t>
+            </a:r>
+          </a:p>
+          <a:p>
+            <a:r>
+              <a:rPr lang="en-US" dirty="0" smtClean="0"/>
+              <a:t>Rich </a:t>
+            </a:r>
+            <a:r>
+              <a:rPr lang="en-US" dirty="0" smtClean="0"/>
+              <a:t>ecosystem</a:t>
             </a:r>
             <a:endParaRPr lang="en-US" dirty="0" smtClean="0"/>
+          </a:p>
+          <a:p>
+            <a:pPr lvl="1"/>
+            <a:r>
+              <a:rPr lang="en-US" dirty="0" smtClean="0"/>
+              <a:t>Great libraries exist for most common tasks</a:t>
+            </a:r>
           </a:p>
         </p:txBody>
       </p:sp>
     </p:spTree>
     <p:extLst>
       <p:ext uri="{BB962C8B-B14F-4D97-AF65-F5344CB8AC3E}">
-        <p14:creationId xmlns:p14="http://schemas.microsoft.com/office/powerpoint/2010/main" val="2542265730"/>
+        <p14:creationId xmlns:p14="http://schemas.microsoft.com/office/powerpoint/2010/main" val="533240533"/>
       </p:ext>
     </p:extLst>
   </p:cSld>
@@ -6919,7 +8302,190 @@
   <p:timing>
     <p:tnLst>
       <p:par>
-        <p:cTn id="1" dur="indefinite" restart="never" nodeType="tmRoot"/>
+        <p:cTn id="1" dur="indefinite" restart="never" nodeType="tmRoot">
+          <p:childTnLst>
+            <p:seq concurrent="1" nextAc="seek">
+              <p:cTn id="2" dur="indefinite" nodeType="mainSeq">
+                <p:childTnLst>
+                  <p:par>
+                    <p:cTn id="3" fill="hold">
+                      <p:stCondLst>
+                        <p:cond delay="indefinite"/>
+                      </p:stCondLst>
+                      <p:childTnLst>
+                        <p:par>
+                          <p:cTn id="4" fill="hold">
+                            <p:stCondLst>
+                              <p:cond delay="0"/>
+                            </p:stCondLst>
+                            <p:childTnLst>
+                              <p:par>
+                                <p:cTn id="5" presetID="1" presetClass="entr" presetSubtype="0" fill="hold" nodeType="clickEffect">
+                                  <p:stCondLst>
+                                    <p:cond delay="0"/>
+                                  </p:stCondLst>
+                                  <p:childTnLst>
+                                    <p:set>
+                                      <p:cBhvr>
+                                        <p:cTn id="6" dur="1" fill="hold">
+                                          <p:stCondLst>
+                                            <p:cond delay="0"/>
+                                          </p:stCondLst>
+                                        </p:cTn>
+                                        <p:tgtEl>
+                                          <p:spTgt spid="3">
+                                            <p:txEl>
+                                              <p:pRg st="2" end="2"/>
+                                            </p:txEl>
+                                          </p:spTgt>
+                                        </p:tgtEl>
+                                        <p:attrNameLst>
+                                          <p:attrName>style.visibility</p:attrName>
+                                        </p:attrNameLst>
+                                      </p:cBhvr>
+                                      <p:to>
+                                        <p:strVal val="visible"/>
+                                      </p:to>
+                                    </p:set>
+                                  </p:childTnLst>
+                                </p:cTn>
+                              </p:par>
+                              <p:par>
+                                <p:cTn id="7" presetID="1" presetClass="entr" presetSubtype="0" fill="hold" nodeType="withEffect">
+                                  <p:stCondLst>
+                                    <p:cond delay="0"/>
+                                  </p:stCondLst>
+                                  <p:childTnLst>
+                                    <p:set>
+                                      <p:cBhvr>
+                                        <p:cTn id="8" dur="1" fill="hold">
+                                          <p:stCondLst>
+                                            <p:cond delay="0"/>
+                                          </p:stCondLst>
+                                        </p:cTn>
+                                        <p:tgtEl>
+                                          <p:spTgt spid="3">
+                                            <p:txEl>
+                                              <p:pRg st="3" end="3"/>
+                                            </p:txEl>
+                                          </p:spTgt>
+                                        </p:tgtEl>
+                                        <p:attrNameLst>
+                                          <p:attrName>style.visibility</p:attrName>
+                                        </p:attrNameLst>
+                                      </p:cBhvr>
+                                      <p:to>
+                                        <p:strVal val="visible"/>
+                                      </p:to>
+                                    </p:set>
+                                  </p:childTnLst>
+                                </p:cTn>
+                              </p:par>
+                            </p:childTnLst>
+                          </p:cTn>
+                        </p:par>
+                      </p:childTnLst>
+                    </p:cTn>
+                  </p:par>
+                  <p:par>
+                    <p:cTn id="9" fill="hold">
+                      <p:stCondLst>
+                        <p:cond delay="indefinite"/>
+                      </p:stCondLst>
+                      <p:childTnLst>
+                        <p:par>
+                          <p:cTn id="10" fill="hold">
+                            <p:stCondLst>
+                              <p:cond delay="0"/>
+                            </p:stCondLst>
+                            <p:childTnLst>
+                              <p:par>
+                                <p:cTn id="11" presetID="1" presetClass="entr" presetSubtype="0" fill="hold" nodeType="clickEffect">
+                                  <p:stCondLst>
+                                    <p:cond delay="0"/>
+                                  </p:stCondLst>
+                                  <p:childTnLst>
+                                    <p:set>
+                                      <p:cBhvr>
+                                        <p:cTn id="12" dur="1" fill="hold">
+                                          <p:stCondLst>
+                                            <p:cond delay="0"/>
+                                          </p:stCondLst>
+                                        </p:cTn>
+                                        <p:tgtEl>
+                                          <p:spTgt spid="3">
+                                            <p:txEl>
+                                              <p:pRg st="4" end="4"/>
+                                            </p:txEl>
+                                          </p:spTgt>
+                                        </p:tgtEl>
+                                        <p:attrNameLst>
+                                          <p:attrName>style.visibility</p:attrName>
+                                        </p:attrNameLst>
+                                      </p:cBhvr>
+                                      <p:to>
+                                        <p:strVal val="visible"/>
+                                      </p:to>
+                                    </p:set>
+                                  </p:childTnLst>
+                                </p:cTn>
+                              </p:par>
+                              <p:par>
+                                <p:cTn id="13" presetID="1" presetClass="entr" presetSubtype="0" fill="hold" nodeType="withEffect">
+                                  <p:stCondLst>
+                                    <p:cond delay="0"/>
+                                  </p:stCondLst>
+                                  <p:childTnLst>
+                                    <p:set>
+                                      <p:cBhvr>
+                                        <p:cTn id="14" dur="1" fill="hold">
+                                          <p:stCondLst>
+                                            <p:cond delay="0"/>
+                                          </p:stCondLst>
+                                        </p:cTn>
+                                        <p:tgtEl>
+                                          <p:spTgt spid="3">
+                                            <p:txEl>
+                                              <p:pRg st="5" end="5"/>
+                                            </p:txEl>
+                                          </p:spTgt>
+                                        </p:tgtEl>
+                                        <p:attrNameLst>
+                                          <p:attrName>style.visibility</p:attrName>
+                                        </p:attrNameLst>
+                                      </p:cBhvr>
+                                      <p:to>
+                                        <p:strVal val="visible"/>
+                                      </p:to>
+                                    </p:set>
+                                  </p:childTnLst>
+                                </p:cTn>
+                              </p:par>
+                            </p:childTnLst>
+                          </p:cTn>
+                        </p:par>
+                      </p:childTnLst>
+                    </p:cTn>
+                  </p:par>
+                </p:childTnLst>
+              </p:cTn>
+              <p:prevCondLst>
+                <p:cond evt="onPrev" delay="0">
+                  <p:tgtEl>
+                    <p:sldTgt/>
+                  </p:tgtEl>
+                </p:cond>
+              </p:prevCondLst>
+              <p:nextCondLst>
+                <p:cond evt="onNext" delay="0">
+                  <p:tgtEl>
+                    <p:sldTgt/>
+                  </p:tgtEl>
+                </p:cond>
+              </p:nextCondLst>
+            </p:seq>
+          </p:childTnLst>
+        </p:cTn>
       </p:par>
     </p:tnLst>
   </p:timing>

</xml_diff>

<commit_message>
Added built-in functions slide
</commit_message>
<xml_diff>
--- a/2016/computing_workgroup/intro-to-python/intro-to-python.pptx
+++ b/2016/computing_workgroup/intro-to-python/intro-to-python.pptx
@@ -5,7 +5,7 @@
     <p:sldMasterId id="2147483648" r:id="rId1"/>
   </p:sldMasterIdLst>
   <p:notesMasterIdLst>
-    <p:notesMasterId r:id="rId31"/>
+    <p:notesMasterId r:id="rId32"/>
   </p:notesMasterIdLst>
   <p:sldIdLst>
     <p:sldId id="256" r:id="rId2"/>
@@ -29,14 +29,15 @@
     <p:sldId id="370" r:id="rId20"/>
     <p:sldId id="371" r:id="rId21"/>
     <p:sldId id="368" r:id="rId22"/>
-    <p:sldId id="367" r:id="rId23"/>
-    <p:sldId id="369" r:id="rId24"/>
-    <p:sldId id="341" r:id="rId25"/>
-    <p:sldId id="339" r:id="rId26"/>
-    <p:sldId id="366" r:id="rId27"/>
-    <p:sldId id="340" r:id="rId28"/>
-    <p:sldId id="364" r:id="rId29"/>
-    <p:sldId id="362" r:id="rId30"/>
+    <p:sldId id="372" r:id="rId23"/>
+    <p:sldId id="367" r:id="rId24"/>
+    <p:sldId id="369" r:id="rId25"/>
+    <p:sldId id="341" r:id="rId26"/>
+    <p:sldId id="339" r:id="rId27"/>
+    <p:sldId id="366" r:id="rId28"/>
+    <p:sldId id="340" r:id="rId29"/>
+    <p:sldId id="364" r:id="rId30"/>
+    <p:sldId id="362" r:id="rId31"/>
   </p:sldIdLst>
   <p:sldSz cx="9144000" cy="6858000" type="screen4x3"/>
   <p:notesSz cx="6858000" cy="9144000"/>
@@ -236,7 +237,7 @@
           <a:p>
             <a:fld id="{6096A192-89F2-44C6-B07F-1B83CE44D511}" type="datetimeFigureOut">
               <a:rPr lang="en-US" smtClean="0"/>
-              <a:t>8/30/2016</a:t>
+              <a:t>9/2/2016</a:t>
             </a:fld>
             <a:endParaRPr lang="en-US"/>
           </a:p>
@@ -797,7 +798,7 @@
           <a:p>
             <a:fld id="{7181039F-CB0C-E14D-A7EF-3BACE2CEF4EA}" type="datetimeFigureOut">
               <a:rPr lang="en-US" smtClean="0"/>
-              <a:t>8/30/2016</a:t>
+              <a:t>9/2/2016</a:t>
             </a:fld>
             <a:endParaRPr lang="en-US"/>
           </a:p>
@@ -1057,7 +1058,7 @@
           <a:p>
             <a:fld id="{7181039F-CB0C-E14D-A7EF-3BACE2CEF4EA}" type="datetimeFigureOut">
               <a:rPr lang="en-US" smtClean="0"/>
-              <a:t>8/30/2016</a:t>
+              <a:t>9/2/2016</a:t>
             </a:fld>
             <a:endParaRPr lang="en-US"/>
           </a:p>
@@ -1322,7 +1323,7 @@
           <a:p>
             <a:fld id="{7181039F-CB0C-E14D-A7EF-3BACE2CEF4EA}" type="datetimeFigureOut">
               <a:rPr lang="en-US" smtClean="0"/>
-              <a:t>8/30/2016</a:t>
+              <a:t>9/2/2016</a:t>
             </a:fld>
             <a:endParaRPr lang="en-US"/>
           </a:p>
@@ -1485,7 +1486,7 @@
           <a:p>
             <a:fld id="{7181039F-CB0C-E14D-A7EF-3BACE2CEF4EA}" type="datetimeFigureOut">
               <a:rPr lang="en-US" smtClean="0"/>
-              <a:t>8/30/2016</a:t>
+              <a:t>9/2/2016</a:t>
             </a:fld>
             <a:endParaRPr lang="en-US"/>
           </a:p>
@@ -1762,7 +1763,7 @@
           <a:p>
             <a:fld id="{7181039F-CB0C-E14D-A7EF-3BACE2CEF4EA}" type="datetimeFigureOut">
               <a:rPr lang="en-US" smtClean="0"/>
-              <a:t>8/30/2016</a:t>
+              <a:t>9/2/2016</a:t>
             </a:fld>
             <a:endParaRPr lang="en-US"/>
           </a:p>
@@ -2021,7 +2022,7 @@
           <a:p>
             <a:fld id="{7181039F-CB0C-E14D-A7EF-3BACE2CEF4EA}" type="datetimeFigureOut">
               <a:rPr lang="en-US" smtClean="0"/>
-              <a:t>8/30/2016</a:t>
+              <a:t>9/2/2016</a:t>
             </a:fld>
             <a:endParaRPr lang="en-US"/>
           </a:p>
@@ -2234,7 +2235,7 @@
           <a:p>
             <a:fld id="{7181039F-CB0C-E14D-A7EF-3BACE2CEF4EA}" type="datetimeFigureOut">
               <a:rPr lang="en-US" smtClean="0"/>
-              <a:t>8/30/2016</a:t>
+              <a:t>9/2/2016</a:t>
             </a:fld>
             <a:endParaRPr lang="en-US"/>
           </a:p>
@@ -2916,10 +2917,6 @@
               </a:rPr>
               <a:t>September 1, 2016</a:t>
             </a:r>
-            <a:endParaRPr lang="en-US" sz="1600" dirty="0" smtClean="0">
-              <a:latin typeface="Miriam" panose="020B0502050101010101" pitchFamily="34" charset="-79"/>
-              <a:cs typeface="Miriam" panose="020B0502050101010101" pitchFamily="34" charset="-79"/>
-            </a:endParaRPr>
           </a:p>
         </p:txBody>
       </p:sp>
@@ -4357,15 +4354,7 @@
           <a:p>
             <a:r>
               <a:rPr lang="en-US" dirty="0" smtClean="0"/>
-              <a:t>Lists </a:t>
-            </a:r>
-            <a:r>
-              <a:rPr lang="en-US" dirty="0" smtClean="0"/>
-              <a:t>and tuples are </a:t>
-            </a:r>
-            <a:r>
-              <a:rPr lang="en-US" dirty="0" smtClean="0"/>
-              <a:t>linear sequences of objects, enumerated from 0.</a:t>
+              <a:t>Lists and tuples are linear sequences of objects, enumerated from 0.</a:t>
             </a:r>
           </a:p>
           <a:p>
@@ -4387,11 +4376,7 @@
             </a:r>
             <a:r>
               <a:rPr lang="en-US" dirty="0" smtClean="0"/>
-              <a:t> </a:t>
-            </a:r>
-            <a:r>
-              <a:rPr lang="en-US" dirty="0" smtClean="0"/>
-              <a:t>tuples.</a:t>
+              <a:t> tuples.</a:t>
             </a:r>
           </a:p>
           <a:p>
@@ -4400,7 +4385,6 @@
               <a:rPr lang="en-US" dirty="0" smtClean="0"/>
               <a:t>Once a tuple is created, it never changes!</a:t>
             </a:r>
-            <a:endParaRPr lang="en-US" dirty="0" smtClean="0"/>
           </a:p>
           <a:p>
             <a:pPr marL="0" indent="0">
@@ -4618,11 +4602,7 @@
             </a:r>
             <a:r>
               <a:rPr lang="en-US" dirty="0" smtClean="0"/>
-              <a:t>, Print Loop</a:t>
-            </a:r>
-            <a:r>
-              <a:rPr lang="en-US" dirty="0" smtClean="0"/>
-              <a:t>)</a:t>
+              <a:t>, Print Loop)</a:t>
             </a:r>
           </a:p>
           <a:p>
@@ -4650,7 +4630,6 @@
               <a:rPr lang="en-US" dirty="0" smtClean="0"/>
               <a:t> </a:t>
             </a:r>
-            <a:endParaRPr lang="en-US" dirty="0" smtClean="0"/>
           </a:p>
         </p:txBody>
       </p:sp>
@@ -5065,15 +5044,7 @@
           <a:p>
             <a:r>
               <a:rPr lang="en-US" dirty="0" smtClean="0"/>
-              <a:t>Three </a:t>
-            </a:r>
-            <a:r>
-              <a:rPr lang="en-US" dirty="0" smtClean="0"/>
-              <a:t>more Python </a:t>
-            </a:r>
-            <a:r>
-              <a:rPr lang="en-US" dirty="0" smtClean="0"/>
-              <a:t>Programs</a:t>
+              <a:t>Three more Python Programs</a:t>
             </a:r>
             <a:endParaRPr lang="en-US" dirty="0"/>
           </a:p>
@@ -5135,7 +5106,6 @@
               <a:rPr lang="en-US" dirty="0" smtClean="0"/>
               <a:t> </a:t>
             </a:r>
-            <a:endParaRPr lang="en-US" dirty="0" smtClean="0"/>
           </a:p>
           <a:p>
             <a:r>
@@ -5266,7 +5236,6 @@
               <a:rPr lang="en-US" dirty="0" smtClean="0"/>
               <a:t>Think Mathematica without the symbolic math</a:t>
             </a:r>
-            <a:endParaRPr lang="en-US" dirty="0" smtClean="0"/>
           </a:p>
         </p:txBody>
       </p:sp>
@@ -5468,13 +5437,8 @@
           <a:p>
             <a:r>
               <a:rPr lang="en-US" dirty="0" smtClean="0"/>
-              <a:t>Integer </a:t>
-            </a:r>
-            <a:r>
-              <a:rPr lang="en-US" dirty="0" smtClean="0"/>
-              <a:t>division doesn’t do the intuitive thing in Python 2</a:t>
-            </a:r>
-            <a:endParaRPr lang="en-US" dirty="0" smtClean="0"/>
+              <a:t>Integer division doesn’t do the intuitive thing in Python 2</a:t>
+            </a:r>
           </a:p>
           <a:p>
             <a:r>
@@ -5929,11 +5893,7 @@
           <a:p>
             <a:r>
               <a:rPr lang="en-US" dirty="0" smtClean="0"/>
-              <a:t>More things to say than will fit in this talk, see the list of notes and reading material online</a:t>
-            </a:r>
-            <a:r>
-              <a:rPr lang="en-US" dirty="0" smtClean="0"/>
-              <a:t>.</a:t>
+              <a:t>More things to say than will fit in this talk, see the list of notes and reading material online.</a:t>
             </a:r>
           </a:p>
           <a:p>
@@ -5942,7 +5902,6 @@
               <a:rPr lang="en-US" dirty="0" smtClean="0"/>
               <a:t>And ask questions!</a:t>
             </a:r>
-            <a:endParaRPr lang="en-US" dirty="0" smtClean="0"/>
           </a:p>
           <a:p>
             <a:r>
@@ -6329,105 +6288,69 @@
             <p:ph idx="1"/>
           </p:nvPr>
         </p:nvSpPr>
+        <p:spPr/>
+        <p:txBody>
+          <a:bodyPr/>
+          <a:lstStyle/>
+          <a:p>
+            <a:r>
+              <a:rPr lang="en-US" dirty="0" smtClean="0"/>
+              <a:t>A whole bunch of </a:t>
+            </a:r>
+            <a:r>
+              <a:rPr lang="en-US" dirty="0" smtClean="0"/>
+              <a:t>built-ins</a:t>
+            </a:r>
+            <a:endParaRPr lang="en-US" dirty="0" smtClean="0"/>
+          </a:p>
+          <a:p>
+            <a:pPr marL="0" indent="0">
+              <a:buNone/>
+            </a:pPr>
+            <a:endParaRPr lang="en-US" dirty="0"/>
+          </a:p>
+          <a:p>
+            <a:pPr marL="0" indent="0">
+              <a:buNone/>
+            </a:pPr>
+            <a:endParaRPr lang="en-US" dirty="0" smtClean="0"/>
+          </a:p>
+        </p:txBody>
+      </p:sp>
+      <p:pic>
+        <p:nvPicPr>
+          <p:cNvPr id="5" name="Picture 4"/>
+          <p:cNvPicPr>
+            <a:picLocks noChangeAspect="1"/>
+          </p:cNvPicPr>
+          <p:nvPr/>
+        </p:nvPicPr>
+        <p:blipFill>
+          <a:blip r:embed="rId2">
+            <a:extLst>
+              <a:ext uri="{28A0092B-C50C-407E-A947-70E740481C1C}">
+                <a14:useLocalDpi xmlns:a14="http://schemas.microsoft.com/office/drawing/2010/main" val="0"/>
+              </a:ext>
+            </a:extLst>
+          </a:blip>
+          <a:stretch>
+            <a:fillRect/>
+          </a:stretch>
+        </p:blipFill>
         <p:spPr>
           <a:xfrm>
-            <a:off x="457200" y="2049270"/>
-            <a:ext cx="8229600" cy="4639629"/>
+            <a:off x="894837" y="2671497"/>
+            <a:ext cx="7354326" cy="3801005"/>
           </a:xfrm>
+          <a:prstGeom prst="rect">
+            <a:avLst/>
+          </a:prstGeom>
         </p:spPr>
-        <p:txBody>
-          <a:bodyPr>
-            <a:normAutofit/>
-          </a:bodyPr>
-          <a:lstStyle/>
-          <a:p>
-            <a:r>
-              <a:rPr lang="en-US" dirty="0" smtClean="0"/>
-              <a:t>Classes and inheritance</a:t>
-            </a:r>
-          </a:p>
-          <a:p>
-            <a:r>
-              <a:rPr lang="en-US" dirty="0" smtClean="0"/>
-              <a:t>What the hell is </a:t>
-            </a:r>
-            <a:r>
-              <a:rPr lang="en-US" b="1" dirty="0" smtClean="0"/>
-              <a:t>__name__</a:t>
-            </a:r>
-            <a:r>
-              <a:rPr lang="en-US" dirty="0" smtClean="0"/>
-              <a:t>?</a:t>
-            </a:r>
-          </a:p>
-          <a:p>
-            <a:r>
-              <a:rPr lang="en-US" dirty="0" smtClean="0"/>
-              <a:t>Partial imports, module </a:t>
-            </a:r>
-            <a:r>
-              <a:rPr lang="en-US" dirty="0" err="1" smtClean="0"/>
-              <a:t>namespacing</a:t>
-            </a:r>
-            <a:endParaRPr lang="en-US" dirty="0" smtClean="0"/>
-          </a:p>
-          <a:p>
-            <a:pPr lvl="1"/>
-            <a:r>
-              <a:rPr lang="en-US" b="1" dirty="0" smtClean="0"/>
-              <a:t>from </a:t>
-            </a:r>
-            <a:r>
-              <a:rPr lang="en-US" b="1" dirty="0" err="1" smtClean="0"/>
-              <a:t>foo.bar</a:t>
-            </a:r>
-            <a:r>
-              <a:rPr lang="en-US" b="1" dirty="0" smtClean="0"/>
-              <a:t> import </a:t>
-            </a:r>
-            <a:r>
-              <a:rPr lang="en-US" b="1" dirty="0" err="1" smtClean="0"/>
-              <a:t>baz</a:t>
-            </a:r>
-            <a:endParaRPr lang="en-US" b="1" dirty="0" smtClean="0"/>
-          </a:p>
-          <a:p>
-            <a:r>
-              <a:rPr lang="en-US" dirty="0" smtClean="0"/>
-              <a:t>String formatting</a:t>
-            </a:r>
-          </a:p>
-          <a:p>
-            <a:r>
-              <a:rPr lang="en-US" dirty="0" err="1" smtClean="0"/>
-              <a:t>Iterables</a:t>
-            </a:r>
-            <a:r>
-              <a:rPr lang="en-US" dirty="0" smtClean="0"/>
-              <a:t>, generators</a:t>
-            </a:r>
-          </a:p>
-          <a:p>
-            <a:r>
-              <a:rPr lang="en-US" dirty="0" smtClean="0"/>
-              <a:t>Decorators</a:t>
-            </a:r>
-          </a:p>
-          <a:p>
-            <a:r>
-              <a:rPr lang="en-US" dirty="0" smtClean="0"/>
-              <a:t>Scope and closures</a:t>
-            </a:r>
-          </a:p>
-          <a:p>
-            <a:endParaRPr lang="en-US" dirty="0"/>
-          </a:p>
-        </p:txBody>
-      </p:sp>
+      </p:pic>
     </p:spTree>
     <p:extLst>
       <p:ext uri="{BB962C8B-B14F-4D97-AF65-F5344CB8AC3E}">
-        <p14:creationId xmlns:p14="http://schemas.microsoft.com/office/powerpoint/2010/main" val="3474212174"/>
+        <p14:creationId xmlns:p14="http://schemas.microsoft.com/office/powerpoint/2010/main" val="843617947"/>
       </p:ext>
     </p:extLst>
   </p:cSld>
@@ -6516,39 +6439,91 @@
           <a:p>
             <a:r>
               <a:rPr lang="en-US" dirty="0" smtClean="0"/>
-              <a:t>Command line arguments</a:t>
-            </a:r>
-          </a:p>
-          <a:p>
-            <a:r>
-              <a:rPr lang="en-US" dirty="0" smtClean="0"/>
-              <a:t>Debugging</a:t>
-            </a:r>
-          </a:p>
-          <a:p>
-            <a:r>
-              <a:rPr lang="en-US" dirty="0" smtClean="0"/>
-              <a:t>References (where are the pointers?!)</a:t>
-            </a:r>
-          </a:p>
-          <a:p>
-            <a:r>
-              <a:rPr lang="en-US" dirty="0" smtClean="0"/>
-              <a:t>…</a:t>
-            </a:r>
-          </a:p>
-          <a:p>
-            <a:r>
-              <a:rPr lang="en-US" dirty="0" smtClean="0"/>
-              <a:t>Perhaps you can tell me?</a:t>
-            </a:r>
+              <a:t>Classes and inheritance</a:t>
+            </a:r>
+          </a:p>
+          <a:p>
+            <a:r>
+              <a:rPr lang="en-US" dirty="0" smtClean="0"/>
+              <a:t>What the hell is </a:t>
+            </a:r>
+            <a:r>
+              <a:rPr lang="en-US" b="1" dirty="0" smtClean="0"/>
+              <a:t>__name__</a:t>
+            </a:r>
+            <a:r>
+              <a:rPr lang="en-US" dirty="0" smtClean="0"/>
+              <a:t>?</a:t>
+            </a:r>
+          </a:p>
+          <a:p>
+            <a:r>
+              <a:rPr lang="en-US" dirty="0" smtClean="0"/>
+              <a:t>Partial imports, module </a:t>
+            </a:r>
+            <a:r>
+              <a:rPr lang="en-US" dirty="0" err="1" smtClean="0"/>
+              <a:t>namespacing</a:t>
+            </a:r>
+            <a:endParaRPr lang="en-US" dirty="0" smtClean="0"/>
+          </a:p>
+          <a:p>
+            <a:pPr lvl="1"/>
+            <a:r>
+              <a:rPr lang="en-US" b="1" dirty="0" smtClean="0"/>
+              <a:t>from </a:t>
+            </a:r>
+            <a:r>
+              <a:rPr lang="en-US" b="1" dirty="0" err="1" smtClean="0"/>
+              <a:t>foo.bar</a:t>
+            </a:r>
+            <a:r>
+              <a:rPr lang="en-US" b="1" dirty="0" smtClean="0"/>
+              <a:t> import </a:t>
+            </a:r>
+            <a:r>
+              <a:rPr lang="en-US" b="1" dirty="0" err="1" smtClean="0"/>
+              <a:t>baz</a:t>
+            </a:r>
+            <a:endParaRPr lang="en-US" b="1" dirty="0" smtClean="0"/>
+          </a:p>
+          <a:p>
+            <a:r>
+              <a:rPr lang="en-US" dirty="0" smtClean="0"/>
+              <a:t>String formatting</a:t>
+            </a:r>
+          </a:p>
+          <a:p>
+            <a:r>
+              <a:rPr lang="en-US" dirty="0" err="1" smtClean="0"/>
+              <a:t>Iterables</a:t>
+            </a:r>
+            <a:r>
+              <a:rPr lang="en-US" dirty="0" smtClean="0"/>
+              <a:t>, generators</a:t>
+            </a:r>
+          </a:p>
+          <a:p>
+            <a:r>
+              <a:rPr lang="en-US" dirty="0" smtClean="0"/>
+              <a:t>Decorators</a:t>
+            </a:r>
+          </a:p>
+          <a:p>
+            <a:r>
+              <a:rPr lang="en-US" dirty="0" smtClean="0"/>
+              <a:t>Scope and closures</a:t>
+            </a:r>
+          </a:p>
+          <a:p>
+            <a:endParaRPr lang="en-US" dirty="0"/>
           </a:p>
         </p:txBody>
       </p:sp>
     </p:spTree>
     <p:extLst>
       <p:ext uri="{BB962C8B-B14F-4D97-AF65-F5344CB8AC3E}">
-        <p14:creationId xmlns:p14="http://schemas.microsoft.com/office/powerpoint/2010/main" val="3416555919"/>
+        <p14:creationId xmlns:p14="http://schemas.microsoft.com/office/powerpoint/2010/main" val="3474212174"/>
       </p:ext>
     </p:extLst>
   </p:cSld>
@@ -6599,7 +6574,15 @@
           <a:p>
             <a:r>
               <a:rPr lang="en-US" dirty="0" smtClean="0"/>
-              <a:t>Useful resources</a:t>
+              <a:t>Things I </a:t>
+            </a:r>
+            <a:r>
+              <a:rPr lang="en-US" i="1" dirty="0" smtClean="0"/>
+              <a:t>didn’t</a:t>
+            </a:r>
+            <a:r>
+              <a:rPr lang="en-US" dirty="0" smtClean="0"/>
+              <a:t> mention…</a:t>
             </a:r>
             <a:endParaRPr lang="en-US" dirty="0"/>
           </a:p>
@@ -6615,7 +6598,12 @@
             <p:ph idx="1"/>
           </p:nvPr>
         </p:nvSpPr>
-        <p:spPr/>
+        <p:spPr>
+          <a:xfrm>
+            <a:off x="457200" y="2049270"/>
+            <a:ext cx="8229600" cy="4639629"/>
+          </a:xfrm>
+        </p:spPr>
         <p:txBody>
           <a:bodyPr>
             <a:normAutofit/>
@@ -6623,118 +6611,47 @@
           <a:lstStyle/>
           <a:p>
             <a:r>
-              <a:rPr lang="en-US" b="1" dirty="0" err="1" smtClean="0"/>
-              <a:t>CodeAcademy</a:t>
-            </a:r>
-            <a:r>
-              <a:rPr lang="en-US" b="1" dirty="0"/>
-              <a:t/>
-            </a:r>
-            <a:br>
-              <a:rPr lang="en-US" b="1" dirty="0"/>
-            </a:br>
-            <a:r>
-              <a:rPr lang="en-US" dirty="0" smtClean="0">
-                <a:hlinkClick r:id="rId2"/>
-              </a:rPr>
-              <a:t>https</a:t>
-            </a:r>
-            <a:r>
-              <a:rPr lang="en-US" dirty="0">
-                <a:hlinkClick r:id="rId2"/>
-              </a:rPr>
-              <a:t>://</a:t>
-            </a:r>
-            <a:r>
-              <a:rPr lang="en-US" dirty="0" smtClean="0">
-                <a:hlinkClick r:id="rId2"/>
-              </a:rPr>
-              <a:t>www.codecademy.com/learn/python</a:t>
-            </a:r>
-            <a:r>
-              <a:rPr lang="en-US" dirty="0" smtClean="0"/>
-              <a:t> </a:t>
-            </a:r>
-            <a:endParaRPr lang="en-US" b="1" dirty="0" smtClean="0"/>
-          </a:p>
-          <a:p>
-            <a:r>
-              <a:rPr lang="en-US" b="1" dirty="0" err="1" smtClean="0"/>
-              <a:t>Scipy</a:t>
-            </a:r>
-            <a:r>
-              <a:rPr lang="en-US" b="1" dirty="0" smtClean="0"/>
-              <a:t> lectures</a:t>
-            </a:r>
-            <a:br>
-              <a:rPr lang="en-US" b="1" dirty="0" smtClean="0"/>
-            </a:br>
-            <a:r>
-              <a:rPr lang="en-US" dirty="0" smtClean="0">
-                <a:hlinkClick r:id="rId3"/>
-              </a:rPr>
-              <a:t>https</a:t>
-            </a:r>
-            <a:r>
-              <a:rPr lang="en-US" dirty="0" smtClean="0">
-                <a:hlinkClick r:id="rId3"/>
-              </a:rPr>
-              <a:t>://scipy-lectures.github.io</a:t>
-            </a:r>
-            <a:r>
-              <a:rPr lang="en-US" dirty="0" smtClean="0">
-                <a:hlinkClick r:id="rId3"/>
-              </a:rPr>
-              <a:t>/</a:t>
+              <a:rPr lang="en-US" dirty="0" smtClean="0"/>
+              <a:t>Command line arguments</a:t>
+            </a:r>
+          </a:p>
+          <a:p>
+            <a:r>
+              <a:rPr lang="en-US" dirty="0" smtClean="0"/>
+              <a:t>Debugging</a:t>
+            </a:r>
+          </a:p>
+          <a:p>
+            <a:r>
+              <a:rPr lang="en-US" dirty="0" smtClean="0"/>
+              <a:t>Profiling</a:t>
             </a:r>
             <a:endParaRPr lang="en-US" dirty="0" smtClean="0"/>
           </a:p>
           <a:p>
             <a:r>
               <a:rPr lang="en-US" dirty="0" smtClean="0"/>
-              <a:t>A long list of other resources available on GitHub, along with </a:t>
-            </a:r>
-            <a:r>
-              <a:rPr lang="en-US" dirty="0"/>
-              <a:t>this </a:t>
-            </a:r>
-            <a:r>
-              <a:rPr lang="en-US" dirty="0" smtClean="0"/>
-              <a:t>presentation:</a:t>
-            </a:r>
-            <a:br>
-              <a:rPr lang="en-US" dirty="0" smtClean="0"/>
-            </a:br>
-            <a:r>
-              <a:rPr lang="en-US" dirty="0" smtClean="0">
-                <a:hlinkClick r:id="rId4"/>
-              </a:rPr>
-              <a:t>https</a:t>
-            </a:r>
-            <a:r>
-              <a:rPr lang="en-US" dirty="0">
-                <a:hlinkClick r:id="rId4"/>
-              </a:rPr>
-              <a:t>://</a:t>
-            </a:r>
-            <a:r>
-              <a:rPr lang="en-US" dirty="0" smtClean="0">
-                <a:hlinkClick r:id="rId4"/>
-              </a:rPr>
-              <a:t>github.com/jgerity/talks</a:t>
-            </a:r>
-            <a:r>
-              <a:rPr lang="en-US" dirty="0" smtClean="0"/>
-              <a:t> </a:t>
-            </a:r>
-            <a:endParaRPr lang="en-US" dirty="0" smtClean="0"/>
+              <a:t>References (where are the pointers?!)</a:t>
+            </a:r>
+          </a:p>
+          <a:p>
+            <a:r>
+              <a:rPr lang="en-US" dirty="0" smtClean="0"/>
+              <a:t>…</a:t>
+            </a:r>
+          </a:p>
+          <a:p>
+            <a:r>
+              <a:rPr lang="en-US" dirty="0" smtClean="0"/>
+              <a:t>Perhaps you can tell me?</a:t>
+            </a:r>
           </a:p>
         </p:txBody>
       </p:sp>
     </p:spTree>
     <p:extLst>
       <p:ext uri="{BB962C8B-B14F-4D97-AF65-F5344CB8AC3E}">
-        <p14:creationId xmlns:p14="http://schemas.microsoft.com/office/powerpoint/2010/main" val="3584811499"/>
+        <p14:creationId xmlns:p14="http://schemas.microsoft.com/office/powerpoint/2010/main" val="3416555919"/>
       </p:ext>
     </p:extLst>
   </p:cSld>
@@ -6778,28 +6695,136 @@
             <p:ph type="title"/>
           </p:nvPr>
         </p:nvSpPr>
-        <p:spPr>
-          <a:xfrm>
-            <a:off x="457200" y="2874722"/>
-            <a:ext cx="8229600" cy="803756"/>
-          </a:xfrm>
-        </p:spPr>
+        <p:spPr/>
         <p:txBody>
           <a:bodyPr/>
           <a:lstStyle/>
           <a:p>
             <a:r>
               <a:rPr lang="en-US" dirty="0" smtClean="0"/>
-              <a:t>Thank you!</a:t>
+              <a:t>Useful resources</a:t>
             </a:r>
             <a:endParaRPr lang="en-US" dirty="0"/>
+          </a:p>
+        </p:txBody>
+      </p:sp>
+      <p:sp>
+        <p:nvSpPr>
+          <p:cNvPr id="3" name="Content Placeholder 2"/>
+          <p:cNvSpPr>
+            <a:spLocks noGrp="1"/>
+          </p:cNvSpPr>
+          <p:nvPr>
+            <p:ph idx="1"/>
+          </p:nvPr>
+        </p:nvSpPr>
+        <p:spPr/>
+        <p:txBody>
+          <a:bodyPr>
+            <a:normAutofit/>
+          </a:bodyPr>
+          <a:lstStyle/>
+          <a:p>
+            <a:r>
+              <a:rPr lang="en-US" b="1" dirty="0" err="1" smtClean="0"/>
+              <a:t>CodeAcademy</a:t>
+            </a:r>
+            <a:r>
+              <a:rPr lang="en-US" b="1" dirty="0"/>
+              <a:t/>
+            </a:r>
+            <a:br>
+              <a:rPr lang="en-US" b="1" dirty="0"/>
+            </a:br>
+            <a:r>
+              <a:rPr lang="en-US" dirty="0" smtClean="0">
+                <a:hlinkClick r:id="rId2"/>
+              </a:rPr>
+              <a:t>https</a:t>
+            </a:r>
+            <a:r>
+              <a:rPr lang="en-US" dirty="0">
+                <a:hlinkClick r:id="rId2"/>
+              </a:rPr>
+              <a:t>://</a:t>
+            </a:r>
+            <a:r>
+              <a:rPr lang="en-US" dirty="0" smtClean="0">
+                <a:hlinkClick r:id="rId2"/>
+              </a:rPr>
+              <a:t>www.codecademy.com/learn/python</a:t>
+            </a:r>
+            <a:r>
+              <a:rPr lang="en-US" dirty="0" smtClean="0"/>
+              <a:t> </a:t>
+            </a:r>
+            <a:endParaRPr lang="en-US" b="1" dirty="0" smtClean="0"/>
+          </a:p>
+          <a:p>
+            <a:r>
+              <a:rPr lang="en-US" b="1" dirty="0" err="1" smtClean="0"/>
+              <a:t>Scipy</a:t>
+            </a:r>
+            <a:r>
+              <a:rPr lang="en-US" b="1" dirty="0" smtClean="0"/>
+              <a:t> lectures</a:t>
+            </a:r>
+            <a:br>
+              <a:rPr lang="en-US" b="1" dirty="0" smtClean="0"/>
+            </a:br>
+            <a:r>
+              <a:rPr lang="en-US" dirty="0" smtClean="0">
+                <a:hlinkClick r:id="rId3"/>
+              </a:rPr>
+              <a:t>https://scipy-lectures.github.io/</a:t>
+            </a:r>
+            <a:endParaRPr lang="en-US" dirty="0" smtClean="0"/>
+          </a:p>
+          <a:p>
+            <a:r>
+              <a:rPr lang="en-US" dirty="0" smtClean="0"/>
+              <a:t>A long list of other resources available on GitHub, along with </a:t>
+            </a:r>
+            <a:r>
+              <a:rPr lang="en-US" dirty="0"/>
+              <a:t>this </a:t>
+            </a:r>
+            <a:r>
+              <a:rPr lang="en-US" dirty="0" smtClean="0"/>
+              <a:t>presentation:</a:t>
+            </a:r>
+            <a:br>
+              <a:rPr lang="en-US" dirty="0" smtClean="0"/>
+            </a:br>
+            <a:r>
+              <a:rPr lang="en-US" dirty="0" smtClean="0">
+                <a:hlinkClick r:id="rId4"/>
+              </a:rPr>
+              <a:t>https</a:t>
+            </a:r>
+            <a:r>
+              <a:rPr lang="en-US" dirty="0">
+                <a:hlinkClick r:id="rId4"/>
+              </a:rPr>
+              <a:t>://</a:t>
+            </a:r>
+            <a:r>
+              <a:rPr lang="en-US" dirty="0" smtClean="0">
+                <a:hlinkClick r:id="rId4"/>
+              </a:rPr>
+              <a:t>github.com/jgerity/talks</a:t>
+            </a:r>
+            <a:r>
+              <a:rPr lang="en-US" dirty="0" smtClean="0"/>
+              <a:t> </a:t>
+            </a:r>
           </a:p>
         </p:txBody>
       </p:sp>
     </p:spTree>
     <p:extLst>
       <p:ext uri="{BB962C8B-B14F-4D97-AF65-F5344CB8AC3E}">
-        <p14:creationId xmlns:p14="http://schemas.microsoft.com/office/powerpoint/2010/main" val="1844849267"/>
+        <p14:creationId xmlns:p14="http://schemas.microsoft.com/office/powerpoint/2010/main" val="3584811499"/>
       </p:ext>
     </p:extLst>
   </p:cSld>
@@ -6855,7 +6880,7 @@
           <a:p>
             <a:r>
               <a:rPr lang="en-US" dirty="0" smtClean="0"/>
-              <a:t>Feedback?</a:t>
+              <a:t>Thank you!</a:t>
             </a:r>
             <a:endParaRPr lang="en-US" dirty="0"/>
           </a:p>
@@ -6864,7 +6889,7 @@
     </p:spTree>
     <p:extLst>
       <p:ext uri="{BB962C8B-B14F-4D97-AF65-F5344CB8AC3E}">
-        <p14:creationId xmlns:p14="http://schemas.microsoft.com/office/powerpoint/2010/main" val="891265136"/>
+        <p14:creationId xmlns:p14="http://schemas.microsoft.com/office/powerpoint/2010/main" val="1844849267"/>
       </p:ext>
     </p:extLst>
   </p:cSld>
@@ -6908,37 +6933,20 @@
             <p:ph type="title"/>
           </p:nvPr>
         </p:nvSpPr>
-        <p:spPr/>
+        <p:spPr>
+          <a:xfrm>
+            <a:off x="457200" y="2874722"/>
+            <a:ext cx="8229600" cy="803756"/>
+          </a:xfrm>
+        </p:spPr>
         <p:txBody>
           <a:bodyPr/>
           <a:lstStyle/>
           <a:p>
             <a:r>
               <a:rPr lang="en-US" dirty="0" smtClean="0"/>
-              <a:t>Backup Slides</a:t>
-            </a:r>
-            <a:endParaRPr lang="en-US" dirty="0"/>
-          </a:p>
-        </p:txBody>
-      </p:sp>
-      <p:sp>
-        <p:nvSpPr>
-          <p:cNvPr id="3" name="Content Placeholder 2"/>
-          <p:cNvSpPr>
-            <a:spLocks noGrp="1"/>
-          </p:cNvSpPr>
-          <p:nvPr>
-            <p:ph idx="1"/>
-          </p:nvPr>
-        </p:nvSpPr>
-        <p:spPr/>
-        <p:txBody>
-          <a:bodyPr/>
-          <a:lstStyle/>
-          <a:p>
-            <a:pPr marL="0" indent="0">
-              <a:buNone/>
-            </a:pPr>
+              <a:t>Feedback?</a:t>
+            </a:r>
             <a:endParaRPr lang="en-US" dirty="0"/>
           </a:p>
         </p:txBody>
@@ -6946,7 +6954,7 @@
     </p:spTree>
     <p:extLst>
       <p:ext uri="{BB962C8B-B14F-4D97-AF65-F5344CB8AC3E}">
-        <p14:creationId xmlns:p14="http://schemas.microsoft.com/office/powerpoint/2010/main" val="1589961851"/>
+        <p14:creationId xmlns:p14="http://schemas.microsoft.com/office/powerpoint/2010/main" val="891265136"/>
       </p:ext>
     </p:extLst>
   </p:cSld>
@@ -6997,7 +7005,7 @@
           <a:p>
             <a:r>
               <a:rPr lang="en-US" dirty="0" smtClean="0"/>
-              <a:t>First class functions</a:t>
+              <a:t>Backup Slides</a:t>
             </a:r>
             <a:endParaRPr lang="en-US" dirty="0"/>
           </a:p>
@@ -7018,40 +7026,17 @@
           <a:bodyPr/>
           <a:lstStyle/>
           <a:p>
-            <a:r>
-              <a:rPr lang="en-US" dirty="0" smtClean="0"/>
-              <a:t>Functions in Python are </a:t>
-            </a:r>
-            <a:r>
-              <a:rPr lang="en-US" b="1" dirty="0" smtClean="0"/>
-              <a:t>first-class citizens</a:t>
-            </a:r>
-            <a:r>
-              <a:rPr lang="en-US" dirty="0" smtClean="0"/>
-              <a:t>, which means they can be passed around like any other variable</a:t>
-            </a:r>
-          </a:p>
-          <a:p>
-            <a:r>
-              <a:rPr lang="en-US" dirty="0" smtClean="0"/>
-              <a:t>See </a:t>
-            </a:r>
-            <a:r>
-              <a:rPr lang="en-US" b="1" dirty="0" smtClean="0"/>
-              <a:t>firstclassfunctions_example.py</a:t>
-            </a:r>
-            <a:r>
-              <a:rPr lang="en-US" dirty="0" smtClean="0"/>
-              <a:t> for some examples of how this can be useful</a:t>
-            </a:r>
-            <a:endParaRPr lang="en-US" b="1" dirty="0"/>
+            <a:pPr marL="0" indent="0">
+              <a:buNone/>
+            </a:pPr>
+            <a:endParaRPr lang="en-US" dirty="0"/>
           </a:p>
         </p:txBody>
       </p:sp>
     </p:spTree>
     <p:extLst>
       <p:ext uri="{BB962C8B-B14F-4D97-AF65-F5344CB8AC3E}">
-        <p14:creationId xmlns:p14="http://schemas.microsoft.com/office/powerpoint/2010/main" val="2264643999"/>
+        <p14:creationId xmlns:p14="http://schemas.microsoft.com/office/powerpoint/2010/main" val="1589961851"/>
       </p:ext>
     </p:extLst>
   </p:cSld>
@@ -7102,7 +7087,7 @@
           <a:p>
             <a:r>
               <a:rPr lang="en-US" dirty="0" smtClean="0"/>
-              <a:t>Garbage collection</a:t>
+              <a:t>First class functions</a:t>
             </a:r>
             <a:endParaRPr lang="en-US" dirty="0"/>
           </a:p>
@@ -7118,123 +7103,45 @@
             <p:ph idx="1"/>
           </p:nvPr>
         </p:nvSpPr>
-        <p:spPr>
-          <a:xfrm>
-            <a:off x="457200" y="2049270"/>
-            <a:ext cx="8229600" cy="4612787"/>
-          </a:xfrm>
-        </p:spPr>
-        <p:txBody>
-          <a:bodyPr>
-            <a:normAutofit/>
-          </a:bodyPr>
+        <p:spPr/>
+        <p:txBody>
+          <a:bodyPr/>
           <a:lstStyle/>
           <a:p>
             <a:r>
               <a:rPr lang="en-US" dirty="0" smtClean="0"/>
-              <a:t>In C/C++ and others, memory is </a:t>
-            </a:r>
-            <a:r>
-              <a:rPr lang="en-US" i="1" dirty="0" smtClean="0"/>
-              <a:t>managed</a:t>
-            </a:r>
-            <a:r>
-              <a:rPr lang="en-US" dirty="0" smtClean="0"/>
-              <a:t> by the user.  E.g. </a:t>
-            </a:r>
-            <a:r>
-              <a:rPr lang="en-US" b="1" dirty="0" err="1"/>
-              <a:t>malloc</a:t>
-            </a:r>
-            <a:r>
-              <a:rPr lang="en-US" b="1" dirty="0"/>
-              <a:t>()</a:t>
-            </a:r>
-            <a:r>
-              <a:rPr lang="en-US" dirty="0" smtClean="0"/>
-              <a:t> and </a:t>
+              <a:t>Functions in Python are </a:t>
             </a:r>
             <a:r>
               <a:rPr lang="en-US" b="1" dirty="0" smtClean="0"/>
-              <a:t>free()</a:t>
-            </a:r>
-          </a:p>
-          <a:p>
-            <a:pPr lvl="1"/>
-            <a:r>
-              <a:rPr lang="en-US" dirty="0" smtClean="0"/>
-              <a:t>A </a:t>
-            </a:r>
-            <a:r>
-              <a:rPr lang="en-US" u="sng" dirty="0" smtClean="0"/>
-              <a:t>lot</a:t>
-            </a:r>
-            <a:r>
-              <a:rPr lang="en-US" dirty="0" smtClean="0"/>
-              <a:t> of bugs happen in these steps.</a:t>
-            </a:r>
-          </a:p>
-          <a:p>
-            <a:r>
-              <a:rPr lang="en-US" dirty="0" smtClean="0"/>
-              <a:t>In </a:t>
-            </a:r>
-            <a:r>
-              <a:rPr lang="en-US" dirty="0" err="1" smtClean="0"/>
-              <a:t>CPython</a:t>
-            </a:r>
-            <a:r>
-              <a:rPr lang="en-US" dirty="0" smtClean="0"/>
-              <a:t>, memory is handled by a </a:t>
-            </a:r>
-            <a:r>
-              <a:rPr lang="en-US" i="1" dirty="0" smtClean="0"/>
-              <a:t>private heap</a:t>
-            </a:r>
-            <a:endParaRPr lang="en-US" dirty="0" smtClean="0"/>
-          </a:p>
-          <a:p>
-            <a:pPr lvl="1"/>
-            <a:r>
-              <a:rPr lang="en-US" dirty="0" smtClean="0"/>
-              <a:t>Memory for an object is freed when there are no remaining </a:t>
-            </a:r>
-            <a:r>
-              <a:rPr lang="en-US" i="1" dirty="0" smtClean="0"/>
-              <a:t>references</a:t>
-            </a:r>
-            <a:r>
-              <a:rPr lang="en-US" dirty="0" smtClean="0"/>
-              <a:t> to that object.</a:t>
-            </a:r>
-          </a:p>
-          <a:p>
-            <a:pPr lvl="1"/>
-            <a:r>
-              <a:rPr lang="en-US" dirty="0" smtClean="0"/>
-              <a:t>Short version: if nobody can “point” to the object, the </a:t>
-            </a:r>
-            <a:r>
-              <a:rPr lang="en-US" i="1" dirty="0" smtClean="0"/>
-              <a:t>garbage collector</a:t>
-            </a:r>
-            <a:r>
-              <a:rPr lang="en-US" dirty="0" smtClean="0"/>
-              <a:t> knows to free it</a:t>
-            </a:r>
-          </a:p>
-          <a:p>
-            <a:endParaRPr lang="en-US" dirty="0"/>
-          </a:p>
-          <a:p>
-            <a:endParaRPr lang="en-US" dirty="0"/>
+              <a:t>first-class citizens</a:t>
+            </a:r>
+            <a:r>
+              <a:rPr lang="en-US" dirty="0" smtClean="0"/>
+              <a:t>, which means they can be passed around like any other variable</a:t>
+            </a:r>
+          </a:p>
+          <a:p>
+            <a:r>
+              <a:rPr lang="en-US" dirty="0" smtClean="0"/>
+              <a:t>See </a:t>
+            </a:r>
+            <a:r>
+              <a:rPr lang="en-US" b="1" dirty="0" smtClean="0"/>
+              <a:t>firstclassfunctions_example.py</a:t>
+            </a:r>
+            <a:r>
+              <a:rPr lang="en-US" dirty="0" smtClean="0"/>
+              <a:t> for some examples of how this can be useful</a:t>
+            </a:r>
+            <a:endParaRPr lang="en-US" b="1" dirty="0"/>
           </a:p>
         </p:txBody>
       </p:sp>
     </p:spTree>
     <p:extLst>
       <p:ext uri="{BB962C8B-B14F-4D97-AF65-F5344CB8AC3E}">
-        <p14:creationId xmlns:p14="http://schemas.microsoft.com/office/powerpoint/2010/main" val="1075041600"/>
+        <p14:creationId xmlns:p14="http://schemas.microsoft.com/office/powerpoint/2010/main" val="2264643999"/>
       </p:ext>
     </p:extLst>
   </p:cSld>
@@ -7338,6 +7245,189 @@
     <p:extLst>
       <p:ext uri="{BB962C8B-B14F-4D97-AF65-F5344CB8AC3E}">
         <p14:creationId xmlns:p14="http://schemas.microsoft.com/office/powerpoint/2010/main" val="1885548967"/>
+      </p:ext>
+    </p:extLst>
+  </p:cSld>
+  <p:clrMapOvr>
+    <a:masterClrMapping/>
+  </p:clrMapOvr>
+  <p:timing>
+    <p:tnLst>
+      <p:par>
+        <p:cTn id="1" dur="indefinite" restart="never" nodeType="tmRoot"/>
+      </p:par>
+    </p:tnLst>
+  </p:timing>
+</p:sld>
+</file>
+
+<file path=ppt/slides/slide30.xml><?xml version="1.0" encoding="utf-8"?>
+<p:sld xmlns:a="http://schemas.openxmlformats.org/drawingml/2006/main" xmlns:r="http://schemas.openxmlformats.org/officeDocument/2006/relationships" xmlns:p="http://schemas.openxmlformats.org/presentationml/2006/main">
+  <p:cSld>
+    <p:spTree>
+      <p:nvGrpSpPr>
+        <p:cNvPr id="1" name=""/>
+        <p:cNvGrpSpPr/>
+        <p:nvPr/>
+      </p:nvGrpSpPr>
+      <p:grpSpPr>
+        <a:xfrm>
+          <a:off x="0" y="0"/>
+          <a:ext cx="0" cy="0"/>
+          <a:chOff x="0" y="0"/>
+          <a:chExt cx="0" cy="0"/>
+        </a:xfrm>
+      </p:grpSpPr>
+      <p:sp>
+        <p:nvSpPr>
+          <p:cNvPr id="2" name="Title 1"/>
+          <p:cNvSpPr>
+            <a:spLocks noGrp="1"/>
+          </p:cNvSpPr>
+          <p:nvPr>
+            <p:ph type="title"/>
+          </p:nvPr>
+        </p:nvSpPr>
+        <p:spPr/>
+        <p:txBody>
+          <a:bodyPr/>
+          <a:lstStyle/>
+          <a:p>
+            <a:r>
+              <a:rPr lang="en-US" dirty="0" smtClean="0"/>
+              <a:t>Garbage collection</a:t>
+            </a:r>
+            <a:endParaRPr lang="en-US" dirty="0"/>
+          </a:p>
+        </p:txBody>
+      </p:sp>
+      <p:sp>
+        <p:nvSpPr>
+          <p:cNvPr id="3" name="Content Placeholder 2"/>
+          <p:cNvSpPr>
+            <a:spLocks noGrp="1"/>
+          </p:cNvSpPr>
+          <p:nvPr>
+            <p:ph idx="1"/>
+          </p:nvPr>
+        </p:nvSpPr>
+        <p:spPr>
+          <a:xfrm>
+            <a:off x="457200" y="2049270"/>
+            <a:ext cx="8229600" cy="4612787"/>
+          </a:xfrm>
+        </p:spPr>
+        <p:txBody>
+          <a:bodyPr>
+            <a:normAutofit/>
+          </a:bodyPr>
+          <a:lstStyle/>
+          <a:p>
+            <a:r>
+              <a:rPr lang="en-US" dirty="0" smtClean="0"/>
+              <a:t>In C/C++ and others, memory is </a:t>
+            </a:r>
+            <a:r>
+              <a:rPr lang="en-US" i="1" dirty="0" smtClean="0"/>
+              <a:t>managed</a:t>
+            </a:r>
+            <a:r>
+              <a:rPr lang="en-US" dirty="0" smtClean="0"/>
+              <a:t> by the user.  E.g. </a:t>
+            </a:r>
+            <a:r>
+              <a:rPr lang="en-US" b="1" dirty="0" err="1"/>
+              <a:t>malloc</a:t>
+            </a:r>
+            <a:r>
+              <a:rPr lang="en-US" b="1" dirty="0"/>
+              <a:t>()</a:t>
+            </a:r>
+            <a:r>
+              <a:rPr lang="en-US" dirty="0" smtClean="0"/>
+              <a:t> and </a:t>
+            </a:r>
+            <a:r>
+              <a:rPr lang="en-US" b="1" dirty="0" smtClean="0"/>
+              <a:t>free()</a:t>
+            </a:r>
+          </a:p>
+          <a:p>
+            <a:pPr lvl="1"/>
+            <a:r>
+              <a:rPr lang="en-US" dirty="0" smtClean="0"/>
+              <a:t>A </a:t>
+            </a:r>
+            <a:r>
+              <a:rPr lang="en-US" u="sng" dirty="0" smtClean="0"/>
+              <a:t>lot</a:t>
+            </a:r>
+            <a:r>
+              <a:rPr lang="en-US" dirty="0" smtClean="0"/>
+              <a:t> of bugs happen in these steps.</a:t>
+            </a:r>
+          </a:p>
+          <a:p>
+            <a:r>
+              <a:rPr lang="en-US" dirty="0" smtClean="0"/>
+              <a:t>In </a:t>
+            </a:r>
+            <a:r>
+              <a:rPr lang="en-US" dirty="0" err="1" smtClean="0"/>
+              <a:t>CPython</a:t>
+            </a:r>
+            <a:r>
+              <a:rPr lang="en-US" dirty="0" smtClean="0"/>
+              <a:t>, memory is handled by a </a:t>
+            </a:r>
+            <a:r>
+              <a:rPr lang="en-US" i="1" dirty="0" smtClean="0"/>
+              <a:t>private heap</a:t>
+            </a:r>
+            <a:endParaRPr lang="en-US" dirty="0" smtClean="0"/>
+          </a:p>
+          <a:p>
+            <a:pPr lvl="1"/>
+            <a:r>
+              <a:rPr lang="en-US" dirty="0" smtClean="0"/>
+              <a:t>Memory for an object is freed when there are no remaining </a:t>
+            </a:r>
+            <a:r>
+              <a:rPr lang="en-US" i="1" dirty="0" smtClean="0"/>
+              <a:t>references</a:t>
+            </a:r>
+            <a:r>
+              <a:rPr lang="en-US" dirty="0" smtClean="0"/>
+              <a:t> to that object.</a:t>
+            </a:r>
+          </a:p>
+          <a:p>
+            <a:pPr lvl="1"/>
+            <a:r>
+              <a:rPr lang="en-US" dirty="0" smtClean="0"/>
+              <a:t>Short version: if nobody can “point” to the object, the </a:t>
+            </a:r>
+            <a:r>
+              <a:rPr lang="en-US" i="1" dirty="0" smtClean="0"/>
+              <a:t>garbage collector</a:t>
+            </a:r>
+            <a:r>
+              <a:rPr lang="en-US" dirty="0" smtClean="0"/>
+              <a:t> knows to free it</a:t>
+            </a:r>
+          </a:p>
+          <a:p>
+            <a:endParaRPr lang="en-US" dirty="0"/>
+          </a:p>
+          <a:p>
+            <a:endParaRPr lang="en-US" dirty="0"/>
+          </a:p>
+        </p:txBody>
+      </p:sp>
+    </p:spTree>
+    <p:extLst>
+      <p:ext uri="{BB962C8B-B14F-4D97-AF65-F5344CB8AC3E}">
+        <p14:creationId xmlns:p14="http://schemas.microsoft.com/office/powerpoint/2010/main" val="1075041600"/>
       </p:ext>
     </p:extLst>
   </p:cSld>
@@ -8084,15 +8174,7 @@
           <a:p>
             <a:r>
               <a:rPr lang="en-US" dirty="0" smtClean="0"/>
-              <a:t>A third </a:t>
-            </a:r>
-            <a:r>
-              <a:rPr lang="en-US" dirty="0" smtClean="0"/>
-              <a:t>program </a:t>
-            </a:r>
-            <a:r>
-              <a:rPr lang="en-US" dirty="0" smtClean="0"/>
-              <a:t>in Python</a:t>
+              <a:t>A third program in Python</a:t>
             </a:r>
             <a:endParaRPr lang="en-US" dirty="0"/>
           </a:p>
@@ -8115,11 +8197,7 @@
           <a:p>
             <a:r>
               <a:rPr lang="en-US" dirty="0" smtClean="0"/>
-              <a:t>More complex programs make use of defined </a:t>
-            </a:r>
-            <a:r>
-              <a:rPr lang="en-US" dirty="0" smtClean="0"/>
-              <a:t>functions</a:t>
+              <a:t>More complex programs make use of defined functions</a:t>
             </a:r>
             <a:endParaRPr lang="en-US" dirty="0"/>
           </a:p>
@@ -8158,7 +8236,6 @@
               <a:rPr lang="en-US" dirty="0" smtClean="0"/>
               <a:t> </a:t>
             </a:r>
-            <a:endParaRPr lang="en-US" dirty="0" smtClean="0"/>
           </a:p>
         </p:txBody>
       </p:sp>
@@ -8272,13 +8349,8 @@
           <a:p>
             <a:r>
               <a:rPr lang="en-US" dirty="0" smtClean="0"/>
-              <a:t>Rich </a:t>
-            </a:r>
-            <a:r>
-              <a:rPr lang="en-US" dirty="0" smtClean="0"/>
-              <a:t>ecosystem</a:t>
-            </a:r>
-            <a:endParaRPr lang="en-US" dirty="0" smtClean="0"/>
+              <a:t>Rich ecosystem</a:t>
+            </a:r>
           </a:p>
           <a:p>
             <a:pPr lvl="1"/>

</xml_diff>